<commit_message>
update vignette1 and images
</commit_message>
<xml_diff>
--- a/Images/R package reserach for multicate.pptx
+++ b/Images/R package reserach for multicate.pptx
@@ -6,9 +6,10 @@
   </p:sldMasterIdLst>
   <p:sldIdLst>
     <p:sldId id="256" r:id="rId2"/>
-    <p:sldId id="257" r:id="rId3"/>
-    <p:sldId id="258" r:id="rId4"/>
-    <p:sldId id="259" r:id="rId5"/>
+    <p:sldId id="260" r:id="rId3"/>
+    <p:sldId id="257" r:id="rId4"/>
+    <p:sldId id="258" r:id="rId5"/>
+    <p:sldId id="259" r:id="rId6"/>
   </p:sldIdLst>
   <p:sldSz cx="12192000" cy="6858000"/>
   <p:notesSz cx="6858000" cy="9144000"/>
@@ -262,7 +263,7 @@
           <a:p>
             <a:fld id="{8E077C33-3D2A-49FD-8702-A60ED212BBD9}" type="datetimeFigureOut">
               <a:rPr lang="en-US" smtClean="0"/>
-              <a:t>7/7/2025</a:t>
+              <a:t>7/15/25</a:t>
             </a:fld>
             <a:endParaRPr lang="en-US"/>
           </a:p>
@@ -460,7 +461,7 @@
           <a:p>
             <a:fld id="{8E077C33-3D2A-49FD-8702-A60ED212BBD9}" type="datetimeFigureOut">
               <a:rPr lang="en-US" smtClean="0"/>
-              <a:t>7/7/2025</a:t>
+              <a:t>7/15/25</a:t>
             </a:fld>
             <a:endParaRPr lang="en-US"/>
           </a:p>
@@ -668,7 +669,7 @@
           <a:p>
             <a:fld id="{8E077C33-3D2A-49FD-8702-A60ED212BBD9}" type="datetimeFigureOut">
               <a:rPr lang="en-US" smtClean="0"/>
-              <a:t>7/7/2025</a:t>
+              <a:t>7/15/25</a:t>
             </a:fld>
             <a:endParaRPr lang="en-US"/>
           </a:p>
@@ -866,7 +867,7 @@
           <a:p>
             <a:fld id="{8E077C33-3D2A-49FD-8702-A60ED212BBD9}" type="datetimeFigureOut">
               <a:rPr lang="en-US" smtClean="0"/>
-              <a:t>7/7/2025</a:t>
+              <a:t>7/15/25</a:t>
             </a:fld>
             <a:endParaRPr lang="en-US"/>
           </a:p>
@@ -1141,7 +1142,7 @@
           <a:p>
             <a:fld id="{8E077C33-3D2A-49FD-8702-A60ED212BBD9}" type="datetimeFigureOut">
               <a:rPr lang="en-US" smtClean="0"/>
-              <a:t>7/7/2025</a:t>
+              <a:t>7/15/25</a:t>
             </a:fld>
             <a:endParaRPr lang="en-US"/>
           </a:p>
@@ -1406,7 +1407,7 @@
           <a:p>
             <a:fld id="{8E077C33-3D2A-49FD-8702-A60ED212BBD9}" type="datetimeFigureOut">
               <a:rPr lang="en-US" smtClean="0"/>
-              <a:t>7/7/2025</a:t>
+              <a:t>7/15/25</a:t>
             </a:fld>
             <a:endParaRPr lang="en-US"/>
           </a:p>
@@ -1818,7 +1819,7 @@
           <a:p>
             <a:fld id="{8E077C33-3D2A-49FD-8702-A60ED212BBD9}" type="datetimeFigureOut">
               <a:rPr lang="en-US" smtClean="0"/>
-              <a:t>7/7/2025</a:t>
+              <a:t>7/15/25</a:t>
             </a:fld>
             <a:endParaRPr lang="en-US"/>
           </a:p>
@@ -1959,7 +1960,7 @@
           <a:p>
             <a:fld id="{8E077C33-3D2A-49FD-8702-A60ED212BBD9}" type="datetimeFigureOut">
               <a:rPr lang="en-US" smtClean="0"/>
-              <a:t>7/7/2025</a:t>
+              <a:t>7/15/25</a:t>
             </a:fld>
             <a:endParaRPr lang="en-US"/>
           </a:p>
@@ -2072,7 +2073,7 @@
           <a:p>
             <a:fld id="{8E077C33-3D2A-49FD-8702-A60ED212BBD9}" type="datetimeFigureOut">
               <a:rPr lang="en-US" smtClean="0"/>
-              <a:t>7/7/2025</a:t>
+              <a:t>7/15/25</a:t>
             </a:fld>
             <a:endParaRPr lang="en-US"/>
           </a:p>
@@ -2383,7 +2384,7 @@
           <a:p>
             <a:fld id="{8E077C33-3D2A-49FD-8702-A60ED212BBD9}" type="datetimeFigureOut">
               <a:rPr lang="en-US" smtClean="0"/>
-              <a:t>7/7/2025</a:t>
+              <a:t>7/15/25</a:t>
             </a:fld>
             <a:endParaRPr lang="en-US"/>
           </a:p>
@@ -2671,7 +2672,7 @@
           <a:p>
             <a:fld id="{8E077C33-3D2A-49FD-8702-A60ED212BBD9}" type="datetimeFigureOut">
               <a:rPr lang="en-US" smtClean="0"/>
-              <a:t>7/7/2025</a:t>
+              <a:t>7/15/25</a:t>
             </a:fld>
             <a:endParaRPr lang="en-US"/>
           </a:p>
@@ -2912,7 +2913,7 @@
           <a:p>
             <a:fld id="{8E077C33-3D2A-49FD-8702-A60ED212BBD9}" type="datetimeFigureOut">
               <a:rPr lang="en-US" smtClean="0"/>
-              <a:t>7/7/2025</a:t>
+              <a:t>7/15/25</a:t>
             </a:fld>
             <a:endParaRPr lang="en-US"/>
           </a:p>
@@ -3344,14 +3345,14 @@
           <p:nvPr>
             <p:extLst>
               <p:ext uri="{D42A27DB-BD31-4B8C-83A1-F6EECF244321}">
-                <p14:modId xmlns:p14="http://schemas.microsoft.com/office/powerpoint/2010/main" val="1240398120"/>
+                <p14:modId xmlns:p14="http://schemas.microsoft.com/office/powerpoint/2010/main" val="1917640671"/>
               </p:ext>
             </p:extLst>
           </p:nvPr>
         </p:nvGraphicFramePr>
         <p:xfrm>
-          <a:off x="231524" y="1166129"/>
-          <a:ext cx="11529551" cy="4675697"/>
+          <a:off x="1148203" y="1266489"/>
+          <a:ext cx="8261637" cy="3182849"/>
         </p:xfrm>
         <a:graphic>
           <a:graphicData uri="http://schemas.openxmlformats.org/drawingml/2006/table">
@@ -3384,7 +3385,2111 @@
                 <a:gridCol w="1633957">
                   <a:extLst>
                     <a:ext uri="{9D8B030D-6E8A-4147-A177-3AD203B41FA5}">
-                      <a16:colId xmlns:a16="http://schemas.microsoft.com/office/drawing/2014/main" val="1971829744"/>
+                      <a16:colId xmlns:a16="http://schemas.microsoft.com/office/drawing/2014/main" val="2372690440"/>
+                    </a:ext>
+                  </a:extLst>
+                </a:gridCol>
+                <a:gridCol w="1633957">
+                  <a:extLst>
+                    <a:ext uri="{9D8B030D-6E8A-4147-A177-3AD203B41FA5}">
+                      <a16:colId xmlns:a16="http://schemas.microsoft.com/office/drawing/2014/main" val="830598404"/>
+                    </a:ext>
+                  </a:extLst>
+                </a:gridCol>
+              </a:tblGrid>
+              <a:tr h="282773">
+                <a:tc>
+                  <a:txBody>
+                    <a:bodyPr/>
+                    <a:lstStyle/>
+                    <a:p>
+                      <a:pPr algn="ctr" fontAlgn="ctr"/>
+                      <a:endParaRPr lang="en-US" sz="1050" b="0" i="0" u="none" strike="noStrike" dirty="0">
+                        <a:solidFill>
+                          <a:srgbClr val="000000"/>
+                        </a:solidFill>
+                        <a:effectLst/>
+                        <a:latin typeface="Aptos" panose="020B0004020202020204" pitchFamily="34" charset="0"/>
+                      </a:endParaRPr>
+                    </a:p>
+                  </a:txBody>
+                  <a:tcPr marL="5961" marR="5961" marT="5961" marB="0" anchor="ctr">
+                    <a:lnB w="12700" cap="flat" cmpd="sng" algn="ctr">
+                      <a:solidFill>
+                        <a:schemeClr val="tx1"/>
+                      </a:solidFill>
+                      <a:prstDash val="solid"/>
+                      <a:round/>
+                      <a:headEnd type="none" w="med" len="med"/>
+                      <a:tailEnd type="none" w="med" len="med"/>
+                    </a:lnB>
+                    <a:solidFill>
+                      <a:schemeClr val="bg1">
+                        <a:lumMod val="95000"/>
+                      </a:schemeClr>
+                    </a:solidFill>
+                  </a:tcPr>
+                </a:tc>
+                <a:tc>
+                  <a:txBody>
+                    <a:bodyPr/>
+                    <a:lstStyle/>
+                    <a:p>
+                      <a:pPr algn="ctr" fontAlgn="ctr"/>
+                      <a:r>
+                        <a:rPr lang="en-US" sz="1050" b="1" i="0" u="none" strike="noStrike" dirty="0">
+                          <a:solidFill>
+                            <a:srgbClr val="000000"/>
+                          </a:solidFill>
+                          <a:effectLst/>
+                          <a:latin typeface="Aptos" panose="020B0004020202020204" pitchFamily="34" charset="0"/>
+                          <a:hlinkClick r:id="rId2"/>
+                        </a:rPr>
+                        <a:t>multicate</a:t>
+                      </a:r>
+                      <a:endParaRPr lang="en-US" sz="1050" b="1" i="0" u="none" strike="noStrike" dirty="0">
+                        <a:solidFill>
+                          <a:srgbClr val="000000"/>
+                        </a:solidFill>
+                        <a:effectLst/>
+                        <a:latin typeface="Aptos" panose="020B0004020202020204" pitchFamily="34" charset="0"/>
+                      </a:endParaRPr>
+                    </a:p>
+                  </a:txBody>
+                  <a:tcPr marL="5961" marR="5961" marT="5961" marB="0" anchor="ctr">
+                    <a:lnB w="12700" cap="flat" cmpd="sng" algn="ctr">
+                      <a:solidFill>
+                        <a:schemeClr val="tx1"/>
+                      </a:solidFill>
+                      <a:prstDash val="solid"/>
+                      <a:round/>
+                      <a:headEnd type="none" w="med" len="med"/>
+                      <a:tailEnd type="none" w="med" len="med"/>
+                    </a:lnB>
+                    <a:solidFill>
+                      <a:schemeClr val="bg1">
+                        <a:lumMod val="95000"/>
+                      </a:schemeClr>
+                    </a:solidFill>
+                  </a:tcPr>
+                </a:tc>
+                <a:tc>
+                  <a:txBody>
+                    <a:bodyPr/>
+                    <a:lstStyle/>
+                    <a:p>
+                      <a:pPr algn="ctr" fontAlgn="ctr"/>
+                      <a:r>
+                        <a:rPr lang="en-US" sz="1050" b="1" u="none" strike="noStrike" dirty="0">
+                          <a:effectLst/>
+                          <a:latin typeface="Aptos" panose="020B0004020202020204" pitchFamily="34" charset="0"/>
+                          <a:hlinkClick r:id="rId3"/>
+                        </a:rPr>
+                        <a:t>CausalMetaR</a:t>
+                      </a:r>
+                      <a:endParaRPr lang="en-US" sz="1050" b="1" i="0" u="none" strike="noStrike" dirty="0">
+                        <a:solidFill>
+                          <a:srgbClr val="000000"/>
+                        </a:solidFill>
+                        <a:effectLst/>
+                        <a:latin typeface="Aptos" panose="020B0004020202020204" pitchFamily="34" charset="0"/>
+                      </a:endParaRPr>
+                    </a:p>
+                  </a:txBody>
+                  <a:tcPr marL="5961" marR="5961" marT="5961" marB="0" anchor="ctr">
+                    <a:lnB w="12700" cap="flat" cmpd="sng" algn="ctr">
+                      <a:solidFill>
+                        <a:schemeClr val="tx1"/>
+                      </a:solidFill>
+                      <a:prstDash val="solid"/>
+                      <a:round/>
+                      <a:headEnd type="none" w="med" len="med"/>
+                      <a:tailEnd type="none" w="med" len="med"/>
+                    </a:lnB>
+                    <a:solidFill>
+                      <a:schemeClr val="bg1">
+                        <a:lumMod val="95000"/>
+                      </a:schemeClr>
+                    </a:solidFill>
+                  </a:tcPr>
+                </a:tc>
+                <a:tc>
+                  <a:txBody>
+                    <a:bodyPr/>
+                    <a:lstStyle/>
+                    <a:p>
+                      <a:pPr algn="ctr" fontAlgn="ctr"/>
+                      <a:r>
+                        <a:rPr lang="en-US" sz="1050" b="1" u="none" strike="noStrike" dirty="0">
+                          <a:effectLst/>
+                          <a:latin typeface="Aptos" panose="020B0004020202020204" pitchFamily="34" charset="0"/>
+                          <a:hlinkClick r:id="rId4"/>
+                        </a:rPr>
+                        <a:t>metacart</a:t>
+                      </a:r>
+                      <a:endParaRPr lang="en-US" sz="1050" b="1" i="0" u="none" strike="noStrike" dirty="0">
+                        <a:solidFill>
+                          <a:srgbClr val="000000"/>
+                        </a:solidFill>
+                        <a:effectLst/>
+                        <a:latin typeface="Aptos" panose="020B0004020202020204" pitchFamily="34" charset="0"/>
+                      </a:endParaRPr>
+                    </a:p>
+                  </a:txBody>
+                  <a:tcPr marL="5961" marR="5961" marT="5961" marB="0" anchor="ctr">
+                    <a:lnB w="12700" cap="flat" cmpd="sng" algn="ctr">
+                      <a:solidFill>
+                        <a:schemeClr val="tx1"/>
+                      </a:solidFill>
+                      <a:prstDash val="solid"/>
+                      <a:round/>
+                      <a:headEnd type="none" w="med" len="med"/>
+                      <a:tailEnd type="none" w="med" len="med"/>
+                    </a:lnB>
+                    <a:solidFill>
+                      <a:schemeClr val="bg1">
+                        <a:lumMod val="95000"/>
+                      </a:schemeClr>
+                    </a:solidFill>
+                  </a:tcPr>
+                </a:tc>
+                <a:tc>
+                  <a:txBody>
+                    <a:bodyPr/>
+                    <a:lstStyle/>
+                    <a:p>
+                      <a:pPr algn="ctr" fontAlgn="ctr"/>
+                      <a:r>
+                        <a:rPr lang="en-US" sz="1050" b="1" u="none" strike="noStrike" dirty="0">
+                          <a:effectLst/>
+                          <a:latin typeface="Aptos" panose="020B0004020202020204" pitchFamily="34" charset="0"/>
+                          <a:hlinkClick r:id="rId5"/>
+                        </a:rPr>
+                        <a:t>personalized</a:t>
+                      </a:r>
+                      <a:endParaRPr lang="en-US" sz="1050" b="1" i="0" u="none" strike="noStrike" dirty="0">
+                        <a:solidFill>
+                          <a:srgbClr val="000000"/>
+                        </a:solidFill>
+                        <a:effectLst/>
+                        <a:latin typeface="Aptos" panose="020B0004020202020204" pitchFamily="34" charset="0"/>
+                      </a:endParaRPr>
+                    </a:p>
+                  </a:txBody>
+                  <a:tcPr marL="5961" marR="5961" marT="5961" marB="0" anchor="ctr">
+                    <a:lnB w="12700" cap="flat" cmpd="sng" algn="ctr">
+                      <a:solidFill>
+                        <a:schemeClr val="tx1"/>
+                      </a:solidFill>
+                      <a:prstDash val="solid"/>
+                      <a:round/>
+                      <a:headEnd type="none" w="med" len="med"/>
+                      <a:tailEnd type="none" w="med" len="med"/>
+                    </a:lnB>
+                    <a:solidFill>
+                      <a:schemeClr val="bg1">
+                        <a:lumMod val="95000"/>
+                      </a:schemeClr>
+                    </a:solidFill>
+                  </a:tcPr>
+                </a:tc>
+                <a:extLst>
+                  <a:ext uri="{0D108BD9-81ED-4DB2-BD59-A6C34878D82A}">
+                    <a16:rowId xmlns:a16="http://schemas.microsoft.com/office/drawing/2014/main" val="1030899145"/>
+                  </a:ext>
+                </a:extLst>
+              </a:tr>
+              <a:tr h="1413864">
+                <a:tc>
+                  <a:txBody>
+                    <a:bodyPr/>
+                    <a:lstStyle/>
+                    <a:p>
+                      <a:pPr algn="ctr" fontAlgn="ctr"/>
+                      <a:r>
+                        <a:rPr lang="en-US" sz="1050" u="none" strike="noStrike" dirty="0">
+                          <a:effectLst/>
+                          <a:latin typeface="Aptos" panose="020B0004020202020204" pitchFamily="34" charset="0"/>
+                        </a:rPr>
+                        <a:t>Overview</a:t>
+                      </a:r>
+                      <a:endParaRPr lang="en-US" sz="1050" b="0" i="0" u="none" strike="noStrike" dirty="0">
+                        <a:solidFill>
+                          <a:srgbClr val="000000"/>
+                        </a:solidFill>
+                        <a:effectLst/>
+                        <a:latin typeface="Aptos" panose="020B0004020202020204" pitchFamily="34" charset="0"/>
+                      </a:endParaRPr>
+                    </a:p>
+                  </a:txBody>
+                  <a:tcPr marL="5961" marR="5961" marT="5961" marB="0" anchor="ctr">
+                    <a:lnT w="12700" cap="flat" cmpd="sng" algn="ctr">
+                      <a:solidFill>
+                        <a:schemeClr val="tx1"/>
+                      </a:solidFill>
+                      <a:prstDash val="solid"/>
+                      <a:round/>
+                      <a:headEnd type="none" w="med" len="med"/>
+                      <a:tailEnd type="none" w="med" len="med"/>
+                    </a:lnT>
+                    <a:lnB w="12700" cap="flat" cmpd="sng" algn="ctr">
+                      <a:solidFill>
+                        <a:schemeClr val="tx1"/>
+                      </a:solidFill>
+                      <a:prstDash val="solid"/>
+                      <a:round/>
+                      <a:headEnd type="none" w="med" len="med"/>
+                      <a:tailEnd type="none" w="med" len="med"/>
+                    </a:lnB>
+                  </a:tcPr>
+                </a:tc>
+                <a:tc>
+                  <a:txBody>
+                    <a:bodyPr/>
+                    <a:lstStyle/>
+                    <a:p>
+                      <a:pPr algn="l" fontAlgn="ctr"/>
+                      <a:r>
+                        <a:rPr lang="en-US" sz="1050" b="0" i="0" u="none" strike="noStrike" dirty="0">
+                          <a:solidFill>
+                            <a:srgbClr val="000000"/>
+                          </a:solidFill>
+                          <a:effectLst/>
+                          <a:latin typeface="Aptos" panose="020B0004020202020204" pitchFamily="34" charset="0"/>
+                        </a:rPr>
+                        <a:t>Estimates the CATE across multiple studies using machine learning techniques and predicts the CATE in a target population of interest</a:t>
+                      </a:r>
+                    </a:p>
+                  </a:txBody>
+                  <a:tcPr marL="5961" marR="5961" marT="5961" marB="0" anchor="ctr">
+                    <a:lnT w="12700" cap="flat" cmpd="sng" algn="ctr">
+                      <a:solidFill>
+                        <a:schemeClr val="tx1"/>
+                      </a:solidFill>
+                      <a:prstDash val="solid"/>
+                      <a:round/>
+                      <a:headEnd type="none" w="med" len="med"/>
+                      <a:tailEnd type="none" w="med" len="med"/>
+                    </a:lnT>
+                    <a:lnB w="12700" cap="flat" cmpd="sng" algn="ctr">
+                      <a:solidFill>
+                        <a:schemeClr val="tx1"/>
+                      </a:solidFill>
+                      <a:prstDash val="solid"/>
+                      <a:round/>
+                      <a:headEnd type="none" w="med" len="med"/>
+                      <a:tailEnd type="none" w="med" len="med"/>
+                    </a:lnB>
+                  </a:tcPr>
+                </a:tc>
+                <a:tc>
+                  <a:txBody>
+                    <a:bodyPr/>
+                    <a:lstStyle/>
+                    <a:p>
+                      <a:pPr algn="l" fontAlgn="ctr"/>
+                      <a:r>
+                        <a:rPr lang="en-US" sz="1050" u="none" strike="noStrike" dirty="0">
+                          <a:effectLst/>
+                          <a:latin typeface="Aptos" panose="020B0004020202020204" pitchFamily="34" charset="0"/>
+                        </a:rPr>
+                        <a:t>Provides robust and efficient methods for Causally Interpretable Meta-Analysis – estimating causal effects in a target population using a multi-source dataset </a:t>
+                      </a:r>
+                      <a:endParaRPr lang="en-US" sz="1050" b="0" i="0" u="none" strike="noStrike" dirty="0">
+                        <a:solidFill>
+                          <a:srgbClr val="000000"/>
+                        </a:solidFill>
+                        <a:effectLst/>
+                        <a:latin typeface="Aptos" panose="020B0004020202020204" pitchFamily="34" charset="0"/>
+                      </a:endParaRPr>
+                    </a:p>
+                  </a:txBody>
+                  <a:tcPr marL="5961" marR="5961" marT="5961" marB="0" anchor="ctr">
+                    <a:lnT w="12700" cap="flat" cmpd="sng" algn="ctr">
+                      <a:solidFill>
+                        <a:schemeClr val="tx1"/>
+                      </a:solidFill>
+                      <a:prstDash val="solid"/>
+                      <a:round/>
+                      <a:headEnd type="none" w="med" len="med"/>
+                      <a:tailEnd type="none" w="med" len="med"/>
+                    </a:lnT>
+                    <a:lnB w="12700" cap="flat" cmpd="sng" algn="ctr">
+                      <a:solidFill>
+                        <a:schemeClr val="tx1"/>
+                      </a:solidFill>
+                      <a:prstDash val="solid"/>
+                      <a:round/>
+                      <a:headEnd type="none" w="med" len="med"/>
+                      <a:tailEnd type="none" w="med" len="med"/>
+                    </a:lnB>
+                  </a:tcPr>
+                </a:tc>
+                <a:tc>
+                  <a:txBody>
+                    <a:bodyPr/>
+                    <a:lstStyle/>
+                    <a:p>
+                      <a:pPr algn="l" fontAlgn="ctr"/>
+                      <a:r>
+                        <a:rPr lang="en-US" sz="1050" u="none" strike="noStrike" dirty="0">
+                          <a:effectLst/>
+                          <a:latin typeface="Aptos" panose="020B0004020202020204" pitchFamily="34" charset="0"/>
+                        </a:rPr>
+                        <a:t>Integrates classification and regression trees (CART) into meta-analysis to identify interaction effects between moderators</a:t>
+                      </a:r>
+                      <a:endParaRPr lang="en-US" sz="1050" b="0" i="0" u="none" strike="noStrike" dirty="0">
+                        <a:solidFill>
+                          <a:srgbClr val="000000"/>
+                        </a:solidFill>
+                        <a:effectLst/>
+                        <a:latin typeface="Aptos" panose="020B0004020202020204" pitchFamily="34" charset="0"/>
+                      </a:endParaRPr>
+                    </a:p>
+                  </a:txBody>
+                  <a:tcPr marL="5961" marR="5961" marT="5961" marB="0" anchor="ctr">
+                    <a:lnT w="12700" cap="flat" cmpd="sng" algn="ctr">
+                      <a:solidFill>
+                        <a:schemeClr val="tx1"/>
+                      </a:solidFill>
+                      <a:prstDash val="solid"/>
+                      <a:round/>
+                      <a:headEnd type="none" w="med" len="med"/>
+                      <a:tailEnd type="none" w="med" len="med"/>
+                    </a:lnT>
+                    <a:lnB w="12700" cap="flat" cmpd="sng" algn="ctr">
+                      <a:solidFill>
+                        <a:schemeClr val="tx1"/>
+                      </a:solidFill>
+                      <a:prstDash val="solid"/>
+                      <a:round/>
+                      <a:headEnd type="none" w="med" len="med"/>
+                      <a:tailEnd type="none" w="med" len="med"/>
+                    </a:lnB>
+                  </a:tcPr>
+                </a:tc>
+                <a:tc>
+                  <a:txBody>
+                    <a:bodyPr/>
+                    <a:lstStyle/>
+                    <a:p>
+                      <a:pPr algn="l" fontAlgn="ctr"/>
+                      <a:r>
+                        <a:rPr lang="en-US" sz="1050" u="none" strike="noStrike" dirty="0">
+                          <a:effectLst/>
+                          <a:latin typeface="Aptos" panose="020B0004020202020204" pitchFamily="34" charset="0"/>
+                        </a:rPr>
+                        <a:t>Provides functions for fitting and validation of models for subgroup identification and personalized medicine / precision medicine</a:t>
+                      </a:r>
+                      <a:endParaRPr lang="en-US" sz="1050" b="0" i="0" u="none" strike="noStrike" dirty="0">
+                        <a:solidFill>
+                          <a:srgbClr val="000000"/>
+                        </a:solidFill>
+                        <a:effectLst/>
+                        <a:latin typeface="Aptos" panose="020B0004020202020204" pitchFamily="34" charset="0"/>
+                      </a:endParaRPr>
+                    </a:p>
+                  </a:txBody>
+                  <a:tcPr marL="5961" marR="5961" marT="5961" marB="0" anchor="ctr">
+                    <a:lnT w="12700" cap="flat" cmpd="sng" algn="ctr">
+                      <a:solidFill>
+                        <a:schemeClr val="tx1"/>
+                      </a:solidFill>
+                      <a:prstDash val="solid"/>
+                      <a:round/>
+                      <a:headEnd type="none" w="med" len="med"/>
+                      <a:tailEnd type="none" w="med" len="med"/>
+                    </a:lnT>
+                    <a:lnB w="12700" cap="flat" cmpd="sng" algn="ctr">
+                      <a:solidFill>
+                        <a:schemeClr val="tx1"/>
+                      </a:solidFill>
+                      <a:prstDash val="solid"/>
+                      <a:round/>
+                      <a:headEnd type="none" w="med" len="med"/>
+                      <a:tailEnd type="none" w="med" len="med"/>
+                    </a:lnB>
+                  </a:tcPr>
+                </a:tc>
+                <a:extLst>
+                  <a:ext uri="{0D108BD9-81ED-4DB2-BD59-A6C34878D82A}">
+                    <a16:rowId xmlns:a16="http://schemas.microsoft.com/office/drawing/2014/main" val="2177866286"/>
+                  </a:ext>
+                </a:extLst>
+              </a:tr>
+              <a:tr h="247702">
+                <a:tc>
+                  <a:txBody>
+                    <a:bodyPr/>
+                    <a:lstStyle/>
+                    <a:p>
+                      <a:pPr algn="ctr" fontAlgn="ctr"/>
+                      <a:r>
+                        <a:rPr lang="en-US" sz="1050" u="none" strike="noStrike" dirty="0">
+                          <a:effectLst/>
+                          <a:latin typeface="Aptos" panose="020B0004020202020204" pitchFamily="34" charset="0"/>
+                        </a:rPr>
+                        <a:t>Specifically for Clinical data?</a:t>
+                      </a:r>
+                      <a:endParaRPr lang="en-US" sz="1050" b="0" i="0" u="none" strike="noStrike" dirty="0">
+                        <a:solidFill>
+                          <a:srgbClr val="000000"/>
+                        </a:solidFill>
+                        <a:effectLst/>
+                        <a:latin typeface="Aptos" panose="020B0004020202020204" pitchFamily="34" charset="0"/>
+                      </a:endParaRPr>
+                    </a:p>
+                  </a:txBody>
+                  <a:tcPr marL="5961" marR="5961" marT="5961" marB="0" anchor="ctr">
+                    <a:lnT w="12700" cap="flat" cmpd="sng" algn="ctr">
+                      <a:solidFill>
+                        <a:schemeClr val="tx1"/>
+                      </a:solidFill>
+                      <a:prstDash val="solid"/>
+                      <a:round/>
+                      <a:headEnd type="none" w="med" len="med"/>
+                      <a:tailEnd type="none" w="med" len="med"/>
+                    </a:lnT>
+                    <a:lnB w="12700" cap="flat" cmpd="sng" algn="ctr">
+                      <a:solidFill>
+                        <a:schemeClr val="tx1"/>
+                      </a:solidFill>
+                      <a:prstDash val="solid"/>
+                      <a:round/>
+                      <a:headEnd type="none" w="med" len="med"/>
+                      <a:tailEnd type="none" w="med" len="med"/>
+                    </a:lnB>
+                  </a:tcPr>
+                </a:tc>
+                <a:tc>
+                  <a:txBody>
+                    <a:bodyPr/>
+                    <a:lstStyle/>
+                    <a:p>
+                      <a:pPr marL="0" marR="0" lvl="0" indent="0" algn="ctr" defTabSz="914400" rtl="0" eaLnBrk="1" fontAlgn="ctr" latinLnBrk="0" hangingPunct="1">
+                        <a:lnSpc>
+                          <a:spcPct val="100000"/>
+                        </a:lnSpc>
+                        <a:spcBef>
+                          <a:spcPts val="0"/>
+                        </a:spcBef>
+                        <a:spcAft>
+                          <a:spcPts val="0"/>
+                        </a:spcAft>
+                        <a:buClrTx/>
+                        <a:buSzTx/>
+                        <a:buFontTx/>
+                        <a:buNone/>
+                        <a:tabLst/>
+                        <a:defRPr/>
+                      </a:pPr>
+                      <a:r>
+                        <a:rPr lang="en-US" sz="1400" u="none" strike="noStrike" dirty="0">
+                          <a:effectLst/>
+                          <a:latin typeface="Aptos" panose="020B0004020202020204" pitchFamily="34" charset="0"/>
+                        </a:rPr>
+                        <a:t>✅</a:t>
+                      </a:r>
+                      <a:endParaRPr lang="en-US" sz="1000" b="0" i="0" u="none" strike="noStrike" dirty="0">
+                        <a:solidFill>
+                          <a:srgbClr val="000000"/>
+                        </a:solidFill>
+                        <a:effectLst/>
+                        <a:latin typeface="Aptos" panose="020B0004020202020204" pitchFamily="34" charset="0"/>
+                      </a:endParaRPr>
+                    </a:p>
+                  </a:txBody>
+                  <a:tcPr marL="5961" marR="5961" marT="5961" marB="0" anchor="b">
+                    <a:lnT w="12700" cap="flat" cmpd="sng" algn="ctr">
+                      <a:solidFill>
+                        <a:schemeClr val="tx1"/>
+                      </a:solidFill>
+                      <a:prstDash val="solid"/>
+                      <a:round/>
+                      <a:headEnd type="none" w="med" len="med"/>
+                      <a:tailEnd type="none" w="med" len="med"/>
+                    </a:lnT>
+                    <a:lnB w="12700" cap="flat" cmpd="sng" algn="ctr">
+                      <a:solidFill>
+                        <a:schemeClr val="tx1"/>
+                      </a:solidFill>
+                      <a:prstDash val="solid"/>
+                      <a:round/>
+                      <a:headEnd type="none" w="med" len="med"/>
+                      <a:tailEnd type="none" w="med" len="med"/>
+                    </a:lnB>
+                  </a:tcPr>
+                </a:tc>
+                <a:tc>
+                  <a:txBody>
+                    <a:bodyPr/>
+                    <a:lstStyle/>
+                    <a:p>
+                      <a:pPr algn="ctr" fontAlgn="ctr"/>
+                      <a:r>
+                        <a:rPr kumimoji="0" lang="en-US" sz="1400" b="0" i="0" u="none" strike="noStrike" kern="1200" cap="none" spc="0" normalizeH="0" baseline="0" noProof="0" dirty="0">
+                          <a:ln>
+                            <a:noFill/>
+                          </a:ln>
+                          <a:solidFill>
+                            <a:prstClr val="black"/>
+                          </a:solidFill>
+                          <a:effectLst/>
+                          <a:uLnTx/>
+                          <a:uFillTx/>
+                          <a:latin typeface="Aptos" panose="020B0004020202020204" pitchFamily="34" charset="0"/>
+                          <a:ea typeface="+mn-ea"/>
+                          <a:cs typeface="+mn-cs"/>
+                        </a:rPr>
+                        <a:t>✅</a:t>
+                      </a:r>
+                      <a:endParaRPr lang="en-US" sz="1000" b="0" i="0" u="none" strike="noStrike" dirty="0">
+                        <a:solidFill>
+                          <a:srgbClr val="000000"/>
+                        </a:solidFill>
+                        <a:effectLst/>
+                        <a:latin typeface="Aptos" panose="020B0004020202020204" pitchFamily="34" charset="0"/>
+                      </a:endParaRPr>
+                    </a:p>
+                  </a:txBody>
+                  <a:tcPr marL="5961" marR="5961" marT="5961" marB="0" anchor="b">
+                    <a:lnT w="12700" cap="flat" cmpd="sng" algn="ctr">
+                      <a:solidFill>
+                        <a:schemeClr val="tx1"/>
+                      </a:solidFill>
+                      <a:prstDash val="solid"/>
+                      <a:round/>
+                      <a:headEnd type="none" w="med" len="med"/>
+                      <a:tailEnd type="none" w="med" len="med"/>
+                    </a:lnT>
+                    <a:lnB w="12700" cap="flat" cmpd="sng" algn="ctr">
+                      <a:solidFill>
+                        <a:schemeClr val="tx1"/>
+                      </a:solidFill>
+                      <a:prstDash val="solid"/>
+                      <a:round/>
+                      <a:headEnd type="none" w="med" len="med"/>
+                      <a:tailEnd type="none" w="med" len="med"/>
+                    </a:lnB>
+                  </a:tcPr>
+                </a:tc>
+                <a:tc>
+                  <a:txBody>
+                    <a:bodyPr/>
+                    <a:lstStyle/>
+                    <a:p>
+                      <a:pPr algn="ctr" fontAlgn="ctr"/>
+                      <a:endParaRPr lang="en-US" sz="1000" b="0" i="0" u="none" strike="noStrike" dirty="0">
+                        <a:solidFill>
+                          <a:srgbClr val="000000"/>
+                        </a:solidFill>
+                        <a:effectLst/>
+                        <a:latin typeface="Aptos" panose="020B0004020202020204" pitchFamily="34" charset="0"/>
+                      </a:endParaRPr>
+                    </a:p>
+                  </a:txBody>
+                  <a:tcPr marL="5961" marR="5961" marT="5961" marB="0" anchor="b">
+                    <a:lnT w="12700" cap="flat" cmpd="sng" algn="ctr">
+                      <a:solidFill>
+                        <a:schemeClr val="tx1"/>
+                      </a:solidFill>
+                      <a:prstDash val="solid"/>
+                      <a:round/>
+                      <a:headEnd type="none" w="med" len="med"/>
+                      <a:tailEnd type="none" w="med" len="med"/>
+                    </a:lnT>
+                    <a:lnB w="12700" cap="flat" cmpd="sng" algn="ctr">
+                      <a:solidFill>
+                        <a:schemeClr val="tx1"/>
+                      </a:solidFill>
+                      <a:prstDash val="solid"/>
+                      <a:round/>
+                      <a:headEnd type="none" w="med" len="med"/>
+                      <a:tailEnd type="none" w="med" len="med"/>
+                    </a:lnB>
+                  </a:tcPr>
+                </a:tc>
+                <a:tc>
+                  <a:txBody>
+                    <a:bodyPr/>
+                    <a:lstStyle/>
+                    <a:p>
+                      <a:pPr algn="ctr" fontAlgn="ctr"/>
+                      <a:endParaRPr lang="en-US" sz="1000" b="0" i="0" u="none" strike="noStrike" dirty="0">
+                        <a:solidFill>
+                          <a:srgbClr val="000000"/>
+                        </a:solidFill>
+                        <a:effectLst/>
+                        <a:latin typeface="Aptos" panose="020B0004020202020204" pitchFamily="34" charset="0"/>
+                      </a:endParaRPr>
+                    </a:p>
+                  </a:txBody>
+                  <a:tcPr marL="5961" marR="5961" marT="5961" marB="0" anchor="b">
+                    <a:lnT w="12700" cap="flat" cmpd="sng" algn="ctr">
+                      <a:solidFill>
+                        <a:schemeClr val="tx1"/>
+                      </a:solidFill>
+                      <a:prstDash val="solid"/>
+                      <a:round/>
+                      <a:headEnd type="none" w="med" len="med"/>
+                      <a:tailEnd type="none" w="med" len="med"/>
+                    </a:lnT>
+                    <a:lnB w="12700" cap="flat" cmpd="sng" algn="ctr">
+                      <a:solidFill>
+                        <a:schemeClr val="tx1"/>
+                      </a:solidFill>
+                      <a:prstDash val="solid"/>
+                      <a:round/>
+                      <a:headEnd type="none" w="med" len="med"/>
+                      <a:tailEnd type="none" w="med" len="med"/>
+                    </a:lnB>
+                  </a:tcPr>
+                </a:tc>
+                <a:extLst>
+                  <a:ext uri="{0D108BD9-81ED-4DB2-BD59-A6C34878D82A}">
+                    <a16:rowId xmlns:a16="http://schemas.microsoft.com/office/drawing/2014/main" val="1156201414"/>
+                  </a:ext>
+                </a:extLst>
+              </a:tr>
+              <a:tr h="247702">
+                <a:tc>
+                  <a:txBody>
+                    <a:bodyPr/>
+                    <a:lstStyle/>
+                    <a:p>
+                      <a:pPr algn="ctr" fontAlgn="ctr"/>
+                      <a:r>
+                        <a:rPr lang="en-US" sz="1050" u="none" strike="noStrike" dirty="0">
+                          <a:effectLst/>
+                          <a:latin typeface="Aptos" panose="020B0004020202020204" pitchFamily="34" charset="0"/>
+                        </a:rPr>
+                        <a:t>Multiple Studies/sources?</a:t>
+                      </a:r>
+                      <a:endParaRPr lang="en-US" sz="1050" b="0" i="0" u="none" strike="noStrike" dirty="0">
+                        <a:solidFill>
+                          <a:srgbClr val="000000"/>
+                        </a:solidFill>
+                        <a:effectLst/>
+                        <a:latin typeface="Aptos" panose="020B0004020202020204" pitchFamily="34" charset="0"/>
+                      </a:endParaRPr>
+                    </a:p>
+                  </a:txBody>
+                  <a:tcPr marL="5961" marR="5961" marT="5961" marB="0" anchor="ctr">
+                    <a:lnT w="12700" cap="flat" cmpd="sng" algn="ctr">
+                      <a:solidFill>
+                        <a:schemeClr val="tx1"/>
+                      </a:solidFill>
+                      <a:prstDash val="solid"/>
+                      <a:round/>
+                      <a:headEnd type="none" w="med" len="med"/>
+                      <a:tailEnd type="none" w="med" len="med"/>
+                    </a:lnT>
+                    <a:lnB w="12700" cap="flat" cmpd="sng" algn="ctr">
+                      <a:solidFill>
+                        <a:schemeClr val="tx1"/>
+                      </a:solidFill>
+                      <a:prstDash val="solid"/>
+                      <a:round/>
+                      <a:headEnd type="none" w="med" len="med"/>
+                      <a:tailEnd type="none" w="med" len="med"/>
+                    </a:lnB>
+                  </a:tcPr>
+                </a:tc>
+                <a:tc>
+                  <a:txBody>
+                    <a:bodyPr/>
+                    <a:lstStyle/>
+                    <a:p>
+                      <a:pPr marL="0" marR="0" lvl="0" indent="0" algn="ctr" defTabSz="914400" rtl="0" eaLnBrk="1" fontAlgn="ctr" latinLnBrk="0" hangingPunct="1">
+                        <a:lnSpc>
+                          <a:spcPct val="100000"/>
+                        </a:lnSpc>
+                        <a:spcBef>
+                          <a:spcPts val="0"/>
+                        </a:spcBef>
+                        <a:spcAft>
+                          <a:spcPts val="0"/>
+                        </a:spcAft>
+                        <a:buClrTx/>
+                        <a:buSzTx/>
+                        <a:buFontTx/>
+                        <a:buNone/>
+                        <a:tabLst/>
+                        <a:defRPr/>
+                      </a:pPr>
+                      <a:r>
+                        <a:rPr kumimoji="0" lang="en-US" sz="1400" b="0" i="0" u="none" strike="noStrike" kern="1200" cap="none" spc="0" normalizeH="0" baseline="0" noProof="0" dirty="0">
+                          <a:ln>
+                            <a:noFill/>
+                          </a:ln>
+                          <a:solidFill>
+                            <a:prstClr val="black"/>
+                          </a:solidFill>
+                          <a:effectLst/>
+                          <a:uLnTx/>
+                          <a:uFillTx/>
+                          <a:latin typeface="Aptos" panose="020B0004020202020204" pitchFamily="34" charset="0"/>
+                          <a:ea typeface="+mn-ea"/>
+                          <a:cs typeface="+mn-cs"/>
+                        </a:rPr>
+                        <a:t>✅</a:t>
+                      </a:r>
+                      <a:endParaRPr lang="en-US" sz="1000" b="0" i="0" u="none" strike="noStrike" dirty="0">
+                        <a:solidFill>
+                          <a:srgbClr val="000000"/>
+                        </a:solidFill>
+                        <a:effectLst/>
+                        <a:latin typeface="Aptos" panose="020B0004020202020204" pitchFamily="34" charset="0"/>
+                      </a:endParaRPr>
+                    </a:p>
+                  </a:txBody>
+                  <a:tcPr marL="5961" marR="5961" marT="5961" marB="0" anchor="b">
+                    <a:lnT w="12700" cap="flat" cmpd="sng" algn="ctr">
+                      <a:solidFill>
+                        <a:schemeClr val="tx1"/>
+                      </a:solidFill>
+                      <a:prstDash val="solid"/>
+                      <a:round/>
+                      <a:headEnd type="none" w="med" len="med"/>
+                      <a:tailEnd type="none" w="med" len="med"/>
+                    </a:lnT>
+                    <a:lnB w="12700" cap="flat" cmpd="sng" algn="ctr">
+                      <a:solidFill>
+                        <a:schemeClr val="tx1"/>
+                      </a:solidFill>
+                      <a:prstDash val="solid"/>
+                      <a:round/>
+                      <a:headEnd type="none" w="med" len="med"/>
+                      <a:tailEnd type="none" w="med" len="med"/>
+                    </a:lnB>
+                  </a:tcPr>
+                </a:tc>
+                <a:tc>
+                  <a:txBody>
+                    <a:bodyPr/>
+                    <a:lstStyle/>
+                    <a:p>
+                      <a:pPr algn="ctr" fontAlgn="ctr"/>
+                      <a:r>
+                        <a:rPr kumimoji="0" lang="en-US" sz="1400" b="0" i="0" u="none" strike="noStrike" kern="1200" cap="none" spc="0" normalizeH="0" baseline="0" noProof="0" dirty="0">
+                          <a:ln>
+                            <a:noFill/>
+                          </a:ln>
+                          <a:solidFill>
+                            <a:prstClr val="black"/>
+                          </a:solidFill>
+                          <a:effectLst/>
+                          <a:uLnTx/>
+                          <a:uFillTx/>
+                          <a:latin typeface="Aptos" panose="020B0004020202020204" pitchFamily="34" charset="0"/>
+                          <a:ea typeface="+mn-ea"/>
+                          <a:cs typeface="+mn-cs"/>
+                        </a:rPr>
+                        <a:t>✅</a:t>
+                      </a:r>
+                      <a:endParaRPr lang="en-US" sz="1000" b="0" i="0" u="none" strike="noStrike" dirty="0">
+                        <a:solidFill>
+                          <a:srgbClr val="000000"/>
+                        </a:solidFill>
+                        <a:effectLst/>
+                        <a:latin typeface="Aptos" panose="020B0004020202020204" pitchFamily="34" charset="0"/>
+                      </a:endParaRPr>
+                    </a:p>
+                  </a:txBody>
+                  <a:tcPr marL="5961" marR="5961" marT="5961" marB="0" anchor="b">
+                    <a:lnT w="12700" cap="flat" cmpd="sng" algn="ctr">
+                      <a:solidFill>
+                        <a:schemeClr val="tx1"/>
+                      </a:solidFill>
+                      <a:prstDash val="solid"/>
+                      <a:round/>
+                      <a:headEnd type="none" w="med" len="med"/>
+                      <a:tailEnd type="none" w="med" len="med"/>
+                    </a:lnT>
+                    <a:lnB w="12700" cap="flat" cmpd="sng" algn="ctr">
+                      <a:solidFill>
+                        <a:schemeClr val="tx1"/>
+                      </a:solidFill>
+                      <a:prstDash val="solid"/>
+                      <a:round/>
+                      <a:headEnd type="none" w="med" len="med"/>
+                      <a:tailEnd type="none" w="med" len="med"/>
+                    </a:lnB>
+                  </a:tcPr>
+                </a:tc>
+                <a:tc>
+                  <a:txBody>
+                    <a:bodyPr/>
+                    <a:lstStyle/>
+                    <a:p>
+                      <a:pPr algn="ctr" fontAlgn="ctr"/>
+                      <a:r>
+                        <a:rPr kumimoji="0" lang="en-US" sz="1400" b="0" i="0" u="none" strike="noStrike" kern="1200" cap="none" spc="0" normalizeH="0" baseline="0" noProof="0" dirty="0">
+                          <a:ln>
+                            <a:noFill/>
+                          </a:ln>
+                          <a:solidFill>
+                            <a:prstClr val="black"/>
+                          </a:solidFill>
+                          <a:effectLst/>
+                          <a:uLnTx/>
+                          <a:uFillTx/>
+                          <a:latin typeface="Aptos" panose="020B0004020202020204" pitchFamily="34" charset="0"/>
+                          <a:ea typeface="+mn-ea"/>
+                          <a:cs typeface="+mn-cs"/>
+                        </a:rPr>
+                        <a:t>✅</a:t>
+                      </a:r>
+                      <a:endParaRPr lang="en-US" sz="1000" b="0" i="0" u="none" strike="noStrike" dirty="0">
+                        <a:solidFill>
+                          <a:srgbClr val="000000"/>
+                        </a:solidFill>
+                        <a:effectLst/>
+                        <a:latin typeface="Aptos" panose="020B0004020202020204" pitchFamily="34" charset="0"/>
+                      </a:endParaRPr>
+                    </a:p>
+                  </a:txBody>
+                  <a:tcPr marL="5961" marR="5961" marT="5961" marB="0" anchor="b">
+                    <a:lnT w="12700" cap="flat" cmpd="sng" algn="ctr">
+                      <a:solidFill>
+                        <a:schemeClr val="tx1"/>
+                      </a:solidFill>
+                      <a:prstDash val="solid"/>
+                      <a:round/>
+                      <a:headEnd type="none" w="med" len="med"/>
+                      <a:tailEnd type="none" w="med" len="med"/>
+                    </a:lnT>
+                    <a:lnB w="12700" cap="flat" cmpd="sng" algn="ctr">
+                      <a:solidFill>
+                        <a:schemeClr val="tx1"/>
+                      </a:solidFill>
+                      <a:prstDash val="solid"/>
+                      <a:round/>
+                      <a:headEnd type="none" w="med" len="med"/>
+                      <a:tailEnd type="none" w="med" len="med"/>
+                    </a:lnB>
+                  </a:tcPr>
+                </a:tc>
+                <a:tc>
+                  <a:txBody>
+                    <a:bodyPr/>
+                    <a:lstStyle/>
+                    <a:p>
+                      <a:pPr algn="ctr" fontAlgn="ctr"/>
+                      <a:endParaRPr lang="en-US" sz="1000" b="0" i="0" u="none" strike="noStrike" dirty="0">
+                        <a:solidFill>
+                          <a:srgbClr val="000000"/>
+                        </a:solidFill>
+                        <a:effectLst/>
+                        <a:latin typeface="Aptos" panose="020B0004020202020204" pitchFamily="34" charset="0"/>
+                      </a:endParaRPr>
+                    </a:p>
+                  </a:txBody>
+                  <a:tcPr marL="5961" marR="5961" marT="5961" marB="0" anchor="b">
+                    <a:lnT w="12700" cap="flat" cmpd="sng" algn="ctr">
+                      <a:solidFill>
+                        <a:schemeClr val="tx1"/>
+                      </a:solidFill>
+                      <a:prstDash val="solid"/>
+                      <a:round/>
+                      <a:headEnd type="none" w="med" len="med"/>
+                      <a:tailEnd type="none" w="med" len="med"/>
+                    </a:lnT>
+                    <a:lnB w="12700" cap="flat" cmpd="sng" algn="ctr">
+                      <a:solidFill>
+                        <a:schemeClr val="tx1"/>
+                      </a:solidFill>
+                      <a:prstDash val="solid"/>
+                      <a:round/>
+                      <a:headEnd type="none" w="med" len="med"/>
+                      <a:tailEnd type="none" w="med" len="med"/>
+                    </a:lnB>
+                  </a:tcPr>
+                </a:tc>
+                <a:extLst>
+                  <a:ext uri="{0D108BD9-81ED-4DB2-BD59-A6C34878D82A}">
+                    <a16:rowId xmlns:a16="http://schemas.microsoft.com/office/drawing/2014/main" val="2439688353"/>
+                  </a:ext>
+                </a:extLst>
+              </a:tr>
+              <a:tr h="247702">
+                <a:tc>
+                  <a:txBody>
+                    <a:bodyPr/>
+                    <a:lstStyle/>
+                    <a:p>
+                      <a:pPr algn="ctr" fontAlgn="ctr"/>
+                      <a:r>
+                        <a:rPr lang="en-US" sz="1050" u="none" strike="noStrike">
+                          <a:effectLst/>
+                          <a:latin typeface="Aptos" panose="020B0004020202020204" pitchFamily="34" charset="0"/>
+                        </a:rPr>
+                        <a:t>Heterogeneity?</a:t>
+                      </a:r>
+                      <a:endParaRPr lang="en-US" sz="1050" b="0" i="0" u="none" strike="noStrike">
+                        <a:solidFill>
+                          <a:srgbClr val="000000"/>
+                        </a:solidFill>
+                        <a:effectLst/>
+                        <a:latin typeface="Aptos" panose="020B0004020202020204" pitchFamily="34" charset="0"/>
+                      </a:endParaRPr>
+                    </a:p>
+                  </a:txBody>
+                  <a:tcPr marL="5961" marR="5961" marT="5961" marB="0" anchor="ctr">
+                    <a:lnT w="12700" cap="flat" cmpd="sng" algn="ctr">
+                      <a:solidFill>
+                        <a:schemeClr val="tx1"/>
+                      </a:solidFill>
+                      <a:prstDash val="solid"/>
+                      <a:round/>
+                      <a:headEnd type="none" w="med" len="med"/>
+                      <a:tailEnd type="none" w="med" len="med"/>
+                    </a:lnT>
+                    <a:lnB w="12700" cap="flat" cmpd="sng" algn="ctr">
+                      <a:solidFill>
+                        <a:schemeClr val="tx1"/>
+                      </a:solidFill>
+                      <a:prstDash val="solid"/>
+                      <a:round/>
+                      <a:headEnd type="none" w="med" len="med"/>
+                      <a:tailEnd type="none" w="med" len="med"/>
+                    </a:lnB>
+                  </a:tcPr>
+                </a:tc>
+                <a:tc>
+                  <a:txBody>
+                    <a:bodyPr/>
+                    <a:lstStyle/>
+                    <a:p>
+                      <a:pPr marL="0" marR="0" lvl="0" indent="0" algn="ctr" defTabSz="914400" rtl="0" eaLnBrk="1" fontAlgn="ctr" latinLnBrk="0" hangingPunct="1">
+                        <a:lnSpc>
+                          <a:spcPct val="100000"/>
+                        </a:lnSpc>
+                        <a:spcBef>
+                          <a:spcPts val="0"/>
+                        </a:spcBef>
+                        <a:spcAft>
+                          <a:spcPts val="0"/>
+                        </a:spcAft>
+                        <a:buClrTx/>
+                        <a:buSzTx/>
+                        <a:buFontTx/>
+                        <a:buNone/>
+                        <a:tabLst/>
+                        <a:defRPr/>
+                      </a:pPr>
+                      <a:r>
+                        <a:rPr kumimoji="0" lang="en-US" sz="1400" b="0" i="0" u="none" strike="noStrike" kern="1200" cap="none" spc="0" normalizeH="0" baseline="0" noProof="0" dirty="0">
+                          <a:ln>
+                            <a:noFill/>
+                          </a:ln>
+                          <a:solidFill>
+                            <a:prstClr val="black"/>
+                          </a:solidFill>
+                          <a:effectLst/>
+                          <a:uLnTx/>
+                          <a:uFillTx/>
+                          <a:latin typeface="Aptos" panose="020B0004020202020204" pitchFamily="34" charset="0"/>
+                          <a:ea typeface="+mn-ea"/>
+                          <a:cs typeface="+mn-cs"/>
+                        </a:rPr>
+                        <a:t>✅</a:t>
+                      </a:r>
+                      <a:endParaRPr lang="en-US" sz="1000" b="0" i="0" u="none" strike="noStrike" dirty="0">
+                        <a:solidFill>
+                          <a:srgbClr val="000000"/>
+                        </a:solidFill>
+                        <a:effectLst/>
+                        <a:latin typeface="Aptos" panose="020B0004020202020204" pitchFamily="34" charset="0"/>
+                      </a:endParaRPr>
+                    </a:p>
+                  </a:txBody>
+                  <a:tcPr marL="5961" marR="5961" marT="5961" marB="0" anchor="b">
+                    <a:lnT w="12700" cap="flat" cmpd="sng" algn="ctr">
+                      <a:solidFill>
+                        <a:schemeClr val="tx1"/>
+                      </a:solidFill>
+                      <a:prstDash val="solid"/>
+                      <a:round/>
+                      <a:headEnd type="none" w="med" len="med"/>
+                      <a:tailEnd type="none" w="med" len="med"/>
+                    </a:lnT>
+                    <a:lnB w="12700" cap="flat" cmpd="sng" algn="ctr">
+                      <a:solidFill>
+                        <a:schemeClr val="tx1"/>
+                      </a:solidFill>
+                      <a:prstDash val="solid"/>
+                      <a:round/>
+                      <a:headEnd type="none" w="med" len="med"/>
+                      <a:tailEnd type="none" w="med" len="med"/>
+                    </a:lnB>
+                  </a:tcPr>
+                </a:tc>
+                <a:tc>
+                  <a:txBody>
+                    <a:bodyPr/>
+                    <a:lstStyle/>
+                    <a:p>
+                      <a:pPr algn="ctr" fontAlgn="ctr"/>
+                      <a:r>
+                        <a:rPr kumimoji="0" lang="en-US" sz="1400" b="0" i="0" u="none" strike="noStrike" kern="1200" cap="none" spc="0" normalizeH="0" baseline="0" noProof="0" dirty="0">
+                          <a:ln>
+                            <a:noFill/>
+                          </a:ln>
+                          <a:solidFill>
+                            <a:prstClr val="black"/>
+                          </a:solidFill>
+                          <a:effectLst/>
+                          <a:uLnTx/>
+                          <a:uFillTx/>
+                          <a:latin typeface="Aptos" panose="020B0004020202020204" pitchFamily="34" charset="0"/>
+                          <a:ea typeface="+mn-ea"/>
+                          <a:cs typeface="+mn-cs"/>
+                        </a:rPr>
+                        <a:t>✅</a:t>
+                      </a:r>
+                      <a:endParaRPr lang="en-US" sz="1000" b="0" i="0" u="none" strike="noStrike" dirty="0">
+                        <a:solidFill>
+                          <a:srgbClr val="000000"/>
+                        </a:solidFill>
+                        <a:effectLst/>
+                        <a:latin typeface="Aptos" panose="020B0004020202020204" pitchFamily="34" charset="0"/>
+                      </a:endParaRPr>
+                    </a:p>
+                  </a:txBody>
+                  <a:tcPr marL="5961" marR="5961" marT="5961" marB="0" anchor="b">
+                    <a:lnT w="12700" cap="flat" cmpd="sng" algn="ctr">
+                      <a:solidFill>
+                        <a:schemeClr val="tx1"/>
+                      </a:solidFill>
+                      <a:prstDash val="solid"/>
+                      <a:round/>
+                      <a:headEnd type="none" w="med" len="med"/>
+                      <a:tailEnd type="none" w="med" len="med"/>
+                    </a:lnT>
+                    <a:lnB w="12700" cap="flat" cmpd="sng" algn="ctr">
+                      <a:solidFill>
+                        <a:schemeClr val="tx1"/>
+                      </a:solidFill>
+                      <a:prstDash val="solid"/>
+                      <a:round/>
+                      <a:headEnd type="none" w="med" len="med"/>
+                      <a:tailEnd type="none" w="med" len="med"/>
+                    </a:lnB>
+                  </a:tcPr>
+                </a:tc>
+                <a:tc>
+                  <a:txBody>
+                    <a:bodyPr/>
+                    <a:lstStyle/>
+                    <a:p>
+                      <a:pPr marL="0" marR="0" lvl="0" indent="0" algn="ctr" defTabSz="914400" rtl="0" eaLnBrk="1" fontAlgn="ctr" latinLnBrk="0" hangingPunct="1">
+                        <a:lnSpc>
+                          <a:spcPct val="100000"/>
+                        </a:lnSpc>
+                        <a:spcBef>
+                          <a:spcPts val="0"/>
+                        </a:spcBef>
+                        <a:spcAft>
+                          <a:spcPts val="0"/>
+                        </a:spcAft>
+                        <a:buClrTx/>
+                        <a:buSzTx/>
+                        <a:buFontTx/>
+                        <a:buNone/>
+                        <a:tabLst/>
+                        <a:defRPr/>
+                      </a:pPr>
+                      <a:r>
+                        <a:rPr kumimoji="0" lang="en-US" sz="1400" b="0" i="0" u="none" strike="noStrike" kern="1200" cap="none" spc="0" normalizeH="0" baseline="0" noProof="0" dirty="0">
+                          <a:ln>
+                            <a:noFill/>
+                          </a:ln>
+                          <a:solidFill>
+                            <a:prstClr val="black"/>
+                          </a:solidFill>
+                          <a:effectLst/>
+                          <a:uLnTx/>
+                          <a:uFillTx/>
+                          <a:latin typeface="Aptos" panose="020B0004020202020204" pitchFamily="34" charset="0"/>
+                          <a:ea typeface="+mn-ea"/>
+                          <a:cs typeface="+mn-cs"/>
+                        </a:rPr>
+                        <a:t>✅</a:t>
+                      </a:r>
+                      <a:endParaRPr lang="en-US" sz="1000" b="0" i="0" u="none" strike="noStrike" dirty="0">
+                        <a:solidFill>
+                          <a:srgbClr val="000000"/>
+                        </a:solidFill>
+                        <a:effectLst/>
+                        <a:latin typeface="Aptos" panose="020B0004020202020204" pitchFamily="34" charset="0"/>
+                      </a:endParaRPr>
+                    </a:p>
+                  </a:txBody>
+                  <a:tcPr marL="5961" marR="5961" marT="5961" marB="0" anchor="b">
+                    <a:lnT w="12700" cap="flat" cmpd="sng" algn="ctr">
+                      <a:solidFill>
+                        <a:schemeClr val="tx1"/>
+                      </a:solidFill>
+                      <a:prstDash val="solid"/>
+                      <a:round/>
+                      <a:headEnd type="none" w="med" len="med"/>
+                      <a:tailEnd type="none" w="med" len="med"/>
+                    </a:lnT>
+                    <a:lnB w="12700" cap="flat" cmpd="sng" algn="ctr">
+                      <a:solidFill>
+                        <a:schemeClr val="tx1"/>
+                      </a:solidFill>
+                      <a:prstDash val="solid"/>
+                      <a:round/>
+                      <a:headEnd type="none" w="med" len="med"/>
+                      <a:tailEnd type="none" w="med" len="med"/>
+                    </a:lnB>
+                  </a:tcPr>
+                </a:tc>
+                <a:tc>
+                  <a:txBody>
+                    <a:bodyPr/>
+                    <a:lstStyle/>
+                    <a:p>
+                      <a:pPr algn="ctr" fontAlgn="ctr"/>
+                      <a:r>
+                        <a:rPr kumimoji="0" lang="en-US" sz="1400" b="0" i="0" u="none" strike="noStrike" kern="1200" cap="none" spc="0" normalizeH="0" baseline="0" noProof="0" dirty="0">
+                          <a:ln>
+                            <a:noFill/>
+                          </a:ln>
+                          <a:solidFill>
+                            <a:prstClr val="black"/>
+                          </a:solidFill>
+                          <a:effectLst/>
+                          <a:uLnTx/>
+                          <a:uFillTx/>
+                          <a:latin typeface="Aptos" panose="020B0004020202020204" pitchFamily="34" charset="0"/>
+                          <a:ea typeface="+mn-ea"/>
+                          <a:cs typeface="+mn-cs"/>
+                        </a:rPr>
+                        <a:t>✅</a:t>
+                      </a:r>
+                      <a:endParaRPr lang="en-US" sz="1000" b="0" i="0" u="none" strike="noStrike" dirty="0">
+                        <a:solidFill>
+                          <a:srgbClr val="000000"/>
+                        </a:solidFill>
+                        <a:effectLst/>
+                        <a:latin typeface="Aptos" panose="020B0004020202020204" pitchFamily="34" charset="0"/>
+                      </a:endParaRPr>
+                    </a:p>
+                  </a:txBody>
+                  <a:tcPr marL="5961" marR="5961" marT="5961" marB="0" anchor="b">
+                    <a:lnT w="12700" cap="flat" cmpd="sng" algn="ctr">
+                      <a:solidFill>
+                        <a:schemeClr val="tx1"/>
+                      </a:solidFill>
+                      <a:prstDash val="solid"/>
+                      <a:round/>
+                      <a:headEnd type="none" w="med" len="med"/>
+                      <a:tailEnd type="none" w="med" len="med"/>
+                    </a:lnT>
+                    <a:lnB w="12700" cap="flat" cmpd="sng" algn="ctr">
+                      <a:solidFill>
+                        <a:schemeClr val="tx1"/>
+                      </a:solidFill>
+                      <a:prstDash val="solid"/>
+                      <a:round/>
+                      <a:headEnd type="none" w="med" len="med"/>
+                      <a:tailEnd type="none" w="med" len="med"/>
+                    </a:lnB>
+                  </a:tcPr>
+                </a:tc>
+                <a:extLst>
+                  <a:ext uri="{0D108BD9-81ED-4DB2-BD59-A6C34878D82A}">
+                    <a16:rowId xmlns:a16="http://schemas.microsoft.com/office/drawing/2014/main" val="2552288758"/>
+                  </a:ext>
+                </a:extLst>
+              </a:tr>
+              <a:tr h="247702">
+                <a:tc>
+                  <a:txBody>
+                    <a:bodyPr/>
+                    <a:lstStyle/>
+                    <a:p>
+                      <a:pPr algn="ctr" fontAlgn="ctr"/>
+                      <a:r>
+                        <a:rPr lang="en-US" sz="1050" u="none" strike="noStrike" dirty="0">
+                          <a:effectLst/>
+                          <a:latin typeface="Aptos" panose="020B0004020202020204" pitchFamily="34" charset="0"/>
+                        </a:rPr>
+                        <a:t>Individual data (IPD)?</a:t>
+                      </a:r>
+                      <a:endParaRPr lang="en-US" sz="1050" b="0" i="0" u="none" strike="noStrike" dirty="0">
+                        <a:solidFill>
+                          <a:srgbClr val="000000"/>
+                        </a:solidFill>
+                        <a:effectLst/>
+                        <a:latin typeface="Aptos" panose="020B0004020202020204" pitchFamily="34" charset="0"/>
+                      </a:endParaRPr>
+                    </a:p>
+                  </a:txBody>
+                  <a:tcPr marL="5961" marR="5961" marT="5961" marB="0" anchor="ctr">
+                    <a:lnT w="12700" cap="flat" cmpd="sng" algn="ctr">
+                      <a:solidFill>
+                        <a:schemeClr val="tx1"/>
+                      </a:solidFill>
+                      <a:prstDash val="solid"/>
+                      <a:round/>
+                      <a:headEnd type="none" w="med" len="med"/>
+                      <a:tailEnd type="none" w="med" len="med"/>
+                    </a:lnT>
+                    <a:lnB w="12700" cap="flat" cmpd="sng" algn="ctr">
+                      <a:solidFill>
+                        <a:schemeClr val="tx1"/>
+                      </a:solidFill>
+                      <a:prstDash val="solid"/>
+                      <a:round/>
+                      <a:headEnd type="none" w="med" len="med"/>
+                      <a:tailEnd type="none" w="med" len="med"/>
+                    </a:lnB>
+                  </a:tcPr>
+                </a:tc>
+                <a:tc>
+                  <a:txBody>
+                    <a:bodyPr/>
+                    <a:lstStyle/>
+                    <a:p>
+                      <a:pPr marL="0" marR="0" lvl="0" indent="0" algn="ctr" defTabSz="914400" rtl="0" eaLnBrk="1" fontAlgn="ctr" latinLnBrk="0" hangingPunct="1">
+                        <a:lnSpc>
+                          <a:spcPct val="100000"/>
+                        </a:lnSpc>
+                        <a:spcBef>
+                          <a:spcPts val="0"/>
+                        </a:spcBef>
+                        <a:spcAft>
+                          <a:spcPts val="0"/>
+                        </a:spcAft>
+                        <a:buClrTx/>
+                        <a:buSzTx/>
+                        <a:buFontTx/>
+                        <a:buNone/>
+                        <a:tabLst/>
+                        <a:defRPr/>
+                      </a:pPr>
+                      <a:r>
+                        <a:rPr kumimoji="0" lang="en-US" sz="1400" b="0" i="0" u="none" strike="noStrike" kern="1200" cap="none" spc="0" normalizeH="0" baseline="0" noProof="0">
+                          <a:ln>
+                            <a:noFill/>
+                          </a:ln>
+                          <a:solidFill>
+                            <a:prstClr val="black"/>
+                          </a:solidFill>
+                          <a:effectLst/>
+                          <a:uLnTx/>
+                          <a:uFillTx/>
+                          <a:latin typeface="Aptos" panose="020B0004020202020204" pitchFamily="34" charset="0"/>
+                          <a:ea typeface="+mn-ea"/>
+                          <a:cs typeface="+mn-cs"/>
+                        </a:rPr>
+                        <a:t>✅</a:t>
+                      </a:r>
+                      <a:endParaRPr lang="en-US" sz="1000" b="0" i="0" u="none" strike="noStrike" dirty="0">
+                        <a:solidFill>
+                          <a:srgbClr val="000000"/>
+                        </a:solidFill>
+                        <a:effectLst/>
+                        <a:latin typeface="Aptos" panose="020B0004020202020204" pitchFamily="34" charset="0"/>
+                      </a:endParaRPr>
+                    </a:p>
+                  </a:txBody>
+                  <a:tcPr marL="5961" marR="5961" marT="5961" marB="0" anchor="b">
+                    <a:lnT w="12700" cap="flat" cmpd="sng" algn="ctr">
+                      <a:solidFill>
+                        <a:schemeClr val="tx1"/>
+                      </a:solidFill>
+                      <a:prstDash val="solid"/>
+                      <a:round/>
+                      <a:headEnd type="none" w="med" len="med"/>
+                      <a:tailEnd type="none" w="med" len="med"/>
+                    </a:lnT>
+                    <a:lnB w="12700" cap="flat" cmpd="sng" algn="ctr">
+                      <a:solidFill>
+                        <a:schemeClr val="tx1"/>
+                      </a:solidFill>
+                      <a:prstDash val="solid"/>
+                      <a:round/>
+                      <a:headEnd type="none" w="med" len="med"/>
+                      <a:tailEnd type="none" w="med" len="med"/>
+                    </a:lnB>
+                  </a:tcPr>
+                </a:tc>
+                <a:tc>
+                  <a:txBody>
+                    <a:bodyPr/>
+                    <a:lstStyle/>
+                    <a:p>
+                      <a:pPr algn="ctr" fontAlgn="ctr"/>
+                      <a:r>
+                        <a:rPr kumimoji="0" lang="en-US" sz="1400" b="0" i="0" u="none" strike="noStrike" kern="1200" cap="none" spc="0" normalizeH="0" baseline="0" noProof="0" dirty="0">
+                          <a:ln>
+                            <a:noFill/>
+                          </a:ln>
+                          <a:solidFill>
+                            <a:prstClr val="black"/>
+                          </a:solidFill>
+                          <a:effectLst/>
+                          <a:uLnTx/>
+                          <a:uFillTx/>
+                          <a:latin typeface="Aptos" panose="020B0004020202020204" pitchFamily="34" charset="0"/>
+                          <a:ea typeface="+mn-ea"/>
+                          <a:cs typeface="+mn-cs"/>
+                        </a:rPr>
+                        <a:t>✅</a:t>
+                      </a:r>
+                      <a:endParaRPr lang="en-US" sz="1000" b="0" i="0" u="none" strike="noStrike" dirty="0">
+                        <a:solidFill>
+                          <a:srgbClr val="000000"/>
+                        </a:solidFill>
+                        <a:effectLst/>
+                        <a:latin typeface="Aptos" panose="020B0004020202020204" pitchFamily="34" charset="0"/>
+                      </a:endParaRPr>
+                    </a:p>
+                  </a:txBody>
+                  <a:tcPr marL="5961" marR="5961" marT="5961" marB="0" anchor="b">
+                    <a:lnT w="12700" cap="flat" cmpd="sng" algn="ctr">
+                      <a:solidFill>
+                        <a:schemeClr val="tx1"/>
+                      </a:solidFill>
+                      <a:prstDash val="solid"/>
+                      <a:round/>
+                      <a:headEnd type="none" w="med" len="med"/>
+                      <a:tailEnd type="none" w="med" len="med"/>
+                    </a:lnT>
+                    <a:lnB w="12700" cap="flat" cmpd="sng" algn="ctr">
+                      <a:solidFill>
+                        <a:schemeClr val="tx1"/>
+                      </a:solidFill>
+                      <a:prstDash val="solid"/>
+                      <a:round/>
+                      <a:headEnd type="none" w="med" len="med"/>
+                      <a:tailEnd type="none" w="med" len="med"/>
+                    </a:lnB>
+                  </a:tcPr>
+                </a:tc>
+                <a:tc>
+                  <a:txBody>
+                    <a:bodyPr/>
+                    <a:lstStyle/>
+                    <a:p>
+                      <a:pPr algn="ctr" fontAlgn="ctr"/>
+                      <a:r>
+                        <a:rPr kumimoji="0" lang="en-US" sz="1400" b="0" i="0" u="none" strike="noStrike" kern="1200" cap="none" spc="0" normalizeH="0" baseline="0" noProof="0" dirty="0">
+                          <a:ln>
+                            <a:noFill/>
+                          </a:ln>
+                          <a:solidFill>
+                            <a:prstClr val="black"/>
+                          </a:solidFill>
+                          <a:effectLst/>
+                          <a:uLnTx/>
+                          <a:uFillTx/>
+                          <a:latin typeface="Aptos" panose="020B0004020202020204" pitchFamily="34" charset="0"/>
+                          <a:ea typeface="+mn-ea"/>
+                          <a:cs typeface="+mn-cs"/>
+                        </a:rPr>
+                        <a:t>✅</a:t>
+                      </a:r>
+                      <a:endParaRPr lang="en-US" sz="1000" b="0" i="0" u="none" strike="noStrike" dirty="0">
+                        <a:solidFill>
+                          <a:srgbClr val="000000"/>
+                        </a:solidFill>
+                        <a:effectLst/>
+                        <a:latin typeface="Aptos" panose="020B0004020202020204" pitchFamily="34" charset="0"/>
+                      </a:endParaRPr>
+                    </a:p>
+                  </a:txBody>
+                  <a:tcPr marL="5961" marR="5961" marT="5961" marB="0" anchor="b">
+                    <a:lnT w="12700" cap="flat" cmpd="sng" algn="ctr">
+                      <a:solidFill>
+                        <a:schemeClr val="tx1"/>
+                      </a:solidFill>
+                      <a:prstDash val="solid"/>
+                      <a:round/>
+                      <a:headEnd type="none" w="med" len="med"/>
+                      <a:tailEnd type="none" w="med" len="med"/>
+                    </a:lnT>
+                    <a:lnB w="12700" cap="flat" cmpd="sng" algn="ctr">
+                      <a:solidFill>
+                        <a:schemeClr val="tx1"/>
+                      </a:solidFill>
+                      <a:prstDash val="solid"/>
+                      <a:round/>
+                      <a:headEnd type="none" w="med" len="med"/>
+                      <a:tailEnd type="none" w="med" len="med"/>
+                    </a:lnB>
+                  </a:tcPr>
+                </a:tc>
+                <a:tc>
+                  <a:txBody>
+                    <a:bodyPr/>
+                    <a:lstStyle/>
+                    <a:p>
+                      <a:pPr algn="ctr" fontAlgn="ctr"/>
+                      <a:endParaRPr lang="en-US" sz="1000" b="0" i="0" u="none" strike="noStrike" dirty="0">
+                        <a:solidFill>
+                          <a:srgbClr val="000000"/>
+                        </a:solidFill>
+                        <a:effectLst/>
+                        <a:latin typeface="Aptos" panose="020B0004020202020204" pitchFamily="34" charset="0"/>
+                      </a:endParaRPr>
+                    </a:p>
+                  </a:txBody>
+                  <a:tcPr marL="5961" marR="5961" marT="5961" marB="0" anchor="b">
+                    <a:lnT w="12700" cap="flat" cmpd="sng" algn="ctr">
+                      <a:solidFill>
+                        <a:schemeClr val="tx1"/>
+                      </a:solidFill>
+                      <a:prstDash val="solid"/>
+                      <a:round/>
+                      <a:headEnd type="none" w="med" len="med"/>
+                      <a:tailEnd type="none" w="med" len="med"/>
+                    </a:lnT>
+                    <a:lnB w="12700" cap="flat" cmpd="sng" algn="ctr">
+                      <a:solidFill>
+                        <a:schemeClr val="tx1"/>
+                      </a:solidFill>
+                      <a:prstDash val="solid"/>
+                      <a:round/>
+                      <a:headEnd type="none" w="med" len="med"/>
+                      <a:tailEnd type="none" w="med" len="med"/>
+                    </a:lnB>
+                  </a:tcPr>
+                </a:tc>
+                <a:extLst>
+                  <a:ext uri="{0D108BD9-81ED-4DB2-BD59-A6C34878D82A}">
+                    <a16:rowId xmlns:a16="http://schemas.microsoft.com/office/drawing/2014/main" val="56072606"/>
+                  </a:ext>
+                </a:extLst>
+              </a:tr>
+              <a:tr h="247702">
+                <a:tc>
+                  <a:txBody>
+                    <a:bodyPr/>
+                    <a:lstStyle/>
+                    <a:p>
+                      <a:pPr algn="ctr" fontAlgn="ctr"/>
+                      <a:r>
+                        <a:rPr lang="en-US" sz="1050" u="none" strike="noStrike">
+                          <a:effectLst/>
+                          <a:latin typeface="Aptos" panose="020B0004020202020204" pitchFamily="34" charset="0"/>
+                        </a:rPr>
+                        <a:t>Estimation of CATE?</a:t>
+                      </a:r>
+                      <a:endParaRPr lang="en-US" sz="1050" b="0" i="0" u="none" strike="noStrike">
+                        <a:solidFill>
+                          <a:srgbClr val="000000"/>
+                        </a:solidFill>
+                        <a:effectLst/>
+                        <a:latin typeface="Aptos" panose="020B0004020202020204" pitchFamily="34" charset="0"/>
+                      </a:endParaRPr>
+                    </a:p>
+                  </a:txBody>
+                  <a:tcPr marL="5961" marR="5961" marT="5961" marB="0" anchor="ctr">
+                    <a:lnT w="12700" cap="flat" cmpd="sng" algn="ctr">
+                      <a:solidFill>
+                        <a:schemeClr val="tx1"/>
+                      </a:solidFill>
+                      <a:prstDash val="solid"/>
+                      <a:round/>
+                      <a:headEnd type="none" w="med" len="med"/>
+                      <a:tailEnd type="none" w="med" len="med"/>
+                    </a:lnT>
+                    <a:lnB w="12700" cap="flat" cmpd="sng" algn="ctr">
+                      <a:solidFill>
+                        <a:schemeClr val="tx1"/>
+                      </a:solidFill>
+                      <a:prstDash val="solid"/>
+                      <a:round/>
+                      <a:headEnd type="none" w="med" len="med"/>
+                      <a:tailEnd type="none" w="med" len="med"/>
+                    </a:lnB>
+                  </a:tcPr>
+                </a:tc>
+                <a:tc>
+                  <a:txBody>
+                    <a:bodyPr/>
+                    <a:lstStyle/>
+                    <a:p>
+                      <a:pPr marL="0" marR="0" lvl="0" indent="0" algn="ctr" defTabSz="914400" rtl="0" eaLnBrk="1" fontAlgn="ctr" latinLnBrk="0" hangingPunct="1">
+                        <a:lnSpc>
+                          <a:spcPct val="100000"/>
+                        </a:lnSpc>
+                        <a:spcBef>
+                          <a:spcPts val="0"/>
+                        </a:spcBef>
+                        <a:spcAft>
+                          <a:spcPts val="0"/>
+                        </a:spcAft>
+                        <a:buClrTx/>
+                        <a:buSzTx/>
+                        <a:buFontTx/>
+                        <a:buNone/>
+                        <a:tabLst/>
+                        <a:defRPr/>
+                      </a:pPr>
+                      <a:r>
+                        <a:rPr kumimoji="0" lang="en-US" sz="1400" b="0" i="0" u="none" strike="noStrike" kern="1200" cap="none" spc="0" normalizeH="0" baseline="0" noProof="0">
+                          <a:ln>
+                            <a:noFill/>
+                          </a:ln>
+                          <a:solidFill>
+                            <a:prstClr val="black"/>
+                          </a:solidFill>
+                          <a:effectLst/>
+                          <a:uLnTx/>
+                          <a:uFillTx/>
+                          <a:latin typeface="Aptos" panose="020B0004020202020204" pitchFamily="34" charset="0"/>
+                          <a:ea typeface="+mn-ea"/>
+                          <a:cs typeface="+mn-cs"/>
+                        </a:rPr>
+                        <a:t>✅</a:t>
+                      </a:r>
+                      <a:endParaRPr lang="en-US" sz="1000" b="0" i="0" u="none" strike="noStrike" dirty="0">
+                        <a:solidFill>
+                          <a:srgbClr val="000000"/>
+                        </a:solidFill>
+                        <a:effectLst/>
+                        <a:latin typeface="Aptos" panose="020B0004020202020204" pitchFamily="34" charset="0"/>
+                      </a:endParaRPr>
+                    </a:p>
+                  </a:txBody>
+                  <a:tcPr marL="5961" marR="5961" marT="5961" marB="0" anchor="b">
+                    <a:lnT w="12700" cap="flat" cmpd="sng" algn="ctr">
+                      <a:solidFill>
+                        <a:schemeClr val="tx1"/>
+                      </a:solidFill>
+                      <a:prstDash val="solid"/>
+                      <a:round/>
+                      <a:headEnd type="none" w="med" len="med"/>
+                      <a:tailEnd type="none" w="med" len="med"/>
+                    </a:lnT>
+                    <a:lnB w="12700" cap="flat" cmpd="sng" algn="ctr">
+                      <a:solidFill>
+                        <a:schemeClr val="tx1"/>
+                      </a:solidFill>
+                      <a:prstDash val="solid"/>
+                      <a:round/>
+                      <a:headEnd type="none" w="med" len="med"/>
+                      <a:tailEnd type="none" w="med" len="med"/>
+                    </a:lnB>
+                  </a:tcPr>
+                </a:tc>
+                <a:tc>
+                  <a:txBody>
+                    <a:bodyPr/>
+                    <a:lstStyle/>
+                    <a:p>
+                      <a:pPr algn="ctr" fontAlgn="ctr"/>
+                      <a:endParaRPr lang="en-US" sz="1000" b="0" i="0" u="none" strike="noStrike" dirty="0">
+                        <a:solidFill>
+                          <a:srgbClr val="000000"/>
+                        </a:solidFill>
+                        <a:effectLst/>
+                        <a:latin typeface="Aptos" panose="020B0004020202020204" pitchFamily="34" charset="0"/>
+                      </a:endParaRPr>
+                    </a:p>
+                  </a:txBody>
+                  <a:tcPr marL="5961" marR="5961" marT="5961" marB="0" anchor="b">
+                    <a:lnT w="12700" cap="flat" cmpd="sng" algn="ctr">
+                      <a:solidFill>
+                        <a:schemeClr val="tx1"/>
+                      </a:solidFill>
+                      <a:prstDash val="solid"/>
+                      <a:round/>
+                      <a:headEnd type="none" w="med" len="med"/>
+                      <a:tailEnd type="none" w="med" len="med"/>
+                    </a:lnT>
+                    <a:lnB w="12700" cap="flat" cmpd="sng" algn="ctr">
+                      <a:solidFill>
+                        <a:schemeClr val="tx1"/>
+                      </a:solidFill>
+                      <a:prstDash val="solid"/>
+                      <a:round/>
+                      <a:headEnd type="none" w="med" len="med"/>
+                      <a:tailEnd type="none" w="med" len="med"/>
+                    </a:lnB>
+                  </a:tcPr>
+                </a:tc>
+                <a:tc>
+                  <a:txBody>
+                    <a:bodyPr/>
+                    <a:lstStyle/>
+                    <a:p>
+                      <a:pPr algn="ctr" fontAlgn="ctr"/>
+                      <a:r>
+                        <a:rPr kumimoji="0" lang="en-US" sz="1400" b="0" i="0" u="none" strike="noStrike" kern="1200" cap="none" spc="0" normalizeH="0" baseline="0" noProof="0" dirty="0">
+                          <a:ln>
+                            <a:noFill/>
+                          </a:ln>
+                          <a:solidFill>
+                            <a:prstClr val="black"/>
+                          </a:solidFill>
+                          <a:effectLst/>
+                          <a:uLnTx/>
+                          <a:uFillTx/>
+                          <a:latin typeface="Aptos" panose="020B0004020202020204" pitchFamily="34" charset="0"/>
+                          <a:ea typeface="+mn-ea"/>
+                          <a:cs typeface="+mn-cs"/>
+                        </a:rPr>
+                        <a:t>✅</a:t>
+                      </a:r>
+                      <a:endParaRPr lang="en-US" sz="1000" b="0" i="0" u="none" strike="noStrike" dirty="0">
+                        <a:solidFill>
+                          <a:srgbClr val="000000"/>
+                        </a:solidFill>
+                        <a:effectLst/>
+                        <a:latin typeface="Aptos" panose="020B0004020202020204" pitchFamily="34" charset="0"/>
+                      </a:endParaRPr>
+                    </a:p>
+                  </a:txBody>
+                  <a:tcPr marL="5961" marR="5961" marT="5961" marB="0" anchor="b">
+                    <a:lnT w="12700" cap="flat" cmpd="sng" algn="ctr">
+                      <a:solidFill>
+                        <a:schemeClr val="tx1"/>
+                      </a:solidFill>
+                      <a:prstDash val="solid"/>
+                      <a:round/>
+                      <a:headEnd type="none" w="med" len="med"/>
+                      <a:tailEnd type="none" w="med" len="med"/>
+                    </a:lnT>
+                    <a:lnB w="12700" cap="flat" cmpd="sng" algn="ctr">
+                      <a:solidFill>
+                        <a:schemeClr val="tx1"/>
+                      </a:solidFill>
+                      <a:prstDash val="solid"/>
+                      <a:round/>
+                      <a:headEnd type="none" w="med" len="med"/>
+                      <a:tailEnd type="none" w="med" len="med"/>
+                    </a:lnB>
+                  </a:tcPr>
+                </a:tc>
+                <a:tc>
+                  <a:txBody>
+                    <a:bodyPr/>
+                    <a:lstStyle/>
+                    <a:p>
+                      <a:pPr algn="ctr" fontAlgn="ctr"/>
+                      <a:endParaRPr lang="en-US" sz="1000" b="0" i="0" u="none" strike="noStrike" dirty="0">
+                        <a:solidFill>
+                          <a:srgbClr val="000000"/>
+                        </a:solidFill>
+                        <a:effectLst/>
+                        <a:latin typeface="Aptos" panose="020B0004020202020204" pitchFamily="34" charset="0"/>
+                      </a:endParaRPr>
+                    </a:p>
+                  </a:txBody>
+                  <a:tcPr marL="5961" marR="5961" marT="5961" marB="0" anchor="b">
+                    <a:lnT w="12700" cap="flat" cmpd="sng" algn="ctr">
+                      <a:solidFill>
+                        <a:schemeClr val="tx1"/>
+                      </a:solidFill>
+                      <a:prstDash val="solid"/>
+                      <a:round/>
+                      <a:headEnd type="none" w="med" len="med"/>
+                      <a:tailEnd type="none" w="med" len="med"/>
+                    </a:lnT>
+                    <a:lnB w="12700" cap="flat" cmpd="sng" algn="ctr">
+                      <a:solidFill>
+                        <a:schemeClr val="tx1"/>
+                      </a:solidFill>
+                      <a:prstDash val="solid"/>
+                      <a:round/>
+                      <a:headEnd type="none" w="med" len="med"/>
+                      <a:tailEnd type="none" w="med" len="med"/>
+                    </a:lnB>
+                  </a:tcPr>
+                </a:tc>
+                <a:extLst>
+                  <a:ext uri="{0D108BD9-81ED-4DB2-BD59-A6C34878D82A}">
+                    <a16:rowId xmlns:a16="http://schemas.microsoft.com/office/drawing/2014/main" val="3209275298"/>
+                  </a:ext>
+                </a:extLst>
+              </a:tr>
+              <a:tr h="247702">
+                <a:tc>
+                  <a:txBody>
+                    <a:bodyPr/>
+                    <a:lstStyle/>
+                    <a:p>
+                      <a:pPr algn="ctr" fontAlgn="ctr"/>
+                      <a:r>
+                        <a:rPr lang="en-US" sz="1050" u="none" strike="noStrike">
+                          <a:effectLst/>
+                          <a:latin typeface="Aptos" panose="020B0004020202020204" pitchFamily="34" charset="0"/>
+                        </a:rPr>
+                        <a:t>Prediction of CATE?</a:t>
+                      </a:r>
+                      <a:endParaRPr lang="en-US" sz="1050" b="0" i="0" u="none" strike="noStrike">
+                        <a:solidFill>
+                          <a:srgbClr val="000000"/>
+                        </a:solidFill>
+                        <a:effectLst/>
+                        <a:latin typeface="Aptos" panose="020B0004020202020204" pitchFamily="34" charset="0"/>
+                      </a:endParaRPr>
+                    </a:p>
+                  </a:txBody>
+                  <a:tcPr marL="5961" marR="5961" marT="5961" marB="0" anchor="ctr">
+                    <a:lnT w="12700" cap="flat" cmpd="sng" algn="ctr">
+                      <a:solidFill>
+                        <a:schemeClr val="tx1"/>
+                      </a:solidFill>
+                      <a:prstDash val="solid"/>
+                      <a:round/>
+                      <a:headEnd type="none" w="med" len="med"/>
+                      <a:tailEnd type="none" w="med" len="med"/>
+                    </a:lnT>
+                    <a:lnB w="12700" cap="flat" cmpd="sng" algn="ctr">
+                      <a:solidFill>
+                        <a:schemeClr val="tx1"/>
+                      </a:solidFill>
+                      <a:prstDash val="solid"/>
+                      <a:round/>
+                      <a:headEnd type="none" w="med" len="med"/>
+                      <a:tailEnd type="none" w="med" len="med"/>
+                    </a:lnB>
+                  </a:tcPr>
+                </a:tc>
+                <a:tc>
+                  <a:txBody>
+                    <a:bodyPr/>
+                    <a:lstStyle/>
+                    <a:p>
+                      <a:pPr marL="0" marR="0" lvl="0" indent="0" algn="ctr" defTabSz="914400" rtl="0" eaLnBrk="1" fontAlgn="ctr" latinLnBrk="0" hangingPunct="1">
+                        <a:lnSpc>
+                          <a:spcPct val="100000"/>
+                        </a:lnSpc>
+                        <a:spcBef>
+                          <a:spcPts val="0"/>
+                        </a:spcBef>
+                        <a:spcAft>
+                          <a:spcPts val="0"/>
+                        </a:spcAft>
+                        <a:buClrTx/>
+                        <a:buSzTx/>
+                        <a:buFontTx/>
+                        <a:buNone/>
+                        <a:tabLst/>
+                        <a:defRPr/>
+                      </a:pPr>
+                      <a:r>
+                        <a:rPr kumimoji="0" lang="en-US" sz="1400" b="0" i="0" u="none" strike="noStrike" kern="1200" cap="none" spc="0" normalizeH="0" baseline="0" noProof="0" dirty="0">
+                          <a:ln>
+                            <a:noFill/>
+                          </a:ln>
+                          <a:solidFill>
+                            <a:prstClr val="black"/>
+                          </a:solidFill>
+                          <a:effectLst/>
+                          <a:uLnTx/>
+                          <a:uFillTx/>
+                          <a:latin typeface="Aptos" panose="020B0004020202020204" pitchFamily="34" charset="0"/>
+                          <a:ea typeface="+mn-ea"/>
+                          <a:cs typeface="+mn-cs"/>
+                        </a:rPr>
+                        <a:t>✅</a:t>
+                      </a:r>
+                      <a:endParaRPr lang="en-US" sz="1000" b="0" i="0" u="none" strike="noStrike" dirty="0">
+                        <a:solidFill>
+                          <a:srgbClr val="000000"/>
+                        </a:solidFill>
+                        <a:effectLst/>
+                        <a:latin typeface="Aptos" panose="020B0004020202020204" pitchFamily="34" charset="0"/>
+                      </a:endParaRPr>
+                    </a:p>
+                  </a:txBody>
+                  <a:tcPr marL="5961" marR="5961" marT="5961" marB="0" anchor="b">
+                    <a:lnT w="12700" cap="flat" cmpd="sng" algn="ctr">
+                      <a:solidFill>
+                        <a:schemeClr val="tx1"/>
+                      </a:solidFill>
+                      <a:prstDash val="solid"/>
+                      <a:round/>
+                      <a:headEnd type="none" w="med" len="med"/>
+                      <a:tailEnd type="none" w="med" len="med"/>
+                    </a:lnT>
+                    <a:lnB w="12700" cap="flat" cmpd="sng" algn="ctr">
+                      <a:solidFill>
+                        <a:schemeClr val="tx1"/>
+                      </a:solidFill>
+                      <a:prstDash val="solid"/>
+                      <a:round/>
+                      <a:headEnd type="none" w="med" len="med"/>
+                      <a:tailEnd type="none" w="med" len="med"/>
+                    </a:lnB>
+                  </a:tcPr>
+                </a:tc>
+                <a:tc>
+                  <a:txBody>
+                    <a:bodyPr/>
+                    <a:lstStyle/>
+                    <a:p>
+                      <a:pPr algn="ctr" fontAlgn="ctr"/>
+                      <a:endParaRPr lang="en-US" sz="1000" b="0" i="0" u="none" strike="noStrike" dirty="0">
+                        <a:solidFill>
+                          <a:srgbClr val="000000"/>
+                        </a:solidFill>
+                        <a:effectLst/>
+                        <a:latin typeface="Aptos" panose="020B0004020202020204" pitchFamily="34" charset="0"/>
+                      </a:endParaRPr>
+                    </a:p>
+                  </a:txBody>
+                  <a:tcPr marL="5961" marR="5961" marT="5961" marB="0" anchor="b">
+                    <a:lnT w="12700" cap="flat" cmpd="sng" algn="ctr">
+                      <a:solidFill>
+                        <a:schemeClr val="tx1"/>
+                      </a:solidFill>
+                      <a:prstDash val="solid"/>
+                      <a:round/>
+                      <a:headEnd type="none" w="med" len="med"/>
+                      <a:tailEnd type="none" w="med" len="med"/>
+                    </a:lnT>
+                    <a:lnB w="12700" cap="flat" cmpd="sng" algn="ctr">
+                      <a:solidFill>
+                        <a:schemeClr val="tx1"/>
+                      </a:solidFill>
+                      <a:prstDash val="solid"/>
+                      <a:round/>
+                      <a:headEnd type="none" w="med" len="med"/>
+                      <a:tailEnd type="none" w="med" len="med"/>
+                    </a:lnB>
+                  </a:tcPr>
+                </a:tc>
+                <a:tc>
+                  <a:txBody>
+                    <a:bodyPr/>
+                    <a:lstStyle/>
+                    <a:p>
+                      <a:pPr algn="ctr" fontAlgn="ctr"/>
+                      <a:r>
+                        <a:rPr kumimoji="0" lang="en-US" sz="1400" b="0" i="0" u="none" strike="noStrike" kern="1200" cap="none" spc="0" normalizeH="0" baseline="0" noProof="0" dirty="0">
+                          <a:ln>
+                            <a:noFill/>
+                          </a:ln>
+                          <a:solidFill>
+                            <a:prstClr val="black"/>
+                          </a:solidFill>
+                          <a:effectLst/>
+                          <a:uLnTx/>
+                          <a:uFillTx/>
+                          <a:latin typeface="Aptos" panose="020B0004020202020204" pitchFamily="34" charset="0"/>
+                          <a:ea typeface="+mn-ea"/>
+                          <a:cs typeface="+mn-cs"/>
+                        </a:rPr>
+                        <a:t>✅</a:t>
+                      </a:r>
+                      <a:endParaRPr lang="en-US" sz="1000" b="0" i="0" u="none" strike="noStrike" dirty="0">
+                        <a:solidFill>
+                          <a:srgbClr val="000000"/>
+                        </a:solidFill>
+                        <a:effectLst/>
+                        <a:latin typeface="Aptos" panose="020B0004020202020204" pitchFamily="34" charset="0"/>
+                      </a:endParaRPr>
+                    </a:p>
+                  </a:txBody>
+                  <a:tcPr marL="5961" marR="5961" marT="5961" marB="0" anchor="b">
+                    <a:lnT w="12700" cap="flat" cmpd="sng" algn="ctr">
+                      <a:solidFill>
+                        <a:schemeClr val="tx1"/>
+                      </a:solidFill>
+                      <a:prstDash val="solid"/>
+                      <a:round/>
+                      <a:headEnd type="none" w="med" len="med"/>
+                      <a:tailEnd type="none" w="med" len="med"/>
+                    </a:lnT>
+                    <a:lnB w="12700" cap="flat" cmpd="sng" algn="ctr">
+                      <a:solidFill>
+                        <a:schemeClr val="tx1"/>
+                      </a:solidFill>
+                      <a:prstDash val="solid"/>
+                      <a:round/>
+                      <a:headEnd type="none" w="med" len="med"/>
+                      <a:tailEnd type="none" w="med" len="med"/>
+                    </a:lnB>
+                  </a:tcPr>
+                </a:tc>
+                <a:tc>
+                  <a:txBody>
+                    <a:bodyPr/>
+                    <a:lstStyle/>
+                    <a:p>
+                      <a:pPr algn="ctr" fontAlgn="ctr"/>
+                      <a:r>
+                        <a:rPr kumimoji="0" lang="en-US" sz="1400" b="0" i="0" u="none" strike="noStrike" kern="1200" cap="none" spc="0" normalizeH="0" baseline="0" noProof="0" dirty="0">
+                          <a:ln>
+                            <a:noFill/>
+                          </a:ln>
+                          <a:solidFill>
+                            <a:prstClr val="black"/>
+                          </a:solidFill>
+                          <a:effectLst/>
+                          <a:uLnTx/>
+                          <a:uFillTx/>
+                          <a:latin typeface="Aptos" panose="020B0004020202020204" pitchFamily="34" charset="0"/>
+                          <a:ea typeface="+mn-ea"/>
+                          <a:cs typeface="+mn-cs"/>
+                        </a:rPr>
+                        <a:t>✅</a:t>
+                      </a:r>
+                      <a:endParaRPr lang="en-US" sz="1000" b="0" i="0" u="none" strike="noStrike" dirty="0">
+                        <a:solidFill>
+                          <a:srgbClr val="000000"/>
+                        </a:solidFill>
+                        <a:effectLst/>
+                        <a:latin typeface="Aptos" panose="020B0004020202020204" pitchFamily="34" charset="0"/>
+                      </a:endParaRPr>
+                    </a:p>
+                  </a:txBody>
+                  <a:tcPr marL="5961" marR="5961" marT="5961" marB="0" anchor="b">
+                    <a:lnT w="12700" cap="flat" cmpd="sng" algn="ctr">
+                      <a:solidFill>
+                        <a:schemeClr val="tx1"/>
+                      </a:solidFill>
+                      <a:prstDash val="solid"/>
+                      <a:round/>
+                      <a:headEnd type="none" w="med" len="med"/>
+                      <a:tailEnd type="none" w="med" len="med"/>
+                    </a:lnT>
+                    <a:lnB w="12700" cap="flat" cmpd="sng" algn="ctr">
+                      <a:solidFill>
+                        <a:schemeClr val="tx1"/>
+                      </a:solidFill>
+                      <a:prstDash val="solid"/>
+                      <a:round/>
+                      <a:headEnd type="none" w="med" len="med"/>
+                      <a:tailEnd type="none" w="med" len="med"/>
+                    </a:lnB>
+                  </a:tcPr>
+                </a:tc>
+                <a:extLst>
+                  <a:ext uri="{0D108BD9-81ED-4DB2-BD59-A6C34878D82A}">
+                    <a16:rowId xmlns:a16="http://schemas.microsoft.com/office/drawing/2014/main" val="3357472181"/>
+                  </a:ext>
+                </a:extLst>
+              </a:tr>
+            </a:tbl>
+          </a:graphicData>
+        </a:graphic>
+      </p:graphicFrame>
+      <p:sp>
+        <p:nvSpPr>
+          <p:cNvPr id="2" name="TextBox 1">
+            <a:extLst>
+              <a:ext uri="{FF2B5EF4-FFF2-40B4-BE49-F238E27FC236}">
+                <a16:creationId xmlns:a16="http://schemas.microsoft.com/office/drawing/2014/main" id="{C3E7795E-44C5-4BA3-2150-6D4F5278BA30}"/>
+              </a:ext>
+            </a:extLst>
+          </p:cNvPr>
+          <p:cNvSpPr txBox="1"/>
+          <p:nvPr/>
+        </p:nvSpPr>
+        <p:spPr>
+          <a:xfrm>
+            <a:off x="2419815" y="5185317"/>
+            <a:ext cx="4226312" cy="923330"/>
+          </a:xfrm>
+          <a:prstGeom prst="rect">
+            <a:avLst/>
+          </a:prstGeom>
+          <a:noFill/>
+        </p:spPr>
+        <p:txBody>
+          <a:bodyPr wrap="square" rtlCol="0">
+            <a:spAutoFit/>
+          </a:bodyPr>
+          <a:lstStyle/>
+          <a:p>
+            <a:r>
+              <a:rPr lang="en-US" dirty="0"/>
+              <a:t>To include: something about machine learning methods? More about the visuals/interpretability?</a:t>
+            </a:r>
+          </a:p>
+        </p:txBody>
+      </p:sp>
+    </p:spTree>
+    <p:extLst>
+      <p:ext uri="{BB962C8B-B14F-4D97-AF65-F5344CB8AC3E}">
+        <p14:creationId xmlns:p14="http://schemas.microsoft.com/office/powerpoint/2010/main" val="3878560386"/>
+      </p:ext>
+    </p:extLst>
+  </p:cSld>
+  <p:clrMapOvr>
+    <a:masterClrMapping/>
+  </p:clrMapOvr>
+</p:sld>
+</file>
+
+<file path=ppt/slides/slide2.xml><?xml version="1.0" encoding="utf-8"?>
+<p:sld xmlns:a="http://schemas.openxmlformats.org/drawingml/2006/main" xmlns:r="http://schemas.openxmlformats.org/officeDocument/2006/relationships" xmlns:p="http://schemas.openxmlformats.org/presentationml/2006/main">
+  <p:cSld>
+    <p:spTree>
+      <p:nvGrpSpPr>
+        <p:cNvPr id="1" name="">
+          <a:extLst>
+            <a:ext uri="{FF2B5EF4-FFF2-40B4-BE49-F238E27FC236}">
+              <a16:creationId xmlns:a16="http://schemas.microsoft.com/office/drawing/2014/main" id="{B243F45A-F394-2DD0-8B0E-16609BF364F5}"/>
+            </a:ext>
+          </a:extLst>
+        </p:cNvPr>
+        <p:cNvGrpSpPr/>
+        <p:nvPr/>
+      </p:nvGrpSpPr>
+      <p:grpSpPr>
+        <a:xfrm>
+          <a:off x="0" y="0"/>
+          <a:ext cx="0" cy="0"/>
+          <a:chOff x="0" y="0"/>
+          <a:chExt cx="0" cy="0"/>
+        </a:xfrm>
+      </p:grpSpPr>
+      <p:graphicFrame>
+        <p:nvGraphicFramePr>
+          <p:cNvPr id="4" name="Table 3">
+            <a:extLst>
+              <a:ext uri="{FF2B5EF4-FFF2-40B4-BE49-F238E27FC236}">
+                <a16:creationId xmlns:a16="http://schemas.microsoft.com/office/drawing/2014/main" id="{57D9FB43-6D01-EB71-6032-BDF4927A927C}"/>
+              </a:ext>
+            </a:extLst>
+          </p:cNvPr>
+          <p:cNvGraphicFramePr>
+            <a:graphicFrameLocks noGrp="1"/>
+          </p:cNvGraphicFramePr>
+          <p:nvPr/>
+        </p:nvGraphicFramePr>
+        <p:xfrm>
+          <a:off x="1148203" y="1266490"/>
+          <a:ext cx="8261637" cy="3890930"/>
+        </p:xfrm>
+        <a:graphic>
+          <a:graphicData uri="http://schemas.openxmlformats.org/drawingml/2006/table">
+            <a:tbl>
+              <a:tblPr>
+                <a:tableStyleId>{8EC20E35-A176-4012-BC5E-935CFFF8708E}</a:tableStyleId>
+              </a:tblPr>
+              <a:tblGrid>
+                <a:gridCol w="1725809">
+                  <a:extLst>
+                    <a:ext uri="{9D8B030D-6E8A-4147-A177-3AD203B41FA5}">
+                      <a16:colId xmlns:a16="http://schemas.microsoft.com/office/drawing/2014/main" val="18933724"/>
+                    </a:ext>
+                  </a:extLst>
+                </a:gridCol>
+                <a:gridCol w="1633957">
+                  <a:extLst>
+                    <a:ext uri="{9D8B030D-6E8A-4147-A177-3AD203B41FA5}">
+                      <a16:colId xmlns:a16="http://schemas.microsoft.com/office/drawing/2014/main" val="3945870020"/>
+                    </a:ext>
+                  </a:extLst>
+                </a:gridCol>
+                <a:gridCol w="1633957">
+                  <a:extLst>
+                    <a:ext uri="{9D8B030D-6E8A-4147-A177-3AD203B41FA5}">
+                      <a16:colId xmlns:a16="http://schemas.microsoft.com/office/drawing/2014/main" val="2587881850"/>
                     </a:ext>
                   </a:extLst>
                 </a:gridCol>
@@ -3392,13 +5497,6 @@
                   <a:extLst>
                     <a:ext uri="{9D8B030D-6E8A-4147-A177-3AD203B41FA5}">
                       <a16:colId xmlns:a16="http://schemas.microsoft.com/office/drawing/2014/main" val="2372690440"/>
-                    </a:ext>
-                  </a:extLst>
-                </a:gridCol>
-                <a:gridCol w="1633957">
-                  <a:extLst>
-                    <a:ext uri="{9D8B030D-6E8A-4147-A177-3AD203B41FA5}">
-                      <a16:colId xmlns:a16="http://schemas.microsoft.com/office/drawing/2014/main" val="101058821"/>
                     </a:ext>
                   </a:extLst>
                 </a:gridCol>
@@ -3456,8 +5554,9 @@
                           </a:solidFill>
                           <a:effectLst/>
                           <a:latin typeface="Calibri" panose="020F0502020204030204" pitchFamily="34" charset="0"/>
+                          <a:hlinkClick r:id="rId2"/>
                         </a:rPr>
-                        <a:t>Multicate</a:t>
+                        <a:t>multicate</a:t>
                       </a:r>
                       <a:endParaRPr lang="en-US" sz="1000" b="1" i="0" u="none" strike="noStrike" dirty="0">
                         <a:solidFill>
@@ -3494,8 +5593,48 @@
                       <a:r>
                         <a:rPr lang="en-US" sz="1000" b="1" u="none" strike="noStrike" dirty="0" err="1">
                           <a:effectLst/>
+                          <a:hlinkClick r:id="rId3"/>
                         </a:rPr>
-                        <a:t>causalmeta</a:t>
+                        <a:t>CausalMetaR</a:t>
+                      </a:r>
+                      <a:endParaRPr lang="en-US" sz="1000" b="1" i="0" u="none" strike="noStrike" dirty="0">
+                        <a:solidFill>
+                          <a:srgbClr val="000000"/>
+                        </a:solidFill>
+                        <a:effectLst/>
+                        <a:latin typeface="Calibri" panose="020F0502020204030204" pitchFamily="34" charset="0"/>
+                      </a:endParaRPr>
+                    </a:p>
+                  </a:txBody>
+                  <a:tcPr marL="5961" marR="5961" marT="5961" marB="0" anchor="ctr">
+                    <a:lnB w="12700" cap="flat" cmpd="sng" algn="ctr">
+                      <a:solidFill>
+                        <a:schemeClr val="tx1"/>
+                      </a:solidFill>
+                      <a:prstDash val="solid"/>
+                      <a:round/>
+                      <a:headEnd type="none" w="med" len="med"/>
+                      <a:tailEnd type="none" w="med" len="med"/>
+                    </a:lnB>
+                    <a:solidFill>
+                      <a:schemeClr val="bg1">
+                        <a:lumMod val="95000"/>
+                      </a:schemeClr>
+                    </a:solidFill>
+                  </a:tcPr>
+                </a:tc>
+                <a:tc>
+                  <a:txBody>
+                    <a:bodyPr/>
+                    <a:lstStyle/>
+                    <a:p>
+                      <a:pPr algn="ctr" fontAlgn="ctr"/>
+                      <a:r>
+                        <a:rPr lang="en-US" sz="1000" b="1" u="none" strike="noStrike" dirty="0" err="1">
+                          <a:effectLst/>
+                          <a:hlinkClick r:id="rId4"/>
+                        </a:rPr>
+                        <a:t>metacart</a:t>
                       </a:r>
                       <a:endParaRPr lang="en-US" sz="1000" b="1" i="0" u="none" strike="noStrike" dirty="0">
                         <a:solidFill>
@@ -3532,120 +5671,7 @@
                       <a:r>
                         <a:rPr lang="en-US" sz="1000" b="1" u="none" strike="noStrike" dirty="0">
                           <a:effectLst/>
-                        </a:rPr>
-                        <a:t>CATE</a:t>
-                      </a:r>
-                      <a:endParaRPr lang="en-US" sz="1000" b="1" i="0" u="none" strike="noStrike" dirty="0">
-                        <a:solidFill>
-                          <a:srgbClr val="000000"/>
-                        </a:solidFill>
-                        <a:effectLst/>
-                        <a:latin typeface="Calibri" panose="020F0502020204030204" pitchFamily="34" charset="0"/>
-                      </a:endParaRPr>
-                    </a:p>
-                  </a:txBody>
-                  <a:tcPr marL="5961" marR="5961" marT="5961" marB="0" anchor="ctr">
-                    <a:lnB w="12700" cap="flat" cmpd="sng" algn="ctr">
-                      <a:solidFill>
-                        <a:schemeClr val="tx1"/>
-                      </a:solidFill>
-                      <a:prstDash val="solid"/>
-                      <a:round/>
-                      <a:headEnd type="none" w="med" len="med"/>
-                      <a:tailEnd type="none" w="med" len="med"/>
-                    </a:lnB>
-                    <a:solidFill>
-                      <a:schemeClr val="bg1">
-                        <a:lumMod val="95000"/>
-                      </a:schemeClr>
-                    </a:solidFill>
-                  </a:tcPr>
-                </a:tc>
-                <a:tc>
-                  <a:txBody>
-                    <a:bodyPr/>
-                    <a:lstStyle/>
-                    <a:p>
-                      <a:pPr algn="ctr" fontAlgn="ctr"/>
-                      <a:r>
-                        <a:rPr lang="en-US" sz="1000" b="1" u="none" strike="noStrike" dirty="0" err="1">
-                          <a:effectLst/>
-                        </a:rPr>
-                        <a:t>metacart</a:t>
-                      </a:r>
-                      <a:endParaRPr lang="en-US" sz="1000" b="1" i="0" u="none" strike="noStrike" dirty="0">
-                        <a:solidFill>
-                          <a:srgbClr val="000000"/>
-                        </a:solidFill>
-                        <a:effectLst/>
-                        <a:latin typeface="Calibri" panose="020F0502020204030204" pitchFamily="34" charset="0"/>
-                      </a:endParaRPr>
-                    </a:p>
-                  </a:txBody>
-                  <a:tcPr marL="5961" marR="5961" marT="5961" marB="0" anchor="ctr">
-                    <a:lnB w="12700" cap="flat" cmpd="sng" algn="ctr">
-                      <a:solidFill>
-                        <a:schemeClr val="tx1"/>
-                      </a:solidFill>
-                      <a:prstDash val="solid"/>
-                      <a:round/>
-                      <a:headEnd type="none" w="med" len="med"/>
-                      <a:tailEnd type="none" w="med" len="med"/>
-                    </a:lnB>
-                    <a:solidFill>
-                      <a:schemeClr val="bg1">
-                        <a:lumMod val="95000"/>
-                      </a:schemeClr>
-                    </a:solidFill>
-                  </a:tcPr>
-                </a:tc>
-                <a:tc>
-                  <a:txBody>
-                    <a:bodyPr/>
-                    <a:lstStyle/>
-                    <a:p>
-                      <a:pPr algn="ctr" fontAlgn="ctr"/>
-                      <a:r>
-                        <a:rPr lang="en-US" sz="1000" b="1" u="none" strike="noStrike" dirty="0" err="1">
-                          <a:effectLst/>
-                        </a:rPr>
-                        <a:t>xmeta</a:t>
-                      </a:r>
-                      <a:endParaRPr lang="en-US" sz="1000" b="1" i="0" u="none" strike="noStrike" dirty="0">
-                        <a:solidFill>
-                          <a:srgbClr val="000000"/>
-                        </a:solidFill>
-                        <a:effectLst/>
-                        <a:latin typeface="Calibri" panose="020F0502020204030204" pitchFamily="34" charset="0"/>
-                      </a:endParaRPr>
-                    </a:p>
-                  </a:txBody>
-                  <a:tcPr marL="5961" marR="5961" marT="5961" marB="0" anchor="ctr">
-                    <a:lnB w="12700" cap="flat" cmpd="sng" algn="ctr">
-                      <a:solidFill>
-                        <a:schemeClr val="tx1"/>
-                      </a:solidFill>
-                      <a:prstDash val="solid"/>
-                      <a:round/>
-                      <a:headEnd type="none" w="med" len="med"/>
-                      <a:tailEnd type="none" w="med" len="med"/>
-                    </a:lnB>
-                    <a:solidFill>
-                      <a:schemeClr val="bg1">
-                        <a:lumMod val="95000"/>
-                      </a:schemeClr>
-                    </a:solidFill>
-                  </a:tcPr>
-                </a:tc>
-                <a:tc>
-                  <a:txBody>
-                    <a:bodyPr/>
-                    <a:lstStyle/>
-                    <a:p>
-                      <a:pPr algn="ctr" fontAlgn="ctr"/>
-                      <a:r>
-                        <a:rPr lang="en-US" sz="1000" b="1" u="none" strike="noStrike" dirty="0">
-                          <a:effectLst/>
+                          <a:hlinkClick r:id="rId5"/>
                         </a:rPr>
                         <a:t>personalized</a:t>
                       </a:r>
@@ -3729,7 +5755,7 @@
                           <a:effectLst/>
                           <a:latin typeface="Calibri" panose="020F0502020204030204" pitchFamily="34" charset="0"/>
                         </a:rPr>
-                        <a:t>The package for estimating CATE across multiple studies, and for predicting the CATE in a target population of interest</a:t>
+                        <a:t>Estimates the CATE across multiple studies using machine learning techniques and predicts the CATE in a target population of interest</a:t>
                       </a:r>
                     </a:p>
                   </a:txBody>
@@ -3755,19 +5781,7 @@
                         <a:rPr lang="en-US" sz="1000" u="none" strike="noStrike" dirty="0">
                           <a:effectLst/>
                         </a:rPr>
-                        <a:t>The </a:t>
-                      </a:r>
-                      <a:r>
-                        <a:rPr lang="en-US" sz="1000" u="none" strike="noStrike" dirty="0" err="1">
-                          <a:effectLst/>
-                        </a:rPr>
-                        <a:t>causalmeta</a:t>
-                      </a:r>
-                      <a:r>
-                        <a:rPr lang="en-US" sz="1000" u="none" strike="noStrike" dirty="0">
-                          <a:effectLst/>
-                        </a:rPr>
-                        <a:t> package for Causally Interpretable Meta-Analysis provides robust and efficient methods for estimating causal effects in a target population using a multi-source dataset</a:t>
+                        <a:t>Provides robust and efficient methods for Causally Interpretable Meta-Analysis – estimating causal effects in a target population using a multi-source dataset </a:t>
                       </a:r>
                       <a:endParaRPr lang="en-US" sz="1000" b="0" i="0" u="none" strike="noStrike" dirty="0">
                         <a:solidFill>
@@ -3800,19 +5814,7 @@
                         <a:rPr lang="en-US" sz="1000" u="none" strike="noStrike" dirty="0">
                           <a:effectLst/>
                         </a:rPr>
-                        <a:t>The CATE package for High </a:t>
-                      </a:r>
-                      <a:r>
-                        <a:rPr lang="en-US" sz="1000" u="none" strike="noStrike" dirty="0" err="1">
-                          <a:effectLst/>
-                        </a:rPr>
-                        <a:t>Deimensional</a:t>
-                      </a:r>
-                      <a:r>
-                        <a:rPr lang="en-US" sz="1000" u="none" strike="noStrike" dirty="0">
-                          <a:effectLst/>
-                        </a:rPr>
-                        <a:t> Factor Analysis and Confounder Adjusted Multiple Testing in genome-wide data</a:t>
+                        <a:t>Integrates classification and regression trees (CART) into meta-analysis to identify interaction effects between moderators</a:t>
                       </a:r>
                       <a:endParaRPr lang="en-US" sz="1000" b="0" i="0" u="none" strike="noStrike" dirty="0">
                         <a:solidFill>
@@ -3845,75 +5847,9 @@
                         <a:rPr lang="en-US" sz="1000" u="none" strike="noStrike" dirty="0">
                           <a:effectLst/>
                         </a:rPr>
-                        <a:t>Meta-CART integrates classification and regression trees (CART) into meta-analysis</a:t>
+                        <a:t>Provides functions for fitting and validation of models for subgroup identification and personalized medicine / precision medicine</a:t>
                       </a:r>
                       <a:endParaRPr lang="en-US" sz="1000" b="0" i="0" u="none" strike="noStrike" dirty="0">
-                        <a:solidFill>
-                          <a:srgbClr val="000000"/>
-                        </a:solidFill>
-                        <a:effectLst/>
-                        <a:latin typeface="Calibri" panose="020F0502020204030204" pitchFamily="34" charset="0"/>
-                      </a:endParaRPr>
-                    </a:p>
-                  </a:txBody>
-                  <a:tcPr marL="5961" marR="5961" marT="5961" marB="0" anchor="ctr">
-                    <a:lnT w="12700" cap="flat" cmpd="sng" algn="ctr">
-                      <a:solidFill>
-                        <a:schemeClr val="tx1"/>
-                      </a:solidFill>
-                      <a:prstDash val="solid"/>
-                      <a:round/>
-                      <a:headEnd type="none" w="med" len="med"/>
-                      <a:tailEnd type="none" w="med" len="med"/>
-                    </a:lnT>
-                  </a:tcPr>
-                </a:tc>
-                <a:tc>
-                  <a:txBody>
-                    <a:bodyPr/>
-                    <a:lstStyle/>
-                    <a:p>
-                      <a:pPr algn="l" fontAlgn="ctr"/>
-                      <a:r>
-                        <a:rPr lang="en-US" sz="1000" u="none" strike="noStrike" dirty="0">
-                          <a:effectLst/>
-                        </a:rPr>
-                        <a:t>A toolbox for meta-analysis. This package includes: a robust multivariate meta-analysis of continuous or binary outcomes</a:t>
-                      </a:r>
-                      <a:endParaRPr lang="en-US" sz="1000" b="0" i="0" u="none" strike="noStrike" dirty="0">
-                        <a:solidFill>
-                          <a:srgbClr val="000000"/>
-                        </a:solidFill>
-                        <a:effectLst/>
-                        <a:latin typeface="Calibri" panose="020F0502020204030204" pitchFamily="34" charset="0"/>
-                      </a:endParaRPr>
-                    </a:p>
-                  </a:txBody>
-                  <a:tcPr marL="5961" marR="5961" marT="5961" marB="0" anchor="ctr">
-                    <a:lnT w="12700" cap="flat" cmpd="sng" algn="ctr">
-                      <a:solidFill>
-                        <a:schemeClr val="tx1"/>
-                      </a:solidFill>
-                      <a:prstDash val="solid"/>
-                      <a:round/>
-                      <a:headEnd type="none" w="med" len="med"/>
-                      <a:tailEnd type="none" w="med" len="med"/>
-                    </a:lnT>
-                  </a:tcPr>
-                </a:tc>
-                <a:tc>
-                  <a:txBody>
-                    <a:bodyPr/>
-                    <a:lstStyle/>
-                    <a:p>
-                      <a:pPr algn="l" fontAlgn="ctr"/>
-                      <a:r>
-                        <a:rPr lang="en-US" sz="1000" u="none" strike="noStrike">
-                          <a:effectLst/>
-                        </a:rPr>
-                        <a:t>The personalized provides functions for fitting and validation of models for subgroup identification and personalized medicine / precision medicine under the general subgroup identification framework </a:t>
-                      </a:r>
-                      <a:endParaRPr lang="en-US" sz="1000" b="0" i="0" u="none" strike="noStrike">
                         <a:solidFill>
                           <a:srgbClr val="000000"/>
                         </a:solidFill>
@@ -3941,1110 +5877,6 @@
                 </a:extLst>
               </a:tr>
               <a:tr h="125187">
-                <a:tc>
-                  <a:txBody>
-                    <a:bodyPr/>
-                    <a:lstStyle/>
-                    <a:p>
-                      <a:pPr algn="ctr" fontAlgn="ctr"/>
-                      <a:r>
-                        <a:rPr lang="en-US" sz="1000" u="none" strike="noStrike" dirty="0">
-                          <a:effectLst/>
-                        </a:rPr>
-                        <a:t>Specifically for Clinical data?</a:t>
-                      </a:r>
-                      <a:endParaRPr lang="en-US" sz="1000" b="0" i="0" u="none" strike="noStrike" dirty="0">
-                        <a:solidFill>
-                          <a:srgbClr val="000000"/>
-                        </a:solidFill>
-                        <a:effectLst/>
-                        <a:latin typeface="Calibri" panose="020F0502020204030204" pitchFamily="34" charset="0"/>
-                      </a:endParaRPr>
-                    </a:p>
-                  </a:txBody>
-                  <a:tcPr marL="5961" marR="5961" marT="5961" marB="0" anchor="ctr"/>
-                </a:tc>
-                <a:tc>
-                  <a:txBody>
-                    <a:bodyPr/>
-                    <a:lstStyle/>
-                    <a:p>
-                      <a:pPr marL="0" marR="0" lvl="0" indent="0" algn="ctr" defTabSz="914400" rtl="0" eaLnBrk="1" fontAlgn="ctr" latinLnBrk="0" hangingPunct="1">
-                        <a:lnSpc>
-                          <a:spcPct val="100000"/>
-                        </a:lnSpc>
-                        <a:spcBef>
-                          <a:spcPts val="0"/>
-                        </a:spcBef>
-                        <a:spcAft>
-                          <a:spcPts val="0"/>
-                        </a:spcAft>
-                        <a:buClrTx/>
-                        <a:buSzTx/>
-                        <a:buFontTx/>
-                        <a:buNone/>
-                        <a:tabLst/>
-                        <a:defRPr/>
-                      </a:pPr>
-                      <a:r>
-                        <a:rPr lang="en-US" sz="1000" u="none" strike="noStrike" dirty="0">
-                          <a:effectLst/>
-                        </a:rPr>
-                        <a:t>O</a:t>
-                      </a:r>
-                      <a:endParaRPr lang="en-US" sz="1000" b="0" i="0" u="none" strike="noStrike" dirty="0">
-                        <a:solidFill>
-                          <a:srgbClr val="000000"/>
-                        </a:solidFill>
-                        <a:effectLst/>
-                        <a:latin typeface="Calibri" panose="020F0502020204030204" pitchFamily="34" charset="0"/>
-                      </a:endParaRPr>
-                    </a:p>
-                  </a:txBody>
-                  <a:tcPr marL="5961" marR="5961" marT="5961" marB="0" anchor="ctr"/>
-                </a:tc>
-                <a:tc>
-                  <a:txBody>
-                    <a:bodyPr/>
-                    <a:lstStyle/>
-                    <a:p>
-                      <a:pPr algn="ctr" fontAlgn="ctr"/>
-                      <a:r>
-                        <a:rPr lang="en-US" sz="1000" u="none" strike="noStrike" dirty="0">
-                          <a:effectLst/>
-                        </a:rPr>
-                        <a:t>O</a:t>
-                      </a:r>
-                      <a:endParaRPr lang="en-US" sz="1000" b="0" i="0" u="none" strike="noStrike" dirty="0">
-                        <a:solidFill>
-                          <a:srgbClr val="000000"/>
-                        </a:solidFill>
-                        <a:effectLst/>
-                        <a:latin typeface="Calibri" panose="020F0502020204030204" pitchFamily="34" charset="0"/>
-                      </a:endParaRPr>
-                    </a:p>
-                  </a:txBody>
-                  <a:tcPr marL="5961" marR="5961" marT="5961" marB="0" anchor="ctr"/>
-                </a:tc>
-                <a:tc>
-                  <a:txBody>
-                    <a:bodyPr/>
-                    <a:lstStyle/>
-                    <a:p>
-                      <a:pPr algn="ctr" fontAlgn="ctr"/>
-                      <a:r>
-                        <a:rPr lang="en-US" sz="1000" u="none" strike="noStrike">
-                          <a:effectLst/>
-                        </a:rPr>
-                        <a:t>X</a:t>
-                      </a:r>
-                      <a:endParaRPr lang="en-US" sz="1000" b="0" i="0" u="none" strike="noStrike">
-                        <a:solidFill>
-                          <a:srgbClr val="000000"/>
-                        </a:solidFill>
-                        <a:effectLst/>
-                        <a:latin typeface="Calibri" panose="020F0502020204030204" pitchFamily="34" charset="0"/>
-                      </a:endParaRPr>
-                    </a:p>
-                  </a:txBody>
-                  <a:tcPr marL="5961" marR="5961" marT="5961" marB="0" anchor="ctr"/>
-                </a:tc>
-                <a:tc>
-                  <a:txBody>
-                    <a:bodyPr/>
-                    <a:lstStyle/>
-                    <a:p>
-                      <a:pPr algn="ctr" fontAlgn="ctr"/>
-                      <a:r>
-                        <a:rPr lang="en-US" sz="1000" u="none" strike="noStrike">
-                          <a:effectLst/>
-                        </a:rPr>
-                        <a:t>O</a:t>
-                      </a:r>
-                      <a:endParaRPr lang="en-US" sz="1000" b="0" i="0" u="none" strike="noStrike">
-                        <a:solidFill>
-                          <a:srgbClr val="000000"/>
-                        </a:solidFill>
-                        <a:effectLst/>
-                        <a:latin typeface="Calibri" panose="020F0502020204030204" pitchFamily="34" charset="0"/>
-                      </a:endParaRPr>
-                    </a:p>
-                  </a:txBody>
-                  <a:tcPr marL="5961" marR="5961" marT="5961" marB="0" anchor="ctr"/>
-                </a:tc>
-                <a:tc>
-                  <a:txBody>
-                    <a:bodyPr/>
-                    <a:lstStyle/>
-                    <a:p>
-                      <a:pPr algn="ctr" fontAlgn="ctr"/>
-                      <a:r>
-                        <a:rPr lang="en-US" sz="1000" u="none" strike="noStrike">
-                          <a:effectLst/>
-                        </a:rPr>
-                        <a:t>O</a:t>
-                      </a:r>
-                      <a:endParaRPr lang="en-US" sz="1000" b="0" i="0" u="none" strike="noStrike">
-                        <a:solidFill>
-                          <a:srgbClr val="000000"/>
-                        </a:solidFill>
-                        <a:effectLst/>
-                        <a:latin typeface="Calibri" panose="020F0502020204030204" pitchFamily="34" charset="0"/>
-                      </a:endParaRPr>
-                    </a:p>
-                  </a:txBody>
-                  <a:tcPr marL="5961" marR="5961" marT="5961" marB="0" anchor="ctr"/>
-                </a:tc>
-                <a:tc>
-                  <a:txBody>
-                    <a:bodyPr/>
-                    <a:lstStyle/>
-                    <a:p>
-                      <a:pPr algn="ctr" fontAlgn="ctr"/>
-                      <a:r>
-                        <a:rPr lang="en-US" sz="1000" u="none" strike="noStrike">
-                          <a:effectLst/>
-                        </a:rPr>
-                        <a:t>O</a:t>
-                      </a:r>
-                      <a:endParaRPr lang="en-US" sz="1000" b="0" i="0" u="none" strike="noStrike">
-                        <a:solidFill>
-                          <a:srgbClr val="000000"/>
-                        </a:solidFill>
-                        <a:effectLst/>
-                        <a:latin typeface="Calibri" panose="020F0502020204030204" pitchFamily="34" charset="0"/>
-                      </a:endParaRPr>
-                    </a:p>
-                  </a:txBody>
-                  <a:tcPr marL="5961" marR="5961" marT="5961" marB="0" anchor="ctr"/>
-                </a:tc>
-                <a:extLst>
-                  <a:ext uri="{0D108BD9-81ED-4DB2-BD59-A6C34878D82A}">
-                    <a16:rowId xmlns:a16="http://schemas.microsoft.com/office/drawing/2014/main" val="1156201414"/>
-                  </a:ext>
-                </a:extLst>
-              </a:tr>
-              <a:tr h="135917">
-                <a:tc>
-                  <a:txBody>
-                    <a:bodyPr/>
-                    <a:lstStyle/>
-                    <a:p>
-                      <a:pPr algn="ctr" fontAlgn="ctr"/>
-                      <a:r>
-                        <a:rPr lang="en-US" sz="1000" u="none" strike="noStrike">
-                          <a:effectLst/>
-                        </a:rPr>
-                        <a:t>Multiple Studies/sources?</a:t>
-                      </a:r>
-                      <a:endParaRPr lang="en-US" sz="1000" b="0" i="0" u="none" strike="noStrike">
-                        <a:solidFill>
-                          <a:srgbClr val="000000"/>
-                        </a:solidFill>
-                        <a:effectLst/>
-                        <a:latin typeface="Calibri" panose="020F0502020204030204" pitchFamily="34" charset="0"/>
-                      </a:endParaRPr>
-                    </a:p>
-                  </a:txBody>
-                  <a:tcPr marL="5961" marR="5961" marT="5961" marB="0" anchor="ctr"/>
-                </a:tc>
-                <a:tc>
-                  <a:txBody>
-                    <a:bodyPr/>
-                    <a:lstStyle/>
-                    <a:p>
-                      <a:pPr marL="0" marR="0" lvl="0" indent="0" algn="ctr" defTabSz="914400" rtl="0" eaLnBrk="1" fontAlgn="ctr" latinLnBrk="0" hangingPunct="1">
-                        <a:lnSpc>
-                          <a:spcPct val="100000"/>
-                        </a:lnSpc>
-                        <a:spcBef>
-                          <a:spcPts val="0"/>
-                        </a:spcBef>
-                        <a:spcAft>
-                          <a:spcPts val="0"/>
-                        </a:spcAft>
-                        <a:buClrTx/>
-                        <a:buSzTx/>
-                        <a:buFontTx/>
-                        <a:buNone/>
-                        <a:tabLst/>
-                        <a:defRPr/>
-                      </a:pPr>
-                      <a:r>
-                        <a:rPr lang="en-US" sz="1000" u="none" strike="noStrike" dirty="0">
-                          <a:effectLst/>
-                        </a:rPr>
-                        <a:t>O</a:t>
-                      </a:r>
-                      <a:endParaRPr lang="en-US" sz="1000" b="0" i="0" u="none" strike="noStrike" dirty="0">
-                        <a:solidFill>
-                          <a:srgbClr val="000000"/>
-                        </a:solidFill>
-                        <a:effectLst/>
-                        <a:latin typeface="Calibri" panose="020F0502020204030204" pitchFamily="34" charset="0"/>
-                      </a:endParaRPr>
-                    </a:p>
-                  </a:txBody>
-                  <a:tcPr marL="5961" marR="5961" marT="5961" marB="0" anchor="ctr"/>
-                </a:tc>
-                <a:tc>
-                  <a:txBody>
-                    <a:bodyPr/>
-                    <a:lstStyle/>
-                    <a:p>
-                      <a:pPr algn="ctr" fontAlgn="ctr"/>
-                      <a:r>
-                        <a:rPr lang="en-US" sz="1000" u="none" strike="noStrike">
-                          <a:effectLst/>
-                        </a:rPr>
-                        <a:t>O</a:t>
-                      </a:r>
-                      <a:endParaRPr lang="en-US" sz="1000" b="0" i="0" u="none" strike="noStrike">
-                        <a:solidFill>
-                          <a:srgbClr val="000000"/>
-                        </a:solidFill>
-                        <a:effectLst/>
-                        <a:latin typeface="Calibri" panose="020F0502020204030204" pitchFamily="34" charset="0"/>
-                      </a:endParaRPr>
-                    </a:p>
-                  </a:txBody>
-                  <a:tcPr marL="5961" marR="5961" marT="5961" marB="0" anchor="ctr"/>
-                </a:tc>
-                <a:tc>
-                  <a:txBody>
-                    <a:bodyPr/>
-                    <a:lstStyle/>
-                    <a:p>
-                      <a:pPr algn="ctr" fontAlgn="ctr"/>
-                      <a:r>
-                        <a:rPr lang="en-US" sz="1000" u="none" strike="noStrike">
-                          <a:effectLst/>
-                        </a:rPr>
-                        <a:t>X</a:t>
-                      </a:r>
-                      <a:endParaRPr lang="en-US" sz="1000" b="0" i="0" u="none" strike="noStrike">
-                        <a:solidFill>
-                          <a:srgbClr val="000000"/>
-                        </a:solidFill>
-                        <a:effectLst/>
-                        <a:latin typeface="Calibri" panose="020F0502020204030204" pitchFamily="34" charset="0"/>
-                      </a:endParaRPr>
-                    </a:p>
-                  </a:txBody>
-                  <a:tcPr marL="5961" marR="5961" marT="5961" marB="0" anchor="ctr"/>
-                </a:tc>
-                <a:tc>
-                  <a:txBody>
-                    <a:bodyPr/>
-                    <a:lstStyle/>
-                    <a:p>
-                      <a:pPr algn="ctr" fontAlgn="ctr"/>
-                      <a:r>
-                        <a:rPr lang="en-US" sz="1000" u="none" strike="noStrike">
-                          <a:effectLst/>
-                        </a:rPr>
-                        <a:t>O</a:t>
-                      </a:r>
-                      <a:endParaRPr lang="en-US" sz="1000" b="0" i="0" u="none" strike="noStrike">
-                        <a:solidFill>
-                          <a:srgbClr val="000000"/>
-                        </a:solidFill>
-                        <a:effectLst/>
-                        <a:latin typeface="Calibri" panose="020F0502020204030204" pitchFamily="34" charset="0"/>
-                      </a:endParaRPr>
-                    </a:p>
-                  </a:txBody>
-                  <a:tcPr marL="5961" marR="5961" marT="5961" marB="0" anchor="ctr"/>
-                </a:tc>
-                <a:tc>
-                  <a:txBody>
-                    <a:bodyPr/>
-                    <a:lstStyle/>
-                    <a:p>
-                      <a:pPr algn="ctr" fontAlgn="ctr"/>
-                      <a:r>
-                        <a:rPr lang="en-US" sz="1000" u="none" strike="noStrike" dirty="0">
-                          <a:effectLst/>
-                        </a:rPr>
-                        <a:t>O</a:t>
-                      </a:r>
-                      <a:endParaRPr lang="en-US" sz="1000" b="0" i="0" u="none" strike="noStrike" dirty="0">
-                        <a:solidFill>
-                          <a:srgbClr val="000000"/>
-                        </a:solidFill>
-                        <a:effectLst/>
-                        <a:latin typeface="Calibri" panose="020F0502020204030204" pitchFamily="34" charset="0"/>
-                      </a:endParaRPr>
-                    </a:p>
-                  </a:txBody>
-                  <a:tcPr marL="5961" marR="5961" marT="5961" marB="0" anchor="ctr"/>
-                </a:tc>
-                <a:tc>
-                  <a:txBody>
-                    <a:bodyPr/>
-                    <a:lstStyle/>
-                    <a:p>
-                      <a:pPr algn="ctr" fontAlgn="ctr"/>
-                      <a:r>
-                        <a:rPr lang="en-US" sz="1000" u="none" strike="noStrike">
-                          <a:effectLst/>
-                        </a:rPr>
-                        <a:t>X</a:t>
-                      </a:r>
-                      <a:endParaRPr lang="en-US" sz="1000" b="0" i="0" u="none" strike="noStrike">
-                        <a:solidFill>
-                          <a:srgbClr val="000000"/>
-                        </a:solidFill>
-                        <a:effectLst/>
-                        <a:latin typeface="Calibri" panose="020F0502020204030204" pitchFamily="34" charset="0"/>
-                      </a:endParaRPr>
-                    </a:p>
-                  </a:txBody>
-                  <a:tcPr marL="5961" marR="5961" marT="5961" marB="0" anchor="ctr"/>
-                </a:tc>
-                <a:extLst>
-                  <a:ext uri="{0D108BD9-81ED-4DB2-BD59-A6C34878D82A}">
-                    <a16:rowId xmlns:a16="http://schemas.microsoft.com/office/drawing/2014/main" val="2439688353"/>
-                  </a:ext>
-                </a:extLst>
-              </a:tr>
-              <a:tr h="135917">
-                <a:tc>
-                  <a:txBody>
-                    <a:bodyPr/>
-                    <a:lstStyle/>
-                    <a:p>
-                      <a:pPr algn="ctr" fontAlgn="ctr"/>
-                      <a:r>
-                        <a:rPr lang="en-US" sz="1000" u="none" strike="noStrike">
-                          <a:effectLst/>
-                        </a:rPr>
-                        <a:t>Heterogeneity?</a:t>
-                      </a:r>
-                      <a:endParaRPr lang="en-US" sz="1000" b="0" i="0" u="none" strike="noStrike">
-                        <a:solidFill>
-                          <a:srgbClr val="000000"/>
-                        </a:solidFill>
-                        <a:effectLst/>
-                        <a:latin typeface="Calibri" panose="020F0502020204030204" pitchFamily="34" charset="0"/>
-                      </a:endParaRPr>
-                    </a:p>
-                  </a:txBody>
-                  <a:tcPr marL="5961" marR="5961" marT="5961" marB="0" anchor="ctr"/>
-                </a:tc>
-                <a:tc>
-                  <a:txBody>
-                    <a:bodyPr/>
-                    <a:lstStyle/>
-                    <a:p>
-                      <a:pPr marL="0" marR="0" lvl="0" indent="0" algn="ctr" defTabSz="914400" rtl="0" eaLnBrk="1" fontAlgn="ctr" latinLnBrk="0" hangingPunct="1">
-                        <a:lnSpc>
-                          <a:spcPct val="100000"/>
-                        </a:lnSpc>
-                        <a:spcBef>
-                          <a:spcPts val="0"/>
-                        </a:spcBef>
-                        <a:spcAft>
-                          <a:spcPts val="0"/>
-                        </a:spcAft>
-                        <a:buClrTx/>
-                        <a:buSzTx/>
-                        <a:buFontTx/>
-                        <a:buNone/>
-                        <a:tabLst/>
-                        <a:defRPr/>
-                      </a:pPr>
-                      <a:r>
-                        <a:rPr lang="en-US" sz="1000" u="none" strike="noStrike" dirty="0">
-                          <a:effectLst/>
-                        </a:rPr>
-                        <a:t>O</a:t>
-                      </a:r>
-                      <a:endParaRPr lang="en-US" sz="1000" b="0" i="0" u="none" strike="noStrike" dirty="0">
-                        <a:solidFill>
-                          <a:srgbClr val="000000"/>
-                        </a:solidFill>
-                        <a:effectLst/>
-                        <a:latin typeface="Calibri" panose="020F0502020204030204" pitchFamily="34" charset="0"/>
-                      </a:endParaRPr>
-                    </a:p>
-                  </a:txBody>
-                  <a:tcPr marL="5961" marR="5961" marT="5961" marB="0" anchor="ctr"/>
-                </a:tc>
-                <a:tc>
-                  <a:txBody>
-                    <a:bodyPr/>
-                    <a:lstStyle/>
-                    <a:p>
-                      <a:pPr algn="ctr" fontAlgn="ctr"/>
-                      <a:r>
-                        <a:rPr lang="en-US" sz="1000" u="none" strike="noStrike">
-                          <a:effectLst/>
-                        </a:rPr>
-                        <a:t>O</a:t>
-                      </a:r>
-                      <a:endParaRPr lang="en-US" sz="1000" b="0" i="0" u="none" strike="noStrike">
-                        <a:solidFill>
-                          <a:srgbClr val="000000"/>
-                        </a:solidFill>
-                        <a:effectLst/>
-                        <a:latin typeface="Calibri" panose="020F0502020204030204" pitchFamily="34" charset="0"/>
-                      </a:endParaRPr>
-                    </a:p>
-                  </a:txBody>
-                  <a:tcPr marL="5961" marR="5961" marT="5961" marB="0" anchor="ctr"/>
-                </a:tc>
-                <a:tc>
-                  <a:txBody>
-                    <a:bodyPr/>
-                    <a:lstStyle/>
-                    <a:p>
-                      <a:pPr algn="ctr" fontAlgn="ctr"/>
-                      <a:r>
-                        <a:rPr lang="en-US" sz="1000" u="none" strike="noStrike">
-                          <a:effectLst/>
-                        </a:rPr>
-                        <a:t>O</a:t>
-                      </a:r>
-                      <a:endParaRPr lang="en-US" sz="1000" b="0" i="0" u="none" strike="noStrike">
-                        <a:solidFill>
-                          <a:srgbClr val="000000"/>
-                        </a:solidFill>
-                        <a:effectLst/>
-                        <a:latin typeface="Calibri" panose="020F0502020204030204" pitchFamily="34" charset="0"/>
-                      </a:endParaRPr>
-                    </a:p>
-                  </a:txBody>
-                  <a:tcPr marL="5961" marR="5961" marT="5961" marB="0" anchor="ctr"/>
-                </a:tc>
-                <a:tc>
-                  <a:txBody>
-                    <a:bodyPr/>
-                    <a:lstStyle/>
-                    <a:p>
-                      <a:pPr algn="ctr" fontAlgn="ctr"/>
-                      <a:r>
-                        <a:rPr lang="en-US" sz="1000" u="none" strike="noStrike">
-                          <a:effectLst/>
-                        </a:rPr>
-                        <a:t>O</a:t>
-                      </a:r>
-                      <a:endParaRPr lang="en-US" sz="1000" b="0" i="0" u="none" strike="noStrike">
-                        <a:solidFill>
-                          <a:srgbClr val="000000"/>
-                        </a:solidFill>
-                        <a:effectLst/>
-                        <a:latin typeface="Calibri" panose="020F0502020204030204" pitchFamily="34" charset="0"/>
-                      </a:endParaRPr>
-                    </a:p>
-                  </a:txBody>
-                  <a:tcPr marL="5961" marR="5961" marT="5961" marB="0" anchor="ctr"/>
-                </a:tc>
-                <a:tc>
-                  <a:txBody>
-                    <a:bodyPr/>
-                    <a:lstStyle/>
-                    <a:p>
-                      <a:pPr algn="ctr" fontAlgn="ctr"/>
-                      <a:r>
-                        <a:rPr lang="en-US" sz="1000" u="none" strike="noStrike">
-                          <a:effectLst/>
-                        </a:rPr>
-                        <a:t>O</a:t>
-                      </a:r>
-                      <a:endParaRPr lang="en-US" sz="1000" b="0" i="0" u="none" strike="noStrike">
-                        <a:solidFill>
-                          <a:srgbClr val="000000"/>
-                        </a:solidFill>
-                        <a:effectLst/>
-                        <a:latin typeface="Calibri" panose="020F0502020204030204" pitchFamily="34" charset="0"/>
-                      </a:endParaRPr>
-                    </a:p>
-                  </a:txBody>
-                  <a:tcPr marL="5961" marR="5961" marT="5961" marB="0" anchor="ctr"/>
-                </a:tc>
-                <a:tc>
-                  <a:txBody>
-                    <a:bodyPr/>
-                    <a:lstStyle/>
-                    <a:p>
-                      <a:pPr algn="ctr" fontAlgn="ctr"/>
-                      <a:r>
-                        <a:rPr lang="en-US" sz="1000" u="none" strike="noStrike">
-                          <a:effectLst/>
-                        </a:rPr>
-                        <a:t>O</a:t>
-                      </a:r>
-                      <a:endParaRPr lang="en-US" sz="1000" b="0" i="0" u="none" strike="noStrike">
-                        <a:solidFill>
-                          <a:srgbClr val="000000"/>
-                        </a:solidFill>
-                        <a:effectLst/>
-                        <a:latin typeface="Calibri" panose="020F0502020204030204" pitchFamily="34" charset="0"/>
-                      </a:endParaRPr>
-                    </a:p>
-                  </a:txBody>
-                  <a:tcPr marL="5961" marR="5961" marT="5961" marB="0" anchor="ctr"/>
-                </a:tc>
-                <a:extLst>
-                  <a:ext uri="{0D108BD9-81ED-4DB2-BD59-A6C34878D82A}">
-                    <a16:rowId xmlns:a16="http://schemas.microsoft.com/office/drawing/2014/main" val="2552288758"/>
-                  </a:ext>
-                </a:extLst>
-              </a:tr>
-              <a:tr h="126777">
-                <a:tc>
-                  <a:txBody>
-                    <a:bodyPr/>
-                    <a:lstStyle/>
-                    <a:p>
-                      <a:pPr algn="ctr" fontAlgn="ctr"/>
-                      <a:r>
-                        <a:rPr lang="en-US" sz="1000" u="none" strike="noStrike" dirty="0">
-                          <a:effectLst/>
-                        </a:rPr>
-                        <a:t>Individual traits (IPD)?</a:t>
-                      </a:r>
-                      <a:endParaRPr lang="en-US" sz="1000" b="0" i="0" u="none" strike="noStrike" dirty="0">
-                        <a:solidFill>
-                          <a:srgbClr val="000000"/>
-                        </a:solidFill>
-                        <a:effectLst/>
-                        <a:latin typeface="Calibri" panose="020F0502020204030204" pitchFamily="34" charset="0"/>
-                      </a:endParaRPr>
-                    </a:p>
-                  </a:txBody>
-                  <a:tcPr marL="5961" marR="5961" marT="5961" marB="0" anchor="ctr"/>
-                </a:tc>
-                <a:tc>
-                  <a:txBody>
-                    <a:bodyPr/>
-                    <a:lstStyle/>
-                    <a:p>
-                      <a:pPr marL="0" marR="0" lvl="0" indent="0" algn="ctr" defTabSz="914400" rtl="0" eaLnBrk="1" fontAlgn="ctr" latinLnBrk="0" hangingPunct="1">
-                        <a:lnSpc>
-                          <a:spcPct val="100000"/>
-                        </a:lnSpc>
-                        <a:spcBef>
-                          <a:spcPts val="0"/>
-                        </a:spcBef>
-                        <a:spcAft>
-                          <a:spcPts val="0"/>
-                        </a:spcAft>
-                        <a:buClrTx/>
-                        <a:buSzTx/>
-                        <a:buFontTx/>
-                        <a:buNone/>
-                        <a:tabLst/>
-                        <a:defRPr/>
-                      </a:pPr>
-                      <a:r>
-                        <a:rPr lang="en-US" sz="1000" u="none" strike="noStrike" dirty="0">
-                          <a:effectLst/>
-                        </a:rPr>
-                        <a:t>O</a:t>
-                      </a:r>
-                      <a:endParaRPr lang="en-US" sz="1000" b="0" i="0" u="none" strike="noStrike" dirty="0">
-                        <a:solidFill>
-                          <a:srgbClr val="000000"/>
-                        </a:solidFill>
-                        <a:effectLst/>
-                        <a:latin typeface="Calibri" panose="020F0502020204030204" pitchFamily="34" charset="0"/>
-                      </a:endParaRPr>
-                    </a:p>
-                  </a:txBody>
-                  <a:tcPr marL="5961" marR="5961" marT="5961" marB="0" anchor="ctr"/>
-                </a:tc>
-                <a:tc>
-                  <a:txBody>
-                    <a:bodyPr/>
-                    <a:lstStyle/>
-                    <a:p>
-                      <a:pPr algn="ctr" fontAlgn="ctr"/>
-                      <a:r>
-                        <a:rPr lang="en-US" sz="1000" u="none" strike="noStrike">
-                          <a:effectLst/>
-                        </a:rPr>
-                        <a:t>O</a:t>
-                      </a:r>
-                      <a:endParaRPr lang="en-US" sz="1000" b="0" i="0" u="none" strike="noStrike">
-                        <a:solidFill>
-                          <a:srgbClr val="000000"/>
-                        </a:solidFill>
-                        <a:effectLst/>
-                        <a:latin typeface="Calibri" panose="020F0502020204030204" pitchFamily="34" charset="0"/>
-                      </a:endParaRPr>
-                    </a:p>
-                  </a:txBody>
-                  <a:tcPr marL="5961" marR="5961" marT="5961" marB="0" anchor="ctr"/>
-                </a:tc>
-                <a:tc>
-                  <a:txBody>
-                    <a:bodyPr/>
-                    <a:lstStyle/>
-                    <a:p>
-                      <a:pPr algn="ctr" fontAlgn="ctr"/>
-                      <a:r>
-                        <a:rPr lang="en-US" sz="1000" u="none" strike="noStrike">
-                          <a:effectLst/>
-                        </a:rPr>
-                        <a:t>O</a:t>
-                      </a:r>
-                      <a:endParaRPr lang="en-US" sz="1000" b="0" i="0" u="none" strike="noStrike">
-                        <a:solidFill>
-                          <a:srgbClr val="000000"/>
-                        </a:solidFill>
-                        <a:effectLst/>
-                        <a:latin typeface="Calibri" panose="020F0502020204030204" pitchFamily="34" charset="0"/>
-                      </a:endParaRPr>
-                    </a:p>
-                  </a:txBody>
-                  <a:tcPr marL="5961" marR="5961" marT="5961" marB="0" anchor="ctr"/>
-                </a:tc>
-                <a:tc>
-                  <a:txBody>
-                    <a:bodyPr/>
-                    <a:lstStyle/>
-                    <a:p>
-                      <a:pPr algn="ctr" fontAlgn="ctr"/>
-                      <a:r>
-                        <a:rPr lang="en-US" sz="1000" u="none" strike="noStrike" dirty="0">
-                          <a:effectLst/>
-                        </a:rPr>
-                        <a:t>X</a:t>
-                      </a:r>
-                      <a:endParaRPr lang="en-US" sz="1000" b="0" i="0" u="none" strike="noStrike" dirty="0">
-                        <a:solidFill>
-                          <a:srgbClr val="000000"/>
-                        </a:solidFill>
-                        <a:effectLst/>
-                        <a:latin typeface="Calibri" panose="020F0502020204030204" pitchFamily="34" charset="0"/>
-                      </a:endParaRPr>
-                    </a:p>
-                  </a:txBody>
-                  <a:tcPr marL="5961" marR="5961" marT="5961" marB="0" anchor="ctr"/>
-                </a:tc>
-                <a:tc>
-                  <a:txBody>
-                    <a:bodyPr/>
-                    <a:lstStyle/>
-                    <a:p>
-                      <a:pPr algn="ctr" fontAlgn="ctr"/>
-                      <a:r>
-                        <a:rPr lang="en-US" sz="1000" u="none" strike="noStrike" dirty="0">
-                          <a:effectLst/>
-                        </a:rPr>
-                        <a:t>X</a:t>
-                      </a:r>
-                      <a:endParaRPr lang="en-US" sz="1000" b="0" i="0" u="none" strike="noStrike" dirty="0">
-                        <a:solidFill>
-                          <a:srgbClr val="000000"/>
-                        </a:solidFill>
-                        <a:effectLst/>
-                        <a:latin typeface="Calibri" panose="020F0502020204030204" pitchFamily="34" charset="0"/>
-                      </a:endParaRPr>
-                    </a:p>
-                  </a:txBody>
-                  <a:tcPr marL="5961" marR="5961" marT="5961" marB="0" anchor="ctr"/>
-                </a:tc>
-                <a:tc>
-                  <a:txBody>
-                    <a:bodyPr/>
-                    <a:lstStyle/>
-                    <a:p>
-                      <a:pPr algn="ctr" fontAlgn="ctr"/>
-                      <a:r>
-                        <a:rPr lang="en-US" sz="1000" u="none" strike="noStrike">
-                          <a:effectLst/>
-                        </a:rPr>
-                        <a:t>O</a:t>
-                      </a:r>
-                      <a:endParaRPr lang="en-US" sz="1000" b="0" i="0" u="none" strike="noStrike">
-                        <a:solidFill>
-                          <a:srgbClr val="000000"/>
-                        </a:solidFill>
-                        <a:effectLst/>
-                        <a:latin typeface="Calibri" panose="020F0502020204030204" pitchFamily="34" charset="0"/>
-                      </a:endParaRPr>
-                    </a:p>
-                  </a:txBody>
-                  <a:tcPr marL="5961" marR="5961" marT="5961" marB="0" anchor="ctr"/>
-                </a:tc>
-                <a:extLst>
-                  <a:ext uri="{0D108BD9-81ED-4DB2-BD59-A6C34878D82A}">
-                    <a16:rowId xmlns:a16="http://schemas.microsoft.com/office/drawing/2014/main" val="56072606"/>
-                  </a:ext>
-                </a:extLst>
-              </a:tr>
-              <a:tr h="126777">
-                <a:tc>
-                  <a:txBody>
-                    <a:bodyPr/>
-                    <a:lstStyle/>
-                    <a:p>
-                      <a:pPr algn="ctr" fontAlgn="ctr"/>
-                      <a:r>
-                        <a:rPr lang="en-US" sz="1000" u="none" strike="noStrike">
-                          <a:effectLst/>
-                        </a:rPr>
-                        <a:t>Estimation of CATE?</a:t>
-                      </a:r>
-                      <a:endParaRPr lang="en-US" sz="1000" b="0" i="0" u="none" strike="noStrike">
-                        <a:solidFill>
-                          <a:srgbClr val="000000"/>
-                        </a:solidFill>
-                        <a:effectLst/>
-                        <a:latin typeface="Calibri" panose="020F0502020204030204" pitchFamily="34" charset="0"/>
-                      </a:endParaRPr>
-                    </a:p>
-                  </a:txBody>
-                  <a:tcPr marL="5961" marR="5961" marT="5961" marB="0" anchor="ctr"/>
-                </a:tc>
-                <a:tc>
-                  <a:txBody>
-                    <a:bodyPr/>
-                    <a:lstStyle/>
-                    <a:p>
-                      <a:pPr marL="0" marR="0" lvl="0" indent="0" algn="ctr" defTabSz="914400" rtl="0" eaLnBrk="1" fontAlgn="ctr" latinLnBrk="0" hangingPunct="1">
-                        <a:lnSpc>
-                          <a:spcPct val="100000"/>
-                        </a:lnSpc>
-                        <a:spcBef>
-                          <a:spcPts val="0"/>
-                        </a:spcBef>
-                        <a:spcAft>
-                          <a:spcPts val="0"/>
-                        </a:spcAft>
-                        <a:buClrTx/>
-                        <a:buSzTx/>
-                        <a:buFontTx/>
-                        <a:buNone/>
-                        <a:tabLst/>
-                        <a:defRPr/>
-                      </a:pPr>
-                      <a:r>
-                        <a:rPr lang="en-US" sz="1000" u="none" strike="noStrike" dirty="0">
-                          <a:effectLst/>
-                        </a:rPr>
-                        <a:t>O</a:t>
-                      </a:r>
-                      <a:endParaRPr lang="en-US" sz="1000" b="0" i="0" u="none" strike="noStrike" dirty="0">
-                        <a:solidFill>
-                          <a:srgbClr val="000000"/>
-                        </a:solidFill>
-                        <a:effectLst/>
-                        <a:latin typeface="Calibri" panose="020F0502020204030204" pitchFamily="34" charset="0"/>
-                      </a:endParaRPr>
-                    </a:p>
-                  </a:txBody>
-                  <a:tcPr marL="5961" marR="5961" marT="5961" marB="0" anchor="ctr"/>
-                </a:tc>
-                <a:tc>
-                  <a:txBody>
-                    <a:bodyPr/>
-                    <a:lstStyle/>
-                    <a:p>
-                      <a:pPr algn="ctr" fontAlgn="ctr"/>
-                      <a:r>
-                        <a:rPr lang="en-US" sz="1000" u="none" strike="noStrike">
-                          <a:effectLst/>
-                        </a:rPr>
-                        <a:t>X</a:t>
-                      </a:r>
-                      <a:endParaRPr lang="en-US" sz="1000" b="0" i="0" u="none" strike="noStrike">
-                        <a:solidFill>
-                          <a:srgbClr val="000000"/>
-                        </a:solidFill>
-                        <a:effectLst/>
-                        <a:latin typeface="Calibri" panose="020F0502020204030204" pitchFamily="34" charset="0"/>
-                      </a:endParaRPr>
-                    </a:p>
-                  </a:txBody>
-                  <a:tcPr marL="5961" marR="5961" marT="5961" marB="0" anchor="ctr"/>
-                </a:tc>
-                <a:tc>
-                  <a:txBody>
-                    <a:bodyPr/>
-                    <a:lstStyle/>
-                    <a:p>
-                      <a:pPr algn="ctr" fontAlgn="ctr"/>
-                      <a:r>
-                        <a:rPr lang="en-US" sz="1000" u="none" strike="noStrike">
-                          <a:effectLst/>
-                        </a:rPr>
-                        <a:t>X</a:t>
-                      </a:r>
-                      <a:endParaRPr lang="en-US" sz="1000" b="0" i="0" u="none" strike="noStrike">
-                        <a:solidFill>
-                          <a:srgbClr val="000000"/>
-                        </a:solidFill>
-                        <a:effectLst/>
-                        <a:latin typeface="Calibri" panose="020F0502020204030204" pitchFamily="34" charset="0"/>
-                      </a:endParaRPr>
-                    </a:p>
-                  </a:txBody>
-                  <a:tcPr marL="5961" marR="5961" marT="5961" marB="0" anchor="ctr"/>
-                </a:tc>
-                <a:tc>
-                  <a:txBody>
-                    <a:bodyPr/>
-                    <a:lstStyle/>
-                    <a:p>
-                      <a:pPr algn="ctr" fontAlgn="ctr"/>
-                      <a:r>
-                        <a:rPr lang="en-US" sz="1000" u="none" strike="noStrike">
-                          <a:effectLst/>
-                        </a:rPr>
-                        <a:t>X</a:t>
-                      </a:r>
-                      <a:endParaRPr lang="en-US" sz="1000" b="0" i="0" u="none" strike="noStrike">
-                        <a:solidFill>
-                          <a:srgbClr val="000000"/>
-                        </a:solidFill>
-                        <a:effectLst/>
-                        <a:latin typeface="Calibri" panose="020F0502020204030204" pitchFamily="34" charset="0"/>
-                      </a:endParaRPr>
-                    </a:p>
-                  </a:txBody>
-                  <a:tcPr marL="5961" marR="5961" marT="5961" marB="0" anchor="ctr"/>
-                </a:tc>
-                <a:tc>
-                  <a:txBody>
-                    <a:bodyPr/>
-                    <a:lstStyle/>
-                    <a:p>
-                      <a:pPr algn="ctr" fontAlgn="ctr"/>
-                      <a:r>
-                        <a:rPr lang="en-US" sz="1000" u="none" strike="noStrike">
-                          <a:effectLst/>
-                        </a:rPr>
-                        <a:t>X</a:t>
-                      </a:r>
-                      <a:endParaRPr lang="en-US" sz="1000" b="0" i="0" u="none" strike="noStrike">
-                        <a:solidFill>
-                          <a:srgbClr val="000000"/>
-                        </a:solidFill>
-                        <a:effectLst/>
-                        <a:latin typeface="Calibri" panose="020F0502020204030204" pitchFamily="34" charset="0"/>
-                      </a:endParaRPr>
-                    </a:p>
-                  </a:txBody>
-                  <a:tcPr marL="5961" marR="5961" marT="5961" marB="0" anchor="ctr"/>
-                </a:tc>
-                <a:tc>
-                  <a:txBody>
-                    <a:bodyPr/>
-                    <a:lstStyle/>
-                    <a:p>
-                      <a:pPr algn="ctr" fontAlgn="ctr"/>
-                      <a:r>
-                        <a:rPr lang="en-US" sz="1000" u="none" strike="noStrike">
-                          <a:effectLst/>
-                        </a:rPr>
-                        <a:t>O</a:t>
-                      </a:r>
-                      <a:endParaRPr lang="en-US" sz="1000" b="0" i="0" u="none" strike="noStrike">
-                        <a:solidFill>
-                          <a:srgbClr val="000000"/>
-                        </a:solidFill>
-                        <a:effectLst/>
-                        <a:latin typeface="Calibri" panose="020F0502020204030204" pitchFamily="34" charset="0"/>
-                      </a:endParaRPr>
-                    </a:p>
-                  </a:txBody>
-                  <a:tcPr marL="5961" marR="5961" marT="5961" marB="0" anchor="ctr"/>
-                </a:tc>
-                <a:extLst>
-                  <a:ext uri="{0D108BD9-81ED-4DB2-BD59-A6C34878D82A}">
-                    <a16:rowId xmlns:a16="http://schemas.microsoft.com/office/drawing/2014/main" val="3209275298"/>
-                  </a:ext>
-                </a:extLst>
-              </a:tr>
-              <a:tr h="125187">
-                <a:tc>
-                  <a:txBody>
-                    <a:bodyPr/>
-                    <a:lstStyle/>
-                    <a:p>
-                      <a:pPr algn="ctr" fontAlgn="ctr"/>
-                      <a:r>
-                        <a:rPr lang="en-US" sz="1000" u="none" strike="noStrike">
-                          <a:effectLst/>
-                        </a:rPr>
-                        <a:t>Prediction of CATE?</a:t>
-                      </a:r>
-                      <a:endParaRPr lang="en-US" sz="1000" b="0" i="0" u="none" strike="noStrike">
-                        <a:solidFill>
-                          <a:srgbClr val="000000"/>
-                        </a:solidFill>
-                        <a:effectLst/>
-                        <a:latin typeface="Calibri" panose="020F0502020204030204" pitchFamily="34" charset="0"/>
-                      </a:endParaRPr>
-                    </a:p>
-                  </a:txBody>
-                  <a:tcPr marL="5961" marR="5961" marT="5961" marB="0" anchor="ctr"/>
-                </a:tc>
-                <a:tc>
-                  <a:txBody>
-                    <a:bodyPr/>
-                    <a:lstStyle/>
-                    <a:p>
-                      <a:pPr marL="0" marR="0" lvl="0" indent="0" algn="ctr" defTabSz="914400" rtl="0" eaLnBrk="1" fontAlgn="ctr" latinLnBrk="0" hangingPunct="1">
-                        <a:lnSpc>
-                          <a:spcPct val="100000"/>
-                        </a:lnSpc>
-                        <a:spcBef>
-                          <a:spcPts val="0"/>
-                        </a:spcBef>
-                        <a:spcAft>
-                          <a:spcPts val="0"/>
-                        </a:spcAft>
-                        <a:buClrTx/>
-                        <a:buSzTx/>
-                        <a:buFontTx/>
-                        <a:buNone/>
-                        <a:tabLst/>
-                        <a:defRPr/>
-                      </a:pPr>
-                      <a:r>
-                        <a:rPr lang="en-US" sz="1000" u="none" strike="noStrike" dirty="0">
-                          <a:effectLst/>
-                        </a:rPr>
-                        <a:t>O</a:t>
-                      </a:r>
-                      <a:endParaRPr lang="en-US" sz="1000" b="0" i="0" u="none" strike="noStrike" dirty="0">
-                        <a:solidFill>
-                          <a:srgbClr val="000000"/>
-                        </a:solidFill>
-                        <a:effectLst/>
-                        <a:latin typeface="Calibri" panose="020F0502020204030204" pitchFamily="34" charset="0"/>
-                      </a:endParaRPr>
-                    </a:p>
-                  </a:txBody>
-                  <a:tcPr marL="5961" marR="5961" marT="5961" marB="0" anchor="ctr"/>
-                </a:tc>
-                <a:tc>
-                  <a:txBody>
-                    <a:bodyPr/>
-                    <a:lstStyle/>
-                    <a:p>
-                      <a:pPr algn="ctr" fontAlgn="ctr"/>
-                      <a:r>
-                        <a:rPr lang="en-US" sz="1000" u="none" strike="noStrike">
-                          <a:effectLst/>
-                        </a:rPr>
-                        <a:t>X</a:t>
-                      </a:r>
-                      <a:endParaRPr lang="en-US" sz="1000" b="0" i="0" u="none" strike="noStrike">
-                        <a:solidFill>
-                          <a:srgbClr val="000000"/>
-                        </a:solidFill>
-                        <a:effectLst/>
-                        <a:latin typeface="Calibri" panose="020F0502020204030204" pitchFamily="34" charset="0"/>
-                      </a:endParaRPr>
-                    </a:p>
-                  </a:txBody>
-                  <a:tcPr marL="5961" marR="5961" marT="5961" marB="0" anchor="ctr"/>
-                </a:tc>
-                <a:tc>
-                  <a:txBody>
-                    <a:bodyPr/>
-                    <a:lstStyle/>
-                    <a:p>
-                      <a:pPr algn="ctr" fontAlgn="ctr"/>
-                      <a:r>
-                        <a:rPr lang="en-US" sz="1000" u="none" strike="noStrike">
-                          <a:effectLst/>
-                        </a:rPr>
-                        <a:t>X</a:t>
-                      </a:r>
-                      <a:endParaRPr lang="en-US" sz="1000" b="0" i="0" u="none" strike="noStrike">
-                        <a:solidFill>
-                          <a:srgbClr val="000000"/>
-                        </a:solidFill>
-                        <a:effectLst/>
-                        <a:latin typeface="Calibri" panose="020F0502020204030204" pitchFamily="34" charset="0"/>
-                      </a:endParaRPr>
-                    </a:p>
-                  </a:txBody>
-                  <a:tcPr marL="5961" marR="5961" marT="5961" marB="0" anchor="ctr"/>
-                </a:tc>
-                <a:tc>
-                  <a:txBody>
-                    <a:bodyPr/>
-                    <a:lstStyle/>
-                    <a:p>
-                      <a:pPr algn="ctr" fontAlgn="ctr"/>
-                      <a:r>
-                        <a:rPr lang="en-US" sz="1000" u="none" strike="noStrike">
-                          <a:effectLst/>
-                        </a:rPr>
-                        <a:t>X</a:t>
-                      </a:r>
-                      <a:endParaRPr lang="en-US" sz="1000" b="0" i="0" u="none" strike="noStrike">
-                        <a:solidFill>
-                          <a:srgbClr val="000000"/>
-                        </a:solidFill>
-                        <a:effectLst/>
-                        <a:latin typeface="Calibri" panose="020F0502020204030204" pitchFamily="34" charset="0"/>
-                      </a:endParaRPr>
-                    </a:p>
-                  </a:txBody>
-                  <a:tcPr marL="5961" marR="5961" marT="5961" marB="0" anchor="ctr"/>
-                </a:tc>
-                <a:tc>
-                  <a:txBody>
-                    <a:bodyPr/>
-                    <a:lstStyle/>
-                    <a:p>
-                      <a:pPr algn="ctr" fontAlgn="ctr"/>
-                      <a:r>
-                        <a:rPr lang="en-US" sz="1000" u="none" strike="noStrike">
-                          <a:effectLst/>
-                        </a:rPr>
-                        <a:t>X</a:t>
-                      </a:r>
-                      <a:endParaRPr lang="en-US" sz="1000" b="0" i="0" u="none" strike="noStrike">
-                        <a:solidFill>
-                          <a:srgbClr val="000000"/>
-                        </a:solidFill>
-                        <a:effectLst/>
-                        <a:latin typeface="Calibri" panose="020F0502020204030204" pitchFamily="34" charset="0"/>
-                      </a:endParaRPr>
-                    </a:p>
-                  </a:txBody>
-                  <a:tcPr marL="5961" marR="5961" marT="5961" marB="0" anchor="ctr"/>
-                </a:tc>
-                <a:tc>
-                  <a:txBody>
-                    <a:bodyPr/>
-                    <a:lstStyle/>
-                    <a:p>
-                      <a:pPr algn="ctr" fontAlgn="ctr"/>
-                      <a:r>
-                        <a:rPr lang="en-US" sz="1000" u="none" strike="noStrike">
-                          <a:effectLst/>
-                        </a:rPr>
-                        <a:t>X</a:t>
-                      </a:r>
-                      <a:endParaRPr lang="en-US" sz="1000" b="0" i="0" u="none" strike="noStrike">
-                        <a:solidFill>
-                          <a:srgbClr val="000000"/>
-                        </a:solidFill>
-                        <a:effectLst/>
-                        <a:latin typeface="Calibri" panose="020F0502020204030204" pitchFamily="34" charset="0"/>
-                      </a:endParaRPr>
-                    </a:p>
-                  </a:txBody>
-                  <a:tcPr marL="5961" marR="5961" marT="5961" marB="0" anchor="ctr"/>
-                </a:tc>
-                <a:extLst>
-                  <a:ext uri="{0D108BD9-81ED-4DB2-BD59-A6C34878D82A}">
-                    <a16:rowId xmlns:a16="http://schemas.microsoft.com/office/drawing/2014/main" val="3357472181"/>
-                  </a:ext>
-                </a:extLst>
-              </a:tr>
-              <a:tr h="922806">
                 <a:tc>
                   <a:txBody>
                     <a:bodyPr/>
@@ -5118,56 +5950,22 @@
                     <a:p>
                       <a:pPr algn="ctr" fontAlgn="ctr"/>
                       <a:r>
-                        <a:rPr lang="en-US" sz="1000" u="none" strike="noStrike">
+                        <a:rPr lang="en-US" sz="1000" u="none" strike="noStrike" dirty="0">
                           <a:effectLst/>
                         </a:rPr>
-                        <a:t>Focusing on factor analysis</a:t>
+                        <a:t>Focusing on </a:t>
                       </a:r>
-                      <a:endParaRPr lang="en-US" sz="1000" b="0" i="0" u="none" strike="noStrike">
-                        <a:solidFill>
-                          <a:srgbClr val="000000"/>
-                        </a:solidFill>
-                        <a:effectLst/>
-                        <a:latin typeface="Calibri" panose="020F0502020204030204" pitchFamily="34" charset="0"/>
-                      </a:endParaRPr>
-                    </a:p>
-                  </a:txBody>
-                  <a:tcPr marL="5961" marR="5961" marT="5961" marB="0" anchor="ctr"/>
-                </a:tc>
-                <a:tc>
-                  <a:txBody>
-                    <a:bodyPr/>
-                    <a:lstStyle/>
-                    <a:p>
-                      <a:pPr algn="ctr" fontAlgn="ctr"/>
                       <a:r>
-                        <a:rPr lang="en-US" sz="1000" u="none" strike="noStrike">
+                        <a:rPr lang="en-US" sz="1000" u="none" strike="noStrike" dirty="0" err="1">
                           <a:effectLst/>
                         </a:rPr>
-                        <a:t>Focusing on indentifying the interaction effects between influential moderators in meta-analysis</a:t>
+                        <a:t>indentifying</a:t>
                       </a:r>
-                      <a:endParaRPr lang="en-US" sz="1000" b="0" i="0" u="none" strike="noStrike">
-                        <a:solidFill>
-                          <a:srgbClr val="000000"/>
-                        </a:solidFill>
-                        <a:effectLst/>
-                        <a:latin typeface="Calibri" panose="020F0502020204030204" pitchFamily="34" charset="0"/>
-                      </a:endParaRPr>
-                    </a:p>
-                  </a:txBody>
-                  <a:tcPr marL="5961" marR="5961" marT="5961" marB="0" anchor="ctr"/>
-                </a:tc>
-                <a:tc>
-                  <a:txBody>
-                    <a:bodyPr/>
-                    <a:lstStyle/>
-                    <a:p>
-                      <a:pPr algn="ctr" fontAlgn="ctr"/>
                       <a:r>
                         <a:rPr lang="en-US" sz="1000" u="none" strike="noStrike" dirty="0">
                           <a:effectLst/>
                         </a:rPr>
-                        <a:t>Suggesting a new visualization plot (galaxy plot), but not specifically focusing on combining different RCTs</a:t>
+                        <a:t> the interaction effects between influential moderators in meta-analysis</a:t>
                       </a:r>
                       <a:endParaRPr lang="en-US" sz="1000" b="0" i="0" u="none" strike="noStrike" dirty="0">
                         <a:solidFill>
@@ -5205,11 +6003,11 @@
                 </a:tc>
                 <a:extLst>
                   <a:ext uri="{0D108BD9-81ED-4DB2-BD59-A6C34878D82A}">
-                    <a16:rowId xmlns:a16="http://schemas.microsoft.com/office/drawing/2014/main" val="589540446"/>
+                    <a16:rowId xmlns:a16="http://schemas.microsoft.com/office/drawing/2014/main" val="3114641711"/>
                   </a:ext>
                 </a:extLst>
               </a:tr>
-              <a:tr h="1150527">
+              <a:tr h="125187">
                 <a:tc>
                   <a:txBody>
                     <a:bodyPr/>
@@ -5220,7 +6018,46 @@
                         <a:rPr lang="en-US" sz="1000" u="none" strike="noStrike" dirty="0">
                           <a:effectLst/>
                         </a:rPr>
-                        <a:t>Link</a:t>
+                        <a:t>Specifically for Clinical data?</a:t>
+                      </a:r>
+                      <a:endParaRPr lang="en-US" sz="1000" b="0" i="0" u="none" strike="noStrike" dirty="0">
+                        <a:solidFill>
+                          <a:srgbClr val="000000"/>
+                        </a:solidFill>
+                        <a:effectLst/>
+                        <a:latin typeface="Calibri" panose="020F0502020204030204" pitchFamily="34" charset="0"/>
+                      </a:endParaRPr>
+                    </a:p>
+                  </a:txBody>
+                  <a:tcPr marL="5961" marR="5961" marT="5961" marB="0" anchor="ctr"/>
+                </a:tc>
+                <a:tc>
+                  <a:txBody>
+                    <a:bodyPr/>
+                    <a:lstStyle/>
+                    <a:p>
+                      <a:pPr marL="0" marR="0" lvl="0" indent="0" algn="ctr" defTabSz="914400" rtl="0" eaLnBrk="1" fontAlgn="ctr" latinLnBrk="0" hangingPunct="1">
+                        <a:lnSpc>
+                          <a:spcPct val="100000"/>
+                        </a:lnSpc>
+                        <a:spcBef>
+                          <a:spcPts val="0"/>
+                        </a:spcBef>
+                        <a:spcAft>
+                          <a:spcPts val="0"/>
+                        </a:spcAft>
+                        <a:buClrTx/>
+                        <a:buSzTx/>
+                        <a:buFontTx/>
+                        <a:buNone/>
+                        <a:tabLst/>
+                        <a:defRPr/>
+                      </a:pPr>
+                      <a:r>
+                        <a:rPr lang="en-US" sz="1400" u="none" strike="noStrike" dirty="0">
+                          <a:effectLst/>
+                        </a:rPr>
+                        <a:t>✅</a:t>
                       </a:r>
                       <a:endParaRPr lang="en-US" sz="1000" b="0" i="0" u="none" strike="noStrike" dirty="0">
                         <a:solidFill>
@@ -5240,10 +6077,135 @@
                     <a:p>
                       <a:pPr algn="ctr" fontAlgn="ctr"/>
                       <a:r>
-                        <a:rPr lang="en-US" sz="1000" dirty="0">
-                          <a:hlinkClick r:id="rId2"/>
+                        <a:rPr kumimoji="0" lang="en-US" sz="1400" b="0" i="0" u="none" strike="noStrike" kern="1200" cap="none" spc="0" normalizeH="0" baseline="0" noProof="0">
+                          <a:ln>
+                            <a:noFill/>
+                          </a:ln>
+                          <a:solidFill>
+                            <a:prstClr val="black"/>
+                          </a:solidFill>
+                          <a:effectLst/>
+                          <a:uLnTx/>
+                          <a:uFillTx/>
+                          <a:latin typeface="Aptos" panose="02110004020202020204"/>
+                          <a:ea typeface="+mn-ea"/>
+                          <a:cs typeface="+mn-cs"/>
                         </a:rPr>
-                        <a:t>https://pubmed.ncbi.nlm.nih.gov/38273647/</a:t>
+                        <a:t>✅</a:t>
+                      </a:r>
+                      <a:endParaRPr lang="en-US" sz="1000" b="0" i="0" u="none" strike="noStrike" dirty="0">
+                        <a:solidFill>
+                          <a:srgbClr val="000000"/>
+                        </a:solidFill>
+                        <a:effectLst/>
+                        <a:latin typeface="Calibri" panose="020F0502020204030204" pitchFamily="34" charset="0"/>
+                      </a:endParaRPr>
+                    </a:p>
+                  </a:txBody>
+                  <a:tcPr marL="5961" marR="5961" marT="5961" marB="0" anchor="ctr"/>
+                </a:tc>
+                <a:tc>
+                  <a:txBody>
+                    <a:bodyPr/>
+                    <a:lstStyle/>
+                    <a:p>
+                      <a:pPr algn="ctr" fontAlgn="ctr"/>
+                      <a:endParaRPr lang="en-US" sz="1000" b="0" i="0" u="none" strike="noStrike" dirty="0">
+                        <a:solidFill>
+                          <a:srgbClr val="000000"/>
+                        </a:solidFill>
+                        <a:effectLst/>
+                        <a:latin typeface="Calibri" panose="020F0502020204030204" pitchFamily="34" charset="0"/>
+                      </a:endParaRPr>
+                    </a:p>
+                  </a:txBody>
+                  <a:tcPr marL="5961" marR="5961" marT="5961" marB="0" anchor="ctr"/>
+                </a:tc>
+                <a:tc>
+                  <a:txBody>
+                    <a:bodyPr/>
+                    <a:lstStyle/>
+                    <a:p>
+                      <a:pPr algn="ctr" fontAlgn="ctr"/>
+                      <a:endParaRPr lang="en-US" sz="1000" b="0" i="0" u="none" strike="noStrike" dirty="0">
+                        <a:solidFill>
+                          <a:srgbClr val="000000"/>
+                        </a:solidFill>
+                        <a:effectLst/>
+                        <a:latin typeface="Calibri" panose="020F0502020204030204" pitchFamily="34" charset="0"/>
+                      </a:endParaRPr>
+                    </a:p>
+                  </a:txBody>
+                  <a:tcPr marL="5961" marR="5961" marT="5961" marB="0" anchor="ctr"/>
+                </a:tc>
+                <a:extLst>
+                  <a:ext uri="{0D108BD9-81ED-4DB2-BD59-A6C34878D82A}">
+                    <a16:rowId xmlns:a16="http://schemas.microsoft.com/office/drawing/2014/main" val="1156201414"/>
+                  </a:ext>
+                </a:extLst>
+              </a:tr>
+              <a:tr h="135917">
+                <a:tc>
+                  <a:txBody>
+                    <a:bodyPr/>
+                    <a:lstStyle/>
+                    <a:p>
+                      <a:pPr algn="ctr" fontAlgn="ctr"/>
+                      <a:r>
+                        <a:rPr lang="en-US" sz="1000" u="none" strike="noStrike">
+                          <a:effectLst/>
+                        </a:rPr>
+                        <a:t>Multiple Studies/sources?</a:t>
+                      </a:r>
+                      <a:endParaRPr lang="en-US" sz="1000" b="0" i="0" u="none" strike="noStrike">
+                        <a:solidFill>
+                          <a:srgbClr val="000000"/>
+                        </a:solidFill>
+                        <a:effectLst/>
+                        <a:latin typeface="Calibri" panose="020F0502020204030204" pitchFamily="34" charset="0"/>
+                      </a:endParaRPr>
+                    </a:p>
+                  </a:txBody>
+                  <a:tcPr marL="5961" marR="5961" marT="5961" marB="0" anchor="ctr"/>
+                </a:tc>
+                <a:tc>
+                  <a:txBody>
+                    <a:bodyPr/>
+                    <a:lstStyle/>
+                    <a:p>
+                      <a:pPr marL="0" marR="0" lvl="0" indent="0" algn="ctr" defTabSz="914400" rtl="0" eaLnBrk="1" fontAlgn="ctr" latinLnBrk="0" hangingPunct="1">
+                        <a:lnSpc>
+                          <a:spcPct val="100000"/>
+                        </a:lnSpc>
+                        <a:spcBef>
+                          <a:spcPts val="0"/>
+                        </a:spcBef>
+                        <a:spcAft>
+                          <a:spcPts val="0"/>
+                        </a:spcAft>
+                        <a:buClrTx/>
+                        <a:buSzTx/>
+                        <a:buFontTx/>
+                        <a:buNone/>
+                        <a:tabLst/>
+                        <a:defRPr/>
+                      </a:pPr>
+                      <a:r>
+                        <a:rPr kumimoji="0" lang="en-US" sz="1400" b="0" i="0" u="none" strike="noStrike" kern="1200" cap="none" spc="0" normalizeH="0" baseline="0" noProof="0" dirty="0">
+                          <a:ln>
+                            <a:noFill/>
+                          </a:ln>
+                          <a:solidFill>
+                            <a:prstClr val="black"/>
+                          </a:solidFill>
+                          <a:effectLst/>
+                          <a:uLnTx/>
+                          <a:uFillTx/>
+                          <a:latin typeface="Aptos" panose="02110004020202020204"/>
+                          <a:ea typeface="+mn-ea"/>
+                          <a:cs typeface="+mn-cs"/>
+                        </a:rPr>
+                        <a:t>✅</a:t>
                       </a:r>
                       <a:endParaRPr lang="en-US" sz="1000" b="0" i="0" u="none" strike="noStrike" dirty="0">
                         <a:solidFill>
@@ -5263,15 +6225,42 @@
                     <a:p>
                       <a:pPr algn="ctr" fontAlgn="ctr"/>
                       <a:r>
-                        <a:rPr lang="en-US" sz="1000" u="sng" strike="noStrike" dirty="0">
+                        <a:rPr kumimoji="0" lang="en-US" sz="1400" b="0" i="0" u="none" strike="noStrike" kern="1200" cap="none" spc="0" normalizeH="0" baseline="0" noProof="0" dirty="0">
+                          <a:ln>
+                            <a:noFill/>
+                          </a:ln>
+                          <a:solidFill>
+                            <a:prstClr val="black"/>
+                          </a:solidFill>
                           <a:effectLst/>
-                          <a:hlinkClick r:id="rId3"/>
+                          <a:uLnTx/>
+                          <a:uFillTx/>
+                          <a:latin typeface="Aptos" panose="02110004020202020204"/>
+                          <a:ea typeface="+mn-ea"/>
+                          <a:cs typeface="+mn-cs"/>
                         </a:rPr>
-                        <a:t>https://www.cambridge.org/core/journals/research-synthesis-methods/article/causalmetar-an-r-package-for-performing-causally-interpretable-metaanalyses</a:t>
+                        <a:t>✅</a:t>
                       </a:r>
-                      <a:endParaRPr lang="en-US" sz="1000" b="0" i="0" u="sng" strike="noStrike" dirty="0">
+                      <a:endParaRPr lang="en-US" sz="1000" b="0" i="0" u="none" strike="noStrike" dirty="0">
                         <a:solidFill>
-                          <a:srgbClr val="0563C1"/>
+                          <a:srgbClr val="000000"/>
+                        </a:solidFill>
+                        <a:effectLst/>
+                        <a:latin typeface="Calibri" panose="020F0502020204030204" pitchFamily="34" charset="0"/>
+                      </a:endParaRPr>
+                    </a:p>
+                  </a:txBody>
+                  <a:tcPr marL="5961" marR="5961" marT="5961" marB="0" anchor="ctr"/>
+                </a:tc>
+                <a:tc>
+                  <a:txBody>
+                    <a:bodyPr/>
+                    <a:lstStyle/>
+                    <a:p>
+                      <a:pPr algn="ctr" fontAlgn="ctr"/>
+                      <a:endParaRPr lang="en-US" sz="1000" b="0" i="0" u="none" strike="noStrike" dirty="0">
+                        <a:solidFill>
+                          <a:srgbClr val="000000"/>
                         </a:solidFill>
                         <a:effectLst/>
                         <a:latin typeface="Calibri" panose="020F0502020204030204" pitchFamily="34" charset="0"/>
@@ -5287,15 +6276,105 @@
                     <a:p>
                       <a:pPr algn="ctr" fontAlgn="ctr"/>
                       <a:r>
-                        <a:rPr lang="en-US" sz="1000" u="sng" strike="noStrike">
+                        <a:rPr kumimoji="0" lang="en-US" sz="1400" b="0" i="0" u="none" strike="noStrike" kern="1200" cap="none" spc="0" normalizeH="0" baseline="0" noProof="0">
+                          <a:ln>
+                            <a:noFill/>
+                          </a:ln>
+                          <a:solidFill>
+                            <a:prstClr val="black"/>
+                          </a:solidFill>
                           <a:effectLst/>
-                          <a:hlinkClick r:id="rId4"/>
+                          <a:uLnTx/>
+                          <a:uFillTx/>
+                          <a:latin typeface="Aptos" panose="02110004020202020204"/>
+                          <a:ea typeface="+mn-ea"/>
+                          <a:cs typeface="+mn-cs"/>
                         </a:rPr>
-                        <a:t>https://rdrr.io/cran/cate/</a:t>
+                        <a:t>✅</a:t>
                       </a:r>
-                      <a:endParaRPr lang="en-US" sz="1000" b="0" i="0" u="sng" strike="noStrike">
+                      <a:endParaRPr lang="en-US" sz="1000" b="0" i="0" u="none" strike="noStrike" dirty="0">
                         <a:solidFill>
-                          <a:srgbClr val="0563C1"/>
+                          <a:srgbClr val="000000"/>
+                        </a:solidFill>
+                        <a:effectLst/>
+                        <a:latin typeface="Calibri" panose="020F0502020204030204" pitchFamily="34" charset="0"/>
+                      </a:endParaRPr>
+                    </a:p>
+                  </a:txBody>
+                  <a:tcPr marL="5961" marR="5961" marT="5961" marB="0" anchor="ctr"/>
+                </a:tc>
+                <a:extLst>
+                  <a:ext uri="{0D108BD9-81ED-4DB2-BD59-A6C34878D82A}">
+                    <a16:rowId xmlns:a16="http://schemas.microsoft.com/office/drawing/2014/main" val="2439688353"/>
+                  </a:ext>
+                </a:extLst>
+              </a:tr>
+              <a:tr h="135917">
+                <a:tc>
+                  <a:txBody>
+                    <a:bodyPr/>
+                    <a:lstStyle/>
+                    <a:p>
+                      <a:pPr algn="ctr" fontAlgn="ctr"/>
+                      <a:r>
+                        <a:rPr lang="en-US" sz="1000" u="none" strike="noStrike">
+                          <a:effectLst/>
+                        </a:rPr>
+                        <a:t>Heterogeneity?</a:t>
+                      </a:r>
+                      <a:endParaRPr lang="en-US" sz="1000" b="0" i="0" u="none" strike="noStrike">
+                        <a:solidFill>
+                          <a:srgbClr val="000000"/>
+                        </a:solidFill>
+                        <a:effectLst/>
+                        <a:latin typeface="Calibri" panose="020F0502020204030204" pitchFamily="34" charset="0"/>
+                      </a:endParaRPr>
+                    </a:p>
+                  </a:txBody>
+                  <a:tcPr marL="5961" marR="5961" marT="5961" marB="0" anchor="ctr"/>
+                </a:tc>
+                <a:tc>
+                  <a:txBody>
+                    <a:bodyPr/>
+                    <a:lstStyle/>
+                    <a:p>
+                      <a:pPr marL="0" marR="0" lvl="0" indent="0" algn="ctr" defTabSz="914400" rtl="0" eaLnBrk="1" fontAlgn="ctr" latinLnBrk="0" hangingPunct="1">
+                        <a:lnSpc>
+                          <a:spcPct val="100000"/>
+                        </a:lnSpc>
+                        <a:spcBef>
+                          <a:spcPts val="0"/>
+                        </a:spcBef>
+                        <a:spcAft>
+                          <a:spcPts val="0"/>
+                        </a:spcAft>
+                        <a:buClrTx/>
+                        <a:buSzTx/>
+                        <a:buFontTx/>
+                        <a:buNone/>
+                        <a:tabLst/>
+                        <a:defRPr/>
+                      </a:pPr>
+                      <a:r>
+                        <a:rPr kumimoji="0" lang="en-US" sz="1400" b="0" i="0" u="none" strike="noStrike" kern="1200" cap="none" spc="0" normalizeH="0" baseline="0" noProof="0">
+                          <a:ln>
+                            <a:noFill/>
+                          </a:ln>
+                          <a:solidFill>
+                            <a:prstClr val="black"/>
+                          </a:solidFill>
+                          <a:effectLst/>
+                          <a:uLnTx/>
+                          <a:uFillTx/>
+                          <a:latin typeface="Aptos" panose="02110004020202020204"/>
+                          <a:ea typeface="+mn-ea"/>
+                          <a:cs typeface="+mn-cs"/>
+                        </a:rPr>
+                        <a:t>✅</a:t>
+                      </a:r>
+                      <a:endParaRPr lang="en-US" sz="1000" b="0" i="0" u="none" strike="noStrike" dirty="0">
+                        <a:solidFill>
+                          <a:srgbClr val="000000"/>
                         </a:solidFill>
                         <a:effectLst/>
                         <a:latin typeface="Calibri" panose="020F0502020204030204" pitchFamily="34" charset="0"/>
@@ -5311,15 +6390,139 @@
                     <a:p>
                       <a:pPr algn="ctr" fontAlgn="ctr"/>
                       <a:r>
-                        <a:rPr lang="en-US" sz="1000" u="sng" strike="noStrike">
+                        <a:rPr kumimoji="0" lang="en-US" sz="1400" b="0" i="0" u="none" strike="noStrike" kern="1200" cap="none" spc="0" normalizeH="0" baseline="0" noProof="0">
+                          <a:ln>
+                            <a:noFill/>
+                          </a:ln>
+                          <a:solidFill>
+                            <a:prstClr val="black"/>
+                          </a:solidFill>
                           <a:effectLst/>
-                          <a:hlinkClick r:id="rId5"/>
+                          <a:uLnTx/>
+                          <a:uFillTx/>
+                          <a:latin typeface="Aptos" panose="02110004020202020204"/>
+                          <a:ea typeface="+mn-ea"/>
+                          <a:cs typeface="+mn-cs"/>
                         </a:rPr>
-                        <a:t>https://cran.r-project.org/web/packages/metacart/index.html</a:t>
+                        <a:t>✅</a:t>
                       </a:r>
-                      <a:endParaRPr lang="en-US" sz="1000" b="0" i="0" u="sng" strike="noStrike">
+                      <a:endParaRPr lang="en-US" sz="1000" b="0" i="0" u="none" strike="noStrike" dirty="0">
                         <a:solidFill>
-                          <a:srgbClr val="0563C1"/>
+                          <a:srgbClr val="000000"/>
+                        </a:solidFill>
+                        <a:effectLst/>
+                        <a:latin typeface="Calibri" panose="020F0502020204030204" pitchFamily="34" charset="0"/>
+                      </a:endParaRPr>
+                    </a:p>
+                  </a:txBody>
+                  <a:tcPr marL="5961" marR="5961" marT="5961" marB="0" anchor="ctr"/>
+                </a:tc>
+                <a:tc>
+                  <a:txBody>
+                    <a:bodyPr/>
+                    <a:lstStyle/>
+                    <a:p>
+                      <a:pPr algn="ctr" fontAlgn="ctr"/>
+                      <a:endParaRPr lang="en-US" sz="1000" b="0" i="0" u="none" strike="noStrike" dirty="0">
+                        <a:solidFill>
+                          <a:srgbClr val="000000"/>
+                        </a:solidFill>
+                        <a:effectLst/>
+                        <a:latin typeface="Calibri" panose="020F0502020204030204" pitchFamily="34" charset="0"/>
+                      </a:endParaRPr>
+                    </a:p>
+                  </a:txBody>
+                  <a:tcPr marL="5961" marR="5961" marT="5961" marB="0" anchor="ctr"/>
+                </a:tc>
+                <a:tc>
+                  <a:txBody>
+                    <a:bodyPr/>
+                    <a:lstStyle/>
+                    <a:p>
+                      <a:pPr algn="ctr" fontAlgn="ctr"/>
+                      <a:endParaRPr lang="en-US" sz="1000" b="0" i="0" u="none" strike="noStrike" dirty="0">
+                        <a:solidFill>
+                          <a:srgbClr val="000000"/>
+                        </a:solidFill>
+                        <a:effectLst/>
+                        <a:latin typeface="Calibri" panose="020F0502020204030204" pitchFamily="34" charset="0"/>
+                      </a:endParaRPr>
+                    </a:p>
+                  </a:txBody>
+                  <a:tcPr marL="5961" marR="5961" marT="5961" marB="0" anchor="ctr"/>
+                </a:tc>
+                <a:extLst>
+                  <a:ext uri="{0D108BD9-81ED-4DB2-BD59-A6C34878D82A}">
+                    <a16:rowId xmlns:a16="http://schemas.microsoft.com/office/drawing/2014/main" val="2552288758"/>
+                  </a:ext>
+                </a:extLst>
+              </a:tr>
+              <a:tr h="126777">
+                <a:tc>
+                  <a:txBody>
+                    <a:bodyPr/>
+                    <a:lstStyle/>
+                    <a:p>
+                      <a:pPr algn="ctr" fontAlgn="ctr"/>
+                      <a:r>
+                        <a:rPr lang="en-US" sz="1000" u="none" strike="noStrike" dirty="0">
+                          <a:effectLst/>
+                        </a:rPr>
+                        <a:t>Individual traits (IPD)?</a:t>
+                      </a:r>
+                      <a:endParaRPr lang="en-US" sz="1000" b="0" i="0" u="none" strike="noStrike" dirty="0">
+                        <a:solidFill>
+                          <a:srgbClr val="000000"/>
+                        </a:solidFill>
+                        <a:effectLst/>
+                        <a:latin typeface="Calibri" panose="020F0502020204030204" pitchFamily="34" charset="0"/>
+                      </a:endParaRPr>
+                    </a:p>
+                  </a:txBody>
+                  <a:tcPr marL="5961" marR="5961" marT="5961" marB="0" anchor="ctr"/>
+                </a:tc>
+                <a:tc>
+                  <a:txBody>
+                    <a:bodyPr/>
+                    <a:lstStyle/>
+                    <a:p>
+                      <a:pPr marL="0" marR="0" lvl="0" indent="0" algn="ctr" defTabSz="914400" rtl="0" eaLnBrk="1" fontAlgn="ctr" latinLnBrk="0" hangingPunct="1">
+                        <a:lnSpc>
+                          <a:spcPct val="100000"/>
+                        </a:lnSpc>
+                        <a:spcBef>
+                          <a:spcPts val="0"/>
+                        </a:spcBef>
+                        <a:spcAft>
+                          <a:spcPts val="0"/>
+                        </a:spcAft>
+                        <a:buClrTx/>
+                        <a:buSzTx/>
+                        <a:buFontTx/>
+                        <a:buNone/>
+                        <a:tabLst/>
+                        <a:defRPr/>
+                      </a:pPr>
+                      <a:r>
+                        <a:rPr kumimoji="0" lang="en-US" sz="1400" b="0" i="0" u="none" strike="noStrike" kern="1200" cap="none" spc="0" normalizeH="0" baseline="0" noProof="0">
+                          <a:ln>
+                            <a:noFill/>
+                          </a:ln>
+                          <a:solidFill>
+                            <a:prstClr val="black"/>
+                          </a:solidFill>
+                          <a:effectLst/>
+                          <a:uLnTx/>
+                          <a:uFillTx/>
+                          <a:latin typeface="Aptos" panose="02110004020202020204"/>
+                          <a:ea typeface="+mn-ea"/>
+                          <a:cs typeface="+mn-cs"/>
+                        </a:rPr>
+                        <a:t>✅</a:t>
+                      </a:r>
+                      <a:endParaRPr lang="en-US" sz="1000" b="0" i="0" u="none" strike="noStrike" dirty="0">
+                        <a:solidFill>
+                          <a:srgbClr val="000000"/>
                         </a:solidFill>
                         <a:effectLst/>
                         <a:latin typeface="Calibri" panose="020F0502020204030204" pitchFamily="34" charset="0"/>
@@ -5335,15 +6538,25 @@
                     <a:p>
                       <a:pPr algn="ctr" fontAlgn="ctr"/>
                       <a:r>
-                        <a:rPr lang="en-US" sz="1000" u="sng" strike="noStrike">
+                        <a:rPr kumimoji="0" lang="en-US" sz="1400" b="0" i="0" u="none" strike="noStrike" kern="1200" cap="none" spc="0" normalizeH="0" baseline="0" noProof="0" dirty="0">
+                          <a:ln>
+                            <a:noFill/>
+                          </a:ln>
+                          <a:solidFill>
+                            <a:prstClr val="black"/>
+                          </a:solidFill>
                           <a:effectLst/>
-                          <a:hlinkClick r:id="rId6"/>
+                          <a:uLnTx/>
+                          <a:uFillTx/>
+                          <a:latin typeface="Aptos" panose="02110004020202020204"/>
+                          <a:ea typeface="+mn-ea"/>
+                          <a:cs typeface="+mn-cs"/>
                         </a:rPr>
-                        <a:t>https://pmc.ncbi.nlm.nih.gov/articles/PMC7438574/</a:t>
+                        <a:t>✅</a:t>
                       </a:r>
-                      <a:endParaRPr lang="en-US" sz="1000" b="0" i="0" u="sng" strike="noStrike">
+                      <a:endParaRPr lang="en-US" sz="1000" b="0" i="0" u="none" strike="noStrike" dirty="0">
                         <a:solidFill>
-                          <a:srgbClr val="0563C1"/>
+                          <a:srgbClr val="000000"/>
                         </a:solidFill>
                         <a:effectLst/>
                         <a:latin typeface="Calibri" panose="020F0502020204030204" pitchFamily="34" charset="0"/>
@@ -5359,14 +6572,42 @@
                     <a:p>
                       <a:pPr algn="ctr" fontAlgn="ctr"/>
                       <a:r>
-                        <a:rPr lang="en-US" sz="1000" u="sng" strike="noStrike" dirty="0">
+                        <a:rPr kumimoji="0" lang="en-US" sz="1400" b="0" i="0" u="none" strike="noStrike" kern="1200" cap="none" spc="0" normalizeH="0" baseline="0" noProof="0" dirty="0">
+                          <a:ln>
+                            <a:noFill/>
+                          </a:ln>
+                          <a:solidFill>
+                            <a:prstClr val="black"/>
+                          </a:solidFill>
                           <a:effectLst/>
+                          <a:uLnTx/>
+                          <a:uFillTx/>
+                          <a:latin typeface="Aptos" panose="02110004020202020204"/>
+                          <a:ea typeface="+mn-ea"/>
+                          <a:cs typeface="+mn-cs"/>
                         </a:rPr>
-                        <a:t>https://jaredhuling.org/personalized/</a:t>
+                        <a:t>✅</a:t>
                       </a:r>
-                      <a:endParaRPr lang="en-US" sz="1000" b="0" i="0" u="sng" strike="noStrike" dirty="0">
+                      <a:endParaRPr lang="en-US" sz="1000" b="0" i="0" u="none" strike="noStrike" dirty="0">
                         <a:solidFill>
-                          <a:srgbClr val="0563C1"/>
+                          <a:srgbClr val="000000"/>
+                        </a:solidFill>
+                        <a:effectLst/>
+                        <a:latin typeface="Calibri" panose="020F0502020204030204" pitchFamily="34" charset="0"/>
+                      </a:endParaRPr>
+                    </a:p>
+                  </a:txBody>
+                  <a:tcPr marL="5961" marR="5961" marT="5961" marB="0" anchor="ctr"/>
+                </a:tc>
+                <a:tc>
+                  <a:txBody>
+                    <a:bodyPr/>
+                    <a:lstStyle/>
+                    <a:p>
+                      <a:pPr algn="ctr" fontAlgn="ctr"/>
+                      <a:endParaRPr lang="en-US" sz="1000" b="0" i="0" u="none" strike="noStrike" dirty="0">
+                        <a:solidFill>
+                          <a:srgbClr val="000000"/>
                         </a:solidFill>
                         <a:effectLst/>
                         <a:latin typeface="Calibri" panose="020F0502020204030204" pitchFamily="34" charset="0"/>
@@ -5377,7 +6618,320 @@
                 </a:tc>
                 <a:extLst>
                   <a:ext uri="{0D108BD9-81ED-4DB2-BD59-A6C34878D82A}">
-                    <a16:rowId xmlns:a16="http://schemas.microsoft.com/office/drawing/2014/main" val="3870382402"/>
+                    <a16:rowId xmlns:a16="http://schemas.microsoft.com/office/drawing/2014/main" val="56072606"/>
+                  </a:ext>
+                </a:extLst>
+              </a:tr>
+              <a:tr h="126777">
+                <a:tc>
+                  <a:txBody>
+                    <a:bodyPr/>
+                    <a:lstStyle/>
+                    <a:p>
+                      <a:pPr algn="ctr" fontAlgn="ctr"/>
+                      <a:r>
+                        <a:rPr lang="en-US" sz="1000" u="none" strike="noStrike">
+                          <a:effectLst/>
+                        </a:rPr>
+                        <a:t>Estimation of CATE?</a:t>
+                      </a:r>
+                      <a:endParaRPr lang="en-US" sz="1000" b="0" i="0" u="none" strike="noStrike">
+                        <a:solidFill>
+                          <a:srgbClr val="000000"/>
+                        </a:solidFill>
+                        <a:effectLst/>
+                        <a:latin typeface="Calibri" panose="020F0502020204030204" pitchFamily="34" charset="0"/>
+                      </a:endParaRPr>
+                    </a:p>
+                  </a:txBody>
+                  <a:tcPr marL="5961" marR="5961" marT="5961" marB="0" anchor="ctr"/>
+                </a:tc>
+                <a:tc>
+                  <a:txBody>
+                    <a:bodyPr/>
+                    <a:lstStyle/>
+                    <a:p>
+                      <a:pPr marL="0" marR="0" lvl="0" indent="0" algn="ctr" defTabSz="914400" rtl="0" eaLnBrk="1" fontAlgn="ctr" latinLnBrk="0" hangingPunct="1">
+                        <a:lnSpc>
+                          <a:spcPct val="100000"/>
+                        </a:lnSpc>
+                        <a:spcBef>
+                          <a:spcPts val="0"/>
+                        </a:spcBef>
+                        <a:spcAft>
+                          <a:spcPts val="0"/>
+                        </a:spcAft>
+                        <a:buClrTx/>
+                        <a:buSzTx/>
+                        <a:buFontTx/>
+                        <a:buNone/>
+                        <a:tabLst/>
+                        <a:defRPr/>
+                      </a:pPr>
+                      <a:r>
+                        <a:rPr kumimoji="0" lang="en-US" sz="1400" b="0" i="0" u="none" strike="noStrike" kern="1200" cap="none" spc="0" normalizeH="0" baseline="0" noProof="0">
+                          <a:ln>
+                            <a:noFill/>
+                          </a:ln>
+                          <a:solidFill>
+                            <a:prstClr val="black"/>
+                          </a:solidFill>
+                          <a:effectLst/>
+                          <a:uLnTx/>
+                          <a:uFillTx/>
+                          <a:latin typeface="Aptos" panose="02110004020202020204"/>
+                          <a:ea typeface="+mn-ea"/>
+                          <a:cs typeface="+mn-cs"/>
+                        </a:rPr>
+                        <a:t>✅</a:t>
+                      </a:r>
+                      <a:endParaRPr lang="en-US" sz="1000" b="0" i="0" u="none" strike="noStrike" dirty="0">
+                        <a:solidFill>
+                          <a:srgbClr val="000000"/>
+                        </a:solidFill>
+                        <a:effectLst/>
+                        <a:latin typeface="Calibri" panose="020F0502020204030204" pitchFamily="34" charset="0"/>
+                      </a:endParaRPr>
+                    </a:p>
+                  </a:txBody>
+                  <a:tcPr marL="5961" marR="5961" marT="5961" marB="0" anchor="ctr"/>
+                </a:tc>
+                <a:tc>
+                  <a:txBody>
+                    <a:bodyPr/>
+                    <a:lstStyle/>
+                    <a:p>
+                      <a:pPr algn="ctr" fontAlgn="ctr"/>
+                      <a:endParaRPr lang="en-US" sz="1000" b="0" i="0" u="none" strike="noStrike" dirty="0">
+                        <a:solidFill>
+                          <a:srgbClr val="000000"/>
+                        </a:solidFill>
+                        <a:effectLst/>
+                        <a:latin typeface="Calibri" panose="020F0502020204030204" pitchFamily="34" charset="0"/>
+                      </a:endParaRPr>
+                    </a:p>
+                  </a:txBody>
+                  <a:tcPr marL="5961" marR="5961" marT="5961" marB="0" anchor="ctr"/>
+                </a:tc>
+                <a:tc>
+                  <a:txBody>
+                    <a:bodyPr/>
+                    <a:lstStyle/>
+                    <a:p>
+                      <a:pPr algn="ctr" fontAlgn="ctr"/>
+                      <a:r>
+                        <a:rPr kumimoji="0" lang="en-US" sz="1400" b="0" i="0" u="none" strike="noStrike" kern="1200" cap="none" spc="0" normalizeH="0" baseline="0" noProof="0" dirty="0">
+                          <a:ln>
+                            <a:noFill/>
+                          </a:ln>
+                          <a:solidFill>
+                            <a:prstClr val="black"/>
+                          </a:solidFill>
+                          <a:effectLst/>
+                          <a:uLnTx/>
+                          <a:uFillTx/>
+                          <a:latin typeface="Aptos" panose="02110004020202020204"/>
+                          <a:ea typeface="+mn-ea"/>
+                          <a:cs typeface="+mn-cs"/>
+                        </a:rPr>
+                        <a:t>✅</a:t>
+                      </a:r>
+                      <a:endParaRPr lang="en-US" sz="1000" b="0" i="0" u="none" strike="noStrike" dirty="0">
+                        <a:solidFill>
+                          <a:srgbClr val="000000"/>
+                        </a:solidFill>
+                        <a:effectLst/>
+                        <a:latin typeface="Calibri" panose="020F0502020204030204" pitchFamily="34" charset="0"/>
+                      </a:endParaRPr>
+                    </a:p>
+                  </a:txBody>
+                  <a:tcPr marL="5961" marR="5961" marT="5961" marB="0" anchor="ctr"/>
+                </a:tc>
+                <a:tc>
+                  <a:txBody>
+                    <a:bodyPr/>
+                    <a:lstStyle/>
+                    <a:p>
+                      <a:pPr algn="ctr" fontAlgn="ctr"/>
+                      <a:endParaRPr lang="en-US" sz="1000" b="0" i="0" u="none" strike="noStrike" dirty="0">
+                        <a:solidFill>
+                          <a:srgbClr val="000000"/>
+                        </a:solidFill>
+                        <a:effectLst/>
+                        <a:latin typeface="Calibri" panose="020F0502020204030204" pitchFamily="34" charset="0"/>
+                      </a:endParaRPr>
+                    </a:p>
+                  </a:txBody>
+                  <a:tcPr marL="5961" marR="5961" marT="5961" marB="0" anchor="ctr"/>
+                </a:tc>
+                <a:extLst>
+                  <a:ext uri="{0D108BD9-81ED-4DB2-BD59-A6C34878D82A}">
+                    <a16:rowId xmlns:a16="http://schemas.microsoft.com/office/drawing/2014/main" val="3209275298"/>
+                  </a:ext>
+                </a:extLst>
+              </a:tr>
+              <a:tr h="125187">
+                <a:tc>
+                  <a:txBody>
+                    <a:bodyPr/>
+                    <a:lstStyle/>
+                    <a:p>
+                      <a:pPr algn="ctr" fontAlgn="ctr"/>
+                      <a:r>
+                        <a:rPr lang="en-US" sz="1000" u="none" strike="noStrike">
+                          <a:effectLst/>
+                        </a:rPr>
+                        <a:t>Prediction of CATE?</a:t>
+                      </a:r>
+                      <a:endParaRPr lang="en-US" sz="1000" b="0" i="0" u="none" strike="noStrike">
+                        <a:solidFill>
+                          <a:srgbClr val="000000"/>
+                        </a:solidFill>
+                        <a:effectLst/>
+                        <a:latin typeface="Calibri" panose="020F0502020204030204" pitchFamily="34" charset="0"/>
+                      </a:endParaRPr>
+                    </a:p>
+                  </a:txBody>
+                  <a:tcPr marL="5961" marR="5961" marT="5961" marB="0" anchor="ctr"/>
+                </a:tc>
+                <a:tc>
+                  <a:txBody>
+                    <a:bodyPr/>
+                    <a:lstStyle/>
+                    <a:p>
+                      <a:pPr marL="0" marR="0" lvl="0" indent="0" algn="ctr" defTabSz="914400" rtl="0" eaLnBrk="1" fontAlgn="ctr" latinLnBrk="0" hangingPunct="1">
+                        <a:lnSpc>
+                          <a:spcPct val="100000"/>
+                        </a:lnSpc>
+                        <a:spcBef>
+                          <a:spcPts val="0"/>
+                        </a:spcBef>
+                        <a:spcAft>
+                          <a:spcPts val="0"/>
+                        </a:spcAft>
+                        <a:buClrTx/>
+                        <a:buSzTx/>
+                        <a:buFontTx/>
+                        <a:buNone/>
+                        <a:tabLst/>
+                        <a:defRPr/>
+                      </a:pPr>
+                      <a:r>
+                        <a:rPr kumimoji="0" lang="en-US" sz="1400" b="0" i="0" u="none" strike="noStrike" kern="1200" cap="none" spc="0" normalizeH="0" baseline="0" noProof="0" dirty="0">
+                          <a:ln>
+                            <a:noFill/>
+                          </a:ln>
+                          <a:solidFill>
+                            <a:prstClr val="black"/>
+                          </a:solidFill>
+                          <a:effectLst/>
+                          <a:uLnTx/>
+                          <a:uFillTx/>
+                          <a:latin typeface="Aptos" panose="02110004020202020204"/>
+                          <a:ea typeface="+mn-ea"/>
+                          <a:cs typeface="+mn-cs"/>
+                        </a:rPr>
+                        <a:t>✅</a:t>
+                      </a:r>
+                      <a:endParaRPr lang="en-US" sz="1000" b="0" i="0" u="none" strike="noStrike" dirty="0">
+                        <a:solidFill>
+                          <a:srgbClr val="000000"/>
+                        </a:solidFill>
+                        <a:effectLst/>
+                        <a:latin typeface="Calibri" panose="020F0502020204030204" pitchFamily="34" charset="0"/>
+                      </a:endParaRPr>
+                    </a:p>
+                  </a:txBody>
+                  <a:tcPr marL="5961" marR="5961" marT="5961" marB="0" anchor="ctr"/>
+                </a:tc>
+                <a:tc>
+                  <a:txBody>
+                    <a:bodyPr/>
+                    <a:lstStyle/>
+                    <a:p>
+                      <a:pPr algn="ctr" fontAlgn="ctr"/>
+                      <a:endParaRPr lang="en-US" sz="1000" b="0" i="0" u="none" strike="noStrike" dirty="0">
+                        <a:solidFill>
+                          <a:srgbClr val="000000"/>
+                        </a:solidFill>
+                        <a:effectLst/>
+                        <a:latin typeface="Calibri" panose="020F0502020204030204" pitchFamily="34" charset="0"/>
+                      </a:endParaRPr>
+                    </a:p>
+                  </a:txBody>
+                  <a:tcPr marL="5961" marR="5961" marT="5961" marB="0" anchor="ctr"/>
+                </a:tc>
+                <a:tc>
+                  <a:txBody>
+                    <a:bodyPr/>
+                    <a:lstStyle/>
+                    <a:p>
+                      <a:pPr algn="ctr" fontAlgn="ctr"/>
+                      <a:r>
+                        <a:rPr kumimoji="0" lang="en-US" sz="1400" b="0" i="0" u="none" strike="noStrike" kern="1200" cap="none" spc="0" normalizeH="0" baseline="0" noProof="0" dirty="0">
+                          <a:ln>
+                            <a:noFill/>
+                          </a:ln>
+                          <a:solidFill>
+                            <a:prstClr val="black"/>
+                          </a:solidFill>
+                          <a:effectLst/>
+                          <a:uLnTx/>
+                          <a:uFillTx/>
+                          <a:latin typeface="Aptos" panose="02110004020202020204"/>
+                          <a:ea typeface="+mn-ea"/>
+                          <a:cs typeface="+mn-cs"/>
+                        </a:rPr>
+                        <a:t>✅</a:t>
+                      </a:r>
+                      <a:endParaRPr lang="en-US" sz="1000" b="0" i="0" u="none" strike="noStrike" dirty="0">
+                        <a:solidFill>
+                          <a:srgbClr val="000000"/>
+                        </a:solidFill>
+                        <a:effectLst/>
+                        <a:latin typeface="Calibri" panose="020F0502020204030204" pitchFamily="34" charset="0"/>
+                      </a:endParaRPr>
+                    </a:p>
+                  </a:txBody>
+                  <a:tcPr marL="5961" marR="5961" marT="5961" marB="0" anchor="ctr"/>
+                </a:tc>
+                <a:tc>
+                  <a:txBody>
+                    <a:bodyPr/>
+                    <a:lstStyle/>
+                    <a:p>
+                      <a:pPr algn="ctr" fontAlgn="ctr"/>
+                      <a:r>
+                        <a:rPr kumimoji="0" lang="en-US" sz="1400" b="0" i="0" u="none" strike="noStrike" kern="1200" cap="none" spc="0" normalizeH="0" baseline="0" noProof="0" dirty="0">
+                          <a:ln>
+                            <a:noFill/>
+                          </a:ln>
+                          <a:solidFill>
+                            <a:prstClr val="black"/>
+                          </a:solidFill>
+                          <a:effectLst/>
+                          <a:uLnTx/>
+                          <a:uFillTx/>
+                          <a:latin typeface="Aptos" panose="02110004020202020204"/>
+                          <a:ea typeface="+mn-ea"/>
+                          <a:cs typeface="+mn-cs"/>
+                        </a:rPr>
+                        <a:t>✅</a:t>
+                      </a:r>
+                      <a:endParaRPr lang="en-US" sz="1000" b="0" i="0" u="none" strike="noStrike" dirty="0">
+                        <a:solidFill>
+                          <a:srgbClr val="000000"/>
+                        </a:solidFill>
+                        <a:effectLst/>
+                        <a:latin typeface="Calibri" panose="020F0502020204030204" pitchFamily="34" charset="0"/>
+                      </a:endParaRPr>
+                    </a:p>
+                  </a:txBody>
+                  <a:tcPr marL="5961" marR="5961" marT="5961" marB="0" anchor="ctr"/>
+                </a:tc>
+                <a:extLst>
+                  <a:ext uri="{0D108BD9-81ED-4DB2-BD59-A6C34878D82A}">
+                    <a16:rowId xmlns:a16="http://schemas.microsoft.com/office/drawing/2014/main" val="3357472181"/>
                   </a:ext>
                 </a:extLst>
               </a:tr>
@@ -5388,7 +6942,7 @@
     </p:spTree>
     <p:extLst>
       <p:ext uri="{BB962C8B-B14F-4D97-AF65-F5344CB8AC3E}">
-        <p14:creationId xmlns:p14="http://schemas.microsoft.com/office/powerpoint/2010/main" val="3878560386"/>
+        <p14:creationId xmlns:p14="http://schemas.microsoft.com/office/powerpoint/2010/main" val="3874652330"/>
       </p:ext>
     </p:extLst>
   </p:cSld>
@@ -5398,7 +6952,7 @@
 </p:sld>
 </file>
 
-<file path=ppt/slides/slide2.xml><?xml version="1.0" encoding="utf-8"?>
+<file path=ppt/slides/slide3.xml><?xml version="1.0" encoding="utf-8"?>
 <p:sld xmlns:a="http://schemas.openxmlformats.org/drawingml/2006/main" xmlns:r="http://schemas.openxmlformats.org/officeDocument/2006/relationships" xmlns:p="http://schemas.openxmlformats.org/presentationml/2006/main">
   <p:cSld>
     <p:spTree>
@@ -5977,7 +7531,7 @@
 </p:sld>
 </file>
 
-<file path=ppt/slides/slide3.xml><?xml version="1.0" encoding="utf-8"?>
+<file path=ppt/slides/slide4.xml><?xml version="1.0" encoding="utf-8"?>
 <p:sld xmlns:a="http://schemas.openxmlformats.org/drawingml/2006/main" xmlns:r="http://schemas.openxmlformats.org/officeDocument/2006/relationships" xmlns:p="http://schemas.openxmlformats.org/presentationml/2006/main">
   <p:cSld>
     <p:spTree>
@@ -6756,7 +8310,7 @@
 </p:sld>
 </file>
 
-<file path=ppt/slides/slide4.xml><?xml version="1.0" encoding="utf-8"?>
+<file path=ppt/slides/slide5.xml><?xml version="1.0" encoding="utf-8"?>
 <p:sld xmlns:a="http://schemas.openxmlformats.org/drawingml/2006/main" xmlns:r="http://schemas.openxmlformats.org/officeDocument/2006/relationships" xmlns:p="http://schemas.openxmlformats.org/presentationml/2006/main">
   <p:cSld>
     <p:spTree>

</xml_diff>

<commit_message>
update end of vignette 1
</commit_message>
<xml_diff>
--- a/Images/R package reserach for multicate.pptx
+++ b/Images/R package reserach for multicate.pptx
@@ -263,7 +263,7 @@
           <a:p>
             <a:fld id="{8E077C33-3D2A-49FD-8702-A60ED212BBD9}" type="datetimeFigureOut">
               <a:rPr lang="en-US" smtClean="0"/>
-              <a:t>7/15/25</a:t>
+              <a:t>7/23/25</a:t>
             </a:fld>
             <a:endParaRPr lang="en-US"/>
           </a:p>
@@ -461,7 +461,7 @@
           <a:p>
             <a:fld id="{8E077C33-3D2A-49FD-8702-A60ED212BBD9}" type="datetimeFigureOut">
               <a:rPr lang="en-US" smtClean="0"/>
-              <a:t>7/15/25</a:t>
+              <a:t>7/23/25</a:t>
             </a:fld>
             <a:endParaRPr lang="en-US"/>
           </a:p>
@@ -669,7 +669,7 @@
           <a:p>
             <a:fld id="{8E077C33-3D2A-49FD-8702-A60ED212BBD9}" type="datetimeFigureOut">
               <a:rPr lang="en-US" smtClean="0"/>
-              <a:t>7/15/25</a:t>
+              <a:t>7/23/25</a:t>
             </a:fld>
             <a:endParaRPr lang="en-US"/>
           </a:p>
@@ -867,7 +867,7 @@
           <a:p>
             <a:fld id="{8E077C33-3D2A-49FD-8702-A60ED212BBD9}" type="datetimeFigureOut">
               <a:rPr lang="en-US" smtClean="0"/>
-              <a:t>7/15/25</a:t>
+              <a:t>7/23/25</a:t>
             </a:fld>
             <a:endParaRPr lang="en-US"/>
           </a:p>
@@ -1142,7 +1142,7 @@
           <a:p>
             <a:fld id="{8E077C33-3D2A-49FD-8702-A60ED212BBD9}" type="datetimeFigureOut">
               <a:rPr lang="en-US" smtClean="0"/>
-              <a:t>7/15/25</a:t>
+              <a:t>7/23/25</a:t>
             </a:fld>
             <a:endParaRPr lang="en-US"/>
           </a:p>
@@ -1407,7 +1407,7 @@
           <a:p>
             <a:fld id="{8E077C33-3D2A-49FD-8702-A60ED212BBD9}" type="datetimeFigureOut">
               <a:rPr lang="en-US" smtClean="0"/>
-              <a:t>7/15/25</a:t>
+              <a:t>7/23/25</a:t>
             </a:fld>
             <a:endParaRPr lang="en-US"/>
           </a:p>
@@ -1819,7 +1819,7 @@
           <a:p>
             <a:fld id="{8E077C33-3D2A-49FD-8702-A60ED212BBD9}" type="datetimeFigureOut">
               <a:rPr lang="en-US" smtClean="0"/>
-              <a:t>7/15/25</a:t>
+              <a:t>7/23/25</a:t>
             </a:fld>
             <a:endParaRPr lang="en-US"/>
           </a:p>
@@ -1960,7 +1960,7 @@
           <a:p>
             <a:fld id="{8E077C33-3D2A-49FD-8702-A60ED212BBD9}" type="datetimeFigureOut">
               <a:rPr lang="en-US" smtClean="0"/>
-              <a:t>7/15/25</a:t>
+              <a:t>7/23/25</a:t>
             </a:fld>
             <a:endParaRPr lang="en-US"/>
           </a:p>
@@ -2073,7 +2073,7 @@
           <a:p>
             <a:fld id="{8E077C33-3D2A-49FD-8702-A60ED212BBD9}" type="datetimeFigureOut">
               <a:rPr lang="en-US" smtClean="0"/>
-              <a:t>7/15/25</a:t>
+              <a:t>7/23/25</a:t>
             </a:fld>
             <a:endParaRPr lang="en-US"/>
           </a:p>
@@ -2384,7 +2384,7 @@
           <a:p>
             <a:fld id="{8E077C33-3D2A-49FD-8702-A60ED212BBD9}" type="datetimeFigureOut">
               <a:rPr lang="en-US" smtClean="0"/>
-              <a:t>7/15/25</a:t>
+              <a:t>7/23/25</a:t>
             </a:fld>
             <a:endParaRPr lang="en-US"/>
           </a:p>
@@ -2672,7 +2672,7 @@
           <a:p>
             <a:fld id="{8E077C33-3D2A-49FD-8702-A60ED212BBD9}" type="datetimeFigureOut">
               <a:rPr lang="en-US" smtClean="0"/>
-              <a:t>7/15/25</a:t>
+              <a:t>7/23/25</a:t>
             </a:fld>
             <a:endParaRPr lang="en-US"/>
           </a:p>
@@ -2913,7 +2913,7 @@
           <a:p>
             <a:fld id="{8E077C33-3D2A-49FD-8702-A60ED212BBD9}" type="datetimeFigureOut">
               <a:rPr lang="en-US" smtClean="0"/>
-              <a:t>7/15/25</a:t>
+              <a:t>7/23/25</a:t>
             </a:fld>
             <a:endParaRPr lang="en-US"/>
           </a:p>
@@ -7125,7 +7125,7 @@
                 <a:ea typeface="Helvetica Neue" panose="02000503000000020004" pitchFamily="2" charset="0"/>
                 <a:cs typeface="Arial" panose="020B0604020202020204" pitchFamily="34" charset="0"/>
               </a:rPr>
-              <a:t>Multiple RCTs comparing treatment efficacy</a:t>
+              <a:t>Multiple studies comparing treatment efficacy</a:t>
             </a:r>
             <a:endParaRPr lang="en-US" sz="2400" dirty="0">
               <a:solidFill>
@@ -7215,7 +7215,17 @@
                 <a:ea typeface="Helvetica Neue" panose="02000503000000020004" pitchFamily="2" charset="0"/>
                 <a:cs typeface="Arial" panose="020B0604020202020204" pitchFamily="34" charset="0"/>
               </a:rPr>
-              <a:t>Estimate CATE in RCTs</a:t>
+              <a:t>Estimate CATE </a:t>
+            </a:r>
+            <a:r>
+              <a:rPr lang="en-US" sz="2400">
+                <a:solidFill>
+                  <a:sysClr val="windowText" lastClr="000000"/>
+                </a:solidFill>
+                <a:ea typeface="Helvetica Neue" panose="02000503000000020004" pitchFamily="2" charset="0"/>
+                <a:cs typeface="Arial" panose="020B0604020202020204" pitchFamily="34" charset="0"/>
+              </a:rPr>
+              <a:t>in studies</a:t>
             </a:r>
             <a:endParaRPr lang="en-US" sz="2400" dirty="0">
               <a:solidFill>
@@ -7464,60 +7474,6 @@
           </a:fontRef>
         </p:style>
       </p:cxnSp>
-      <p:sp>
-        <p:nvSpPr>
-          <p:cNvPr id="13" name="TextBox 12">
-            <a:extLst>
-              <a:ext uri="{FF2B5EF4-FFF2-40B4-BE49-F238E27FC236}">
-                <a16:creationId xmlns:a16="http://schemas.microsoft.com/office/drawing/2014/main" id="{D553E1E8-59FA-5D18-3435-2C7B33EA2438}"/>
-              </a:ext>
-            </a:extLst>
-          </p:cNvPr>
-          <p:cNvSpPr txBox="1"/>
-          <p:nvPr/>
-        </p:nvSpPr>
-        <p:spPr>
-          <a:xfrm>
-            <a:off x="3114262" y="984921"/>
-            <a:ext cx="7328646" cy="523220"/>
-          </a:xfrm>
-          <a:prstGeom prst="rect">
-            <a:avLst/>
-          </a:prstGeom>
-          <a:noFill/>
-        </p:spPr>
-        <p:txBody>
-          <a:bodyPr wrap="square">
-            <a:spAutoFit/>
-          </a:bodyPr>
-          <a:lstStyle/>
-          <a:p>
-            <a:r>
-              <a:rPr lang="en-US" sz="2800" b="1" u="none" strike="noStrike" dirty="0">
-                <a:effectLst/>
-              </a:rPr>
-              <a:t>Two-Step Approach of </a:t>
-            </a:r>
-            <a:r>
-              <a:rPr lang="en-US" sz="2800" b="1" dirty="0" err="1"/>
-              <a:t>m</a:t>
-            </a:r>
-            <a:r>
-              <a:rPr lang="en-US" sz="2800" b="1" u="none" strike="noStrike" dirty="0" err="1">
-                <a:effectLst/>
-              </a:rPr>
-              <a:t>ulticate</a:t>
-            </a:r>
-            <a:r>
-              <a:rPr lang="en-US" sz="2800" b="1" u="none" strike="noStrike" dirty="0">
-                <a:effectLst/>
-              </a:rPr>
-              <a:t>()</a:t>
-            </a:r>
-            <a:endParaRPr lang="en-US" sz="2800" b="1" dirty="0"/>
-          </a:p>
-        </p:txBody>
-      </p:sp>
     </p:spTree>
     <p:extLst>
       <p:ext uri="{BB962C8B-B14F-4D97-AF65-F5344CB8AC3E}">

</xml_diff>